<commit_message>
Se agregan diagramas, video y presentación
</commit_message>
<xml_diff>
--- a/Cuaderno_trabajo/ARTI-4109-4-CuadernoTrabajo-Reto1_desarrollo.pptx
+++ b/Cuaderno_trabajo/ARTI-4109-4-CuadernoTrabajo-Reto1_desarrollo.pptx
@@ -5,10 +5,10 @@
     <p:sldMasterId id="2147483648" r:id="rId4"/>
   </p:sldMasterIdLst>
   <p:notesMasterIdLst>
-    <p:notesMasterId r:id="rId36"/>
+    <p:notesMasterId r:id="rId35"/>
   </p:notesMasterIdLst>
   <p:handoutMasterIdLst>
-    <p:handoutMasterId r:id="rId37"/>
+    <p:handoutMasterId r:id="rId36"/>
   </p:handoutMasterIdLst>
   <p:sldIdLst>
     <p:sldId id="256" r:id="rId5"/>
@@ -30,9 +30,9 @@
     <p:sldId id="435" r:id="rId21"/>
     <p:sldId id="476" r:id="rId22"/>
     <p:sldId id="477" r:id="rId23"/>
-    <p:sldId id="478" r:id="rId24"/>
+    <p:sldId id="487" r:id="rId24"/>
     <p:sldId id="479" r:id="rId25"/>
-    <p:sldId id="480" r:id="rId26"/>
+    <p:sldId id="478" r:id="rId26"/>
     <p:sldId id="482" r:id="rId27"/>
     <p:sldId id="483" r:id="rId28"/>
     <p:sldId id="437" r:id="rId29"/>
@@ -41,7 +41,6 @@
     <p:sldId id="484" r:id="rId32"/>
     <p:sldId id="485" r:id="rId33"/>
     <p:sldId id="486" r:id="rId34"/>
-    <p:sldId id="463" r:id="rId35"/>
   </p:sldIdLst>
   <p:sldSz cx="9144000" cy="6858000" type="screen4x3"/>
   <p:notesSz cx="6858000" cy="9144000"/>
@@ -165,1541 +164,16 @@
 <file path=ppt/revisionInfo.xml><?xml version="1.0" encoding="utf-8"?>
 <p1510:revInfo xmlns:a="http://schemas.openxmlformats.org/drawingml/2006/main" xmlns:r="http://schemas.openxmlformats.org/officeDocument/2006/relationships" xmlns:p1510="http://schemas.microsoft.com/office/powerpoint/2015/10/main">
   <p1510:revLst>
+    <p1510:client id="{3AE1E0B8-C456-0400-B6DD-C98D68F91645}" v="37" dt="2025-09-02T21:55:06.738"/>
+    <p1510:client id="{57CB3760-14B7-FDDF-CC07-9A568419C0D5}" v="117" dt="2025-09-02T17:31:11.421"/>
     <p1510:client id="{58103525-E681-31BA-BAF7-33EBB53FD5AB}" v="3591" dt="2025-09-02T05:02:27.544"/>
     <p1510:client id="{78E1A115-80C1-A3A3-521C-0335BA36D7EF}" v="487" dt="2025-09-02T05:40:48.797"/>
+    <p1510:client id="{7E23D7C2-D240-9771-7DAE-F32DC9688C7A}" v="1" dt="2025-09-02T17:33:48.623"/>
     <p1510:client id="{8A17EEF3-B1A7-AF94-6167-1EDD3B45EBD6}" v="409" dt="2025-09-02T04:48:26.844"/>
     <p1510:client id="{D8699984-A15F-4FDC-831C-048F7142C1F4}" v="36" dt="2025-09-02T04:38:14.178"/>
     <p1510:client id="{E1197103-D5D8-11E3-89E8-757975F27206}" v="148" dt="2025-09-02T05:04:56.020"/>
   </p1510:revLst>
 </p1510:revInfo>
-</file>
-
-<file path=ppt/changesInfos/changesInfo1.xml><?xml version="1.0" encoding="utf-8"?>
-<pc:chgInfo xmlns:a="http://schemas.openxmlformats.org/drawingml/2006/main" xmlns:r="http://schemas.openxmlformats.org/officeDocument/2006/relationships" xmlns:ac="http://schemas.microsoft.com/office/drawing/2013/main/command" xmlns:pc="http://schemas.microsoft.com/office/powerpoint/2013/main/command">
-  <pc:docChgLst>
-    <pc:chgData name="Brayan Felipe Rojas Bernal" userId="S::b.rojasb@uniandes.edu.co::0e1c8319-9d93-42bd-95ed-f63e83f638a1" providerId="AD" clId="Web-{C5EAD2B4-614F-53CC-DE08-4C17140082D7}"/>
-    <pc:docChg chg="delSld modSld">
-      <pc:chgData name="Brayan Felipe Rojas Bernal" userId="S::b.rojasb@uniandes.edu.co::0e1c8319-9d93-42bd-95ed-f63e83f638a1" providerId="AD" clId="Web-{C5EAD2B4-614F-53CC-DE08-4C17140082D7}" dt="2025-08-30T16:25:38.651" v="662" actId="14100"/>
-      <pc:docMkLst>
-        <pc:docMk/>
-      </pc:docMkLst>
-      <pc:sldChg chg="modSp">
-        <pc:chgData name="Brayan Felipe Rojas Bernal" userId="S::b.rojasb@uniandes.edu.co::0e1c8319-9d93-42bd-95ed-f63e83f638a1" providerId="AD" clId="Web-{C5EAD2B4-614F-53CC-DE08-4C17140082D7}" dt="2025-08-30T15:15:39.743" v="510"/>
-        <pc:sldMkLst>
-          <pc:docMk/>
-          <pc:sldMk cId="198856905" sldId="432"/>
-        </pc:sldMkLst>
-        <pc:graphicFrameChg chg="mod modGraphic">
-          <ac:chgData name="Brayan Felipe Rojas Bernal" userId="S::b.rojasb@uniandes.edu.co::0e1c8319-9d93-42bd-95ed-f63e83f638a1" providerId="AD" clId="Web-{C5EAD2B4-614F-53CC-DE08-4C17140082D7}" dt="2025-08-30T15:15:39.743" v="510"/>
-          <ac:graphicFrameMkLst>
-            <pc:docMk/>
-            <pc:sldMk cId="198856905" sldId="432"/>
-            <ac:graphicFrameMk id="9" creationId="{674E3414-D2BA-3D41-BAEC-BDDF5879A1D8}"/>
-          </ac:graphicFrameMkLst>
-        </pc:graphicFrameChg>
-      </pc:sldChg>
-      <pc:sldChg chg="del">
-        <pc:chgData name="Brayan Felipe Rojas Bernal" userId="S::b.rojasb@uniandes.edu.co::0e1c8319-9d93-42bd-95ed-f63e83f638a1" providerId="AD" clId="Web-{C5EAD2B4-614F-53CC-DE08-4C17140082D7}" dt="2025-08-30T14:55:37.036" v="0"/>
-        <pc:sldMkLst>
-          <pc:docMk/>
-          <pc:sldMk cId="687333583" sldId="466"/>
-        </pc:sldMkLst>
-      </pc:sldChg>
-      <pc:sldChg chg="modSp">
-        <pc:chgData name="Brayan Felipe Rojas Bernal" userId="S::b.rojasb@uniandes.edu.co::0e1c8319-9d93-42bd-95ed-f63e83f638a1" providerId="AD" clId="Web-{C5EAD2B4-614F-53CC-DE08-4C17140082D7}" dt="2025-08-30T14:59:20.886" v="16"/>
-        <pc:sldMkLst>
-          <pc:docMk/>
-          <pc:sldMk cId="592874193" sldId="467"/>
-        </pc:sldMkLst>
-        <pc:graphicFrameChg chg="mod modGraphic">
-          <ac:chgData name="Brayan Felipe Rojas Bernal" userId="S::b.rojasb@uniandes.edu.co::0e1c8319-9d93-42bd-95ed-f63e83f638a1" providerId="AD" clId="Web-{C5EAD2B4-614F-53CC-DE08-4C17140082D7}" dt="2025-08-30T14:59:20.886" v="16"/>
-          <ac:graphicFrameMkLst>
-            <pc:docMk/>
-            <pc:sldMk cId="592874193" sldId="467"/>
-            <ac:graphicFrameMk id="8" creationId="{8E3EA33B-4F1D-1D8D-2655-02AF6C8C3BB7}"/>
-          </ac:graphicFrameMkLst>
-        </pc:graphicFrameChg>
-      </pc:sldChg>
-      <pc:sldChg chg="modSp">
-        <pc:chgData name="Brayan Felipe Rojas Bernal" userId="S::b.rojasb@uniandes.edu.co::0e1c8319-9d93-42bd-95ed-f63e83f638a1" providerId="AD" clId="Web-{C5EAD2B4-614F-53CC-DE08-4C17140082D7}" dt="2025-08-30T15:18:27.819" v="572"/>
-        <pc:sldMkLst>
-          <pc:docMk/>
-          <pc:sldMk cId="2607037317" sldId="474"/>
-        </pc:sldMkLst>
-        <pc:graphicFrameChg chg="mod modGraphic">
-          <ac:chgData name="Brayan Felipe Rojas Bernal" userId="S::b.rojasb@uniandes.edu.co::0e1c8319-9d93-42bd-95ed-f63e83f638a1" providerId="AD" clId="Web-{C5EAD2B4-614F-53CC-DE08-4C17140082D7}" dt="2025-08-30T15:18:27.819" v="572"/>
-          <ac:graphicFrameMkLst>
-            <pc:docMk/>
-            <pc:sldMk cId="2607037317" sldId="474"/>
-            <ac:graphicFrameMk id="9" creationId="{E87D49B9-FEFB-D845-87E4-39A147340360}"/>
-          </ac:graphicFrameMkLst>
-        </pc:graphicFrameChg>
-      </pc:sldChg>
-      <pc:sldChg chg="addSp delSp modSp">
-        <pc:chgData name="Brayan Felipe Rojas Bernal" userId="S::b.rojasb@uniandes.edu.co::0e1c8319-9d93-42bd-95ed-f63e83f638a1" providerId="AD" clId="Web-{C5EAD2B4-614F-53CC-DE08-4C17140082D7}" dt="2025-08-30T16:25:38.651" v="662" actId="14100"/>
-        <pc:sldMkLst>
-          <pc:docMk/>
-          <pc:sldMk cId="2983963519" sldId="476"/>
-        </pc:sldMkLst>
-        <pc:spChg chg="mod">
-          <ac:chgData name="Brayan Felipe Rojas Bernal" userId="S::b.rojasb@uniandes.edu.co::0e1c8319-9d93-42bd-95ed-f63e83f638a1" providerId="AD" clId="Web-{C5EAD2B4-614F-53CC-DE08-4C17140082D7}" dt="2025-08-30T15:38:50.686" v="647" actId="20577"/>
-          <ac:spMkLst>
-            <pc:docMk/>
-            <pc:sldMk cId="2983963519" sldId="476"/>
-            <ac:spMk id="7" creationId="{218E002B-5F16-AF8E-D18E-6539578CE088}"/>
-          </ac:spMkLst>
-        </pc:spChg>
-        <pc:picChg chg="add mod">
-          <ac:chgData name="Brayan Felipe Rojas Bernal" userId="S::b.rojasb@uniandes.edu.co::0e1c8319-9d93-42bd-95ed-f63e83f638a1" providerId="AD" clId="Web-{C5EAD2B4-614F-53CC-DE08-4C17140082D7}" dt="2025-08-30T16:25:38.651" v="662" actId="14100"/>
-          <ac:picMkLst>
-            <pc:docMk/>
-            <pc:sldMk cId="2983963519" sldId="476"/>
-            <ac:picMk id="4" creationId="{F81751C7-7F56-7C46-4111-A0BFF7D80F26}"/>
-          </ac:picMkLst>
-        </pc:picChg>
-      </pc:sldChg>
-      <pc:sldChg chg="addSp modSp">
-        <pc:chgData name="Brayan Felipe Rojas Bernal" userId="S::b.rojasb@uniandes.edu.co::0e1c8319-9d93-42bd-95ed-f63e83f638a1" providerId="AD" clId="Web-{C5EAD2B4-614F-53CC-DE08-4C17140082D7}" dt="2025-08-30T15:36:51.183" v="595" actId="20577"/>
-        <pc:sldMkLst>
-          <pc:docMk/>
-          <pc:sldMk cId="4038774577" sldId="477"/>
-        </pc:sldMkLst>
-        <pc:spChg chg="mod">
-          <ac:chgData name="Brayan Felipe Rojas Bernal" userId="S::b.rojasb@uniandes.edu.co::0e1c8319-9d93-42bd-95ed-f63e83f638a1" providerId="AD" clId="Web-{C5EAD2B4-614F-53CC-DE08-4C17140082D7}" dt="2025-08-30T15:36:51.183" v="595" actId="20577"/>
-          <ac:spMkLst>
-            <pc:docMk/>
-            <pc:sldMk cId="4038774577" sldId="477"/>
-            <ac:spMk id="7" creationId="{521CF45E-FFFC-502F-347D-EA542C593FE7}"/>
-          </ac:spMkLst>
-        </pc:spChg>
-        <pc:picChg chg="add mod">
-          <ac:chgData name="Brayan Felipe Rojas Bernal" userId="S::b.rojasb@uniandes.edu.co::0e1c8319-9d93-42bd-95ed-f63e83f638a1" providerId="AD" clId="Web-{C5EAD2B4-614F-53CC-DE08-4C17140082D7}" dt="2025-08-30T15:36:18.228" v="576" actId="1076"/>
-          <ac:picMkLst>
-            <pc:docMk/>
-            <pc:sldMk cId="4038774577" sldId="477"/>
-            <ac:picMk id="2" creationId="{A31AEC50-4EEE-5B6D-C348-D47612B3A473}"/>
-          </ac:picMkLst>
-        </pc:picChg>
-      </pc:sldChg>
-      <pc:sldChg chg="modSp">
-        <pc:chgData name="Brayan Felipe Rojas Bernal" userId="S::b.rojasb@uniandes.edu.co::0e1c8319-9d93-42bd-95ed-f63e83f638a1" providerId="AD" clId="Web-{C5EAD2B4-614F-53CC-DE08-4C17140082D7}" dt="2025-08-30T15:38:20.279" v="629" actId="20577"/>
-        <pc:sldMkLst>
-          <pc:docMk/>
-          <pc:sldMk cId="4288963705" sldId="478"/>
-        </pc:sldMkLst>
-        <pc:spChg chg="mod">
-          <ac:chgData name="Brayan Felipe Rojas Bernal" userId="S::b.rojasb@uniandes.edu.co::0e1c8319-9d93-42bd-95ed-f63e83f638a1" providerId="AD" clId="Web-{C5EAD2B4-614F-53CC-DE08-4C17140082D7}" dt="2025-08-30T15:38:20.279" v="629" actId="20577"/>
-          <ac:spMkLst>
-            <pc:docMk/>
-            <pc:sldMk cId="4288963705" sldId="478"/>
-            <ac:spMk id="7" creationId="{2DBED479-FB19-E089-1C6E-2AE0B82F2A0C}"/>
-          </ac:spMkLst>
-        </pc:spChg>
-      </pc:sldChg>
-      <pc:sldChg chg="modSp">
-        <pc:chgData name="Brayan Felipe Rojas Bernal" userId="S::b.rojasb@uniandes.edu.co::0e1c8319-9d93-42bd-95ed-f63e83f638a1" providerId="AD" clId="Web-{C5EAD2B4-614F-53CC-DE08-4C17140082D7}" dt="2025-08-30T15:38:00.075" v="608" actId="20577"/>
-        <pc:sldMkLst>
-          <pc:docMk/>
-          <pc:sldMk cId="1446356416" sldId="479"/>
-        </pc:sldMkLst>
-        <pc:spChg chg="mod">
-          <ac:chgData name="Brayan Felipe Rojas Bernal" userId="S::b.rojasb@uniandes.edu.co::0e1c8319-9d93-42bd-95ed-f63e83f638a1" providerId="AD" clId="Web-{C5EAD2B4-614F-53CC-DE08-4C17140082D7}" dt="2025-08-30T15:38:00.075" v="608" actId="20577"/>
-          <ac:spMkLst>
-            <pc:docMk/>
-            <pc:sldMk cId="1446356416" sldId="479"/>
-            <ac:spMk id="7" creationId="{6C2A64F7-21DA-14DB-83BC-306E861DB0B1}"/>
-          </ac:spMkLst>
-        </pc:spChg>
-      </pc:sldChg>
-    </pc:docChg>
-  </pc:docChgLst>
-  <pc:docChgLst>
-    <pc:chgData name="Brayan Felipe Rojas Bernal" userId="S::b.rojasb@uniandes.edu.co::0e1c8319-9d93-42bd-95ed-f63e83f638a1" providerId="AD" clId="Web-{78E1A115-80C1-A3A3-521C-0335BA36D7EF}"/>
-    <pc:docChg chg="addSld modSld">
-      <pc:chgData name="Brayan Felipe Rojas Bernal" userId="S::b.rojasb@uniandes.edu.co::0e1c8319-9d93-42bd-95ed-f63e83f638a1" providerId="AD" clId="Web-{78E1A115-80C1-A3A3-521C-0335BA36D7EF}" dt="2025-09-02T05:40:48.797" v="268" actId="1076"/>
-      <pc:docMkLst>
-        <pc:docMk/>
-      </pc:docMkLst>
-      <pc:sldChg chg="modSp">
-        <pc:chgData name="Brayan Felipe Rojas Bernal" userId="S::b.rojasb@uniandes.edu.co::0e1c8319-9d93-42bd-95ed-f63e83f638a1" providerId="AD" clId="Web-{78E1A115-80C1-A3A3-521C-0335BA36D7EF}" dt="2025-09-02T04:53:05.339" v="19"/>
-        <pc:sldMkLst>
-          <pc:docMk/>
-          <pc:sldMk cId="1957387262" sldId="438"/>
-        </pc:sldMkLst>
-        <pc:graphicFrameChg chg="mod modGraphic">
-          <ac:chgData name="Brayan Felipe Rojas Bernal" userId="S::b.rojasb@uniandes.edu.co::0e1c8319-9d93-42bd-95ed-f63e83f638a1" providerId="AD" clId="Web-{78E1A115-80C1-A3A3-521C-0335BA36D7EF}" dt="2025-09-02T04:53:05.339" v="19"/>
-          <ac:graphicFrameMkLst>
-            <pc:docMk/>
-            <pc:sldMk cId="1957387262" sldId="438"/>
-            <ac:graphicFrameMk id="9" creationId="{3EE47E5E-5DD0-FD4C-A0F9-65C73C7768D6}"/>
-          </ac:graphicFrameMkLst>
-        </pc:graphicFrameChg>
-      </pc:sldChg>
-      <pc:sldChg chg="addSp modSp">
-        <pc:chgData name="Brayan Felipe Rojas Bernal" userId="S::b.rojasb@uniandes.edu.co::0e1c8319-9d93-42bd-95ed-f63e83f638a1" providerId="AD" clId="Web-{78E1A115-80C1-A3A3-521C-0335BA36D7EF}" dt="2025-09-02T05:04:13.300" v="216" actId="14100"/>
-        <pc:sldMkLst>
-          <pc:docMk/>
-          <pc:sldMk cId="4288963705" sldId="478"/>
-        </pc:sldMkLst>
-        <pc:cxnChg chg="add mod">
-          <ac:chgData name="Brayan Felipe Rojas Bernal" userId="S::b.rojasb@uniandes.edu.co::0e1c8319-9d93-42bd-95ed-f63e83f638a1" providerId="AD" clId="Web-{78E1A115-80C1-A3A3-521C-0335BA36D7EF}" dt="2025-09-02T05:04:13.300" v="216" actId="14100"/>
-          <ac:cxnSpMkLst>
-            <pc:docMk/>
-            <pc:sldMk cId="4288963705" sldId="478"/>
-            <ac:cxnSpMk id="4" creationId="{69E9DF3D-CDB2-F19D-05C9-F2F67715CC0D}"/>
-          </ac:cxnSpMkLst>
-        </pc:cxnChg>
-      </pc:sldChg>
-      <pc:sldChg chg="modSp">
-        <pc:chgData name="Brayan Felipe Rojas Bernal" userId="S::b.rojasb@uniandes.edu.co::0e1c8319-9d93-42bd-95ed-f63e83f638a1" providerId="AD" clId="Web-{78E1A115-80C1-A3A3-521C-0335BA36D7EF}" dt="2025-09-02T04:59:04.142" v="90" actId="20577"/>
-        <pc:sldMkLst>
-          <pc:docMk/>
-          <pc:sldMk cId="866889576" sldId="483"/>
-        </pc:sldMkLst>
-        <pc:spChg chg="mod">
-          <ac:chgData name="Brayan Felipe Rojas Bernal" userId="S::b.rojasb@uniandes.edu.co::0e1c8319-9d93-42bd-95ed-f63e83f638a1" providerId="AD" clId="Web-{78E1A115-80C1-A3A3-521C-0335BA36D7EF}" dt="2025-09-02T04:50:31.822" v="10" actId="1076"/>
-          <ac:spMkLst>
-            <pc:docMk/>
-            <pc:sldMk cId="866889576" sldId="483"/>
-            <ac:spMk id="8" creationId="{281E5B3D-85CE-5DC4-9DBF-BA8C89200656}"/>
-          </ac:spMkLst>
-        </pc:spChg>
-        <pc:spChg chg="mod">
-          <ac:chgData name="Brayan Felipe Rojas Bernal" userId="S::b.rojasb@uniandes.edu.co::0e1c8319-9d93-42bd-95ed-f63e83f638a1" providerId="AD" clId="Web-{78E1A115-80C1-A3A3-521C-0335BA36D7EF}" dt="2025-09-02T04:50:14.462" v="7" actId="14100"/>
-          <ac:spMkLst>
-            <pc:docMk/>
-            <pc:sldMk cId="866889576" sldId="483"/>
-            <ac:spMk id="9" creationId="{920F8023-41E5-01A6-67CC-C0913E2D1A54}"/>
-          </ac:spMkLst>
-        </pc:spChg>
-        <pc:spChg chg="mod">
-          <ac:chgData name="Brayan Felipe Rojas Bernal" userId="S::b.rojasb@uniandes.edu.co::0e1c8319-9d93-42bd-95ed-f63e83f638a1" providerId="AD" clId="Web-{78E1A115-80C1-A3A3-521C-0335BA36D7EF}" dt="2025-09-02T04:59:04.142" v="90" actId="20577"/>
-          <ac:spMkLst>
-            <pc:docMk/>
-            <pc:sldMk cId="866889576" sldId="483"/>
-            <ac:spMk id="13" creationId="{FDF11067-DB84-C2A9-7FC9-6B8D8C7A3E1D}"/>
-          </ac:spMkLst>
-        </pc:spChg>
-        <pc:grpChg chg="mod">
-          <ac:chgData name="Brayan Felipe Rojas Bernal" userId="S::b.rojasb@uniandes.edu.co::0e1c8319-9d93-42bd-95ed-f63e83f638a1" providerId="AD" clId="Web-{78E1A115-80C1-A3A3-521C-0335BA36D7EF}" dt="2025-09-02T04:50:59.807" v="13" actId="14100"/>
-          <ac:grpSpMkLst>
-            <pc:docMk/>
-            <pc:sldMk cId="866889576" sldId="483"/>
-            <ac:grpSpMk id="14" creationId="{BBFAD93D-B4CC-F197-99E0-9491EEFE9B85}"/>
-          </ac:grpSpMkLst>
-        </pc:grpChg>
-      </pc:sldChg>
-      <pc:sldChg chg="addSp delSp modSp add replId">
-        <pc:chgData name="Brayan Felipe Rojas Bernal" userId="S::b.rojasb@uniandes.edu.co::0e1c8319-9d93-42bd-95ed-f63e83f638a1" providerId="AD" clId="Web-{78E1A115-80C1-A3A3-521C-0335BA36D7EF}" dt="2025-09-02T05:27:00.769" v="248" actId="20577"/>
-        <pc:sldMkLst>
-          <pc:docMk/>
-          <pc:sldMk cId="2874359720" sldId="484"/>
-        </pc:sldMkLst>
-        <pc:spChg chg="add mod">
-          <ac:chgData name="Brayan Felipe Rojas Bernal" userId="S::b.rojasb@uniandes.edu.co::0e1c8319-9d93-42bd-95ed-f63e83f638a1" providerId="AD" clId="Web-{78E1A115-80C1-A3A3-521C-0335BA36D7EF}" dt="2025-09-02T04:59:55.678" v="140" actId="1076"/>
-          <ac:spMkLst>
-            <pc:docMk/>
-            <pc:sldMk cId="2874359720" sldId="484"/>
-            <ac:spMk id="2" creationId="{E93686AA-B7DE-56D0-5EED-DE77719283F2}"/>
-          </ac:spMkLst>
-        </pc:spChg>
-        <pc:spChg chg="add mod">
-          <ac:chgData name="Brayan Felipe Rojas Bernal" userId="S::b.rojasb@uniandes.edu.co::0e1c8319-9d93-42bd-95ed-f63e83f638a1" providerId="AD" clId="Web-{78E1A115-80C1-A3A3-521C-0335BA36D7EF}" dt="2025-09-02T05:27:00.769" v="248" actId="20577"/>
-          <ac:spMkLst>
-            <pc:docMk/>
-            <pc:sldMk cId="2874359720" sldId="484"/>
-            <ac:spMk id="5" creationId="{445317F2-A079-7D07-5B27-3EC465DDAD9C}"/>
-          </ac:spMkLst>
-        </pc:spChg>
-        <pc:spChg chg="mod">
-          <ac:chgData name="Brayan Felipe Rojas Bernal" userId="S::b.rojasb@uniandes.edu.co::0e1c8319-9d93-42bd-95ed-f63e83f638a1" providerId="AD" clId="Web-{78E1A115-80C1-A3A3-521C-0335BA36D7EF}" dt="2025-09-02T04:55:03.250" v="55" actId="20577"/>
-          <ac:spMkLst>
-            <pc:docMk/>
-            <pc:sldMk cId="2874359720" sldId="484"/>
-            <ac:spMk id="8" creationId="{5BCE38A4-A098-7918-7E8E-769238A17DB9}"/>
-          </ac:spMkLst>
-        </pc:spChg>
-        <pc:graphicFrameChg chg="del mod">
-          <ac:chgData name="Brayan Felipe Rojas Bernal" userId="S::b.rojasb@uniandes.edu.co::0e1c8319-9d93-42bd-95ed-f63e83f638a1" providerId="AD" clId="Web-{78E1A115-80C1-A3A3-521C-0335BA36D7EF}" dt="2025-09-02T04:53:42.453" v="23"/>
-          <ac:graphicFrameMkLst>
-            <pc:docMk/>
-            <pc:sldMk cId="2874359720" sldId="484"/>
-            <ac:graphicFrameMk id="9" creationId="{DFEC6D58-181A-7220-F3CF-6A2AE223A728}"/>
-          </ac:graphicFrameMkLst>
-        </pc:graphicFrameChg>
-        <pc:picChg chg="add del mod">
-          <ac:chgData name="Brayan Felipe Rojas Bernal" userId="S::b.rojasb@uniandes.edu.co::0e1c8319-9d93-42bd-95ed-f63e83f638a1" providerId="AD" clId="Web-{78E1A115-80C1-A3A3-521C-0335BA36D7EF}" dt="2025-09-02T05:26:39.847" v="241"/>
-          <ac:picMkLst>
-            <pc:docMk/>
-            <pc:sldMk cId="2874359720" sldId="484"/>
-            <ac:picMk id="4" creationId="{94A79394-42CA-4B96-777D-CBB5262AF1BA}"/>
-          </ac:picMkLst>
-        </pc:picChg>
-        <pc:picChg chg="add mod">
-          <ac:chgData name="Brayan Felipe Rojas Bernal" userId="S::b.rojasb@uniandes.edu.co::0e1c8319-9d93-42bd-95ed-f63e83f638a1" providerId="AD" clId="Web-{78E1A115-80C1-A3A3-521C-0335BA36D7EF}" dt="2025-09-02T05:26:48.472" v="244" actId="1076"/>
-          <ac:picMkLst>
-            <pc:docMk/>
-            <pc:sldMk cId="2874359720" sldId="484"/>
-            <ac:picMk id="7" creationId="{9AFC4D02-B2C8-B46D-17DB-C2943FB3B317}"/>
-          </ac:picMkLst>
-        </pc:picChg>
-      </pc:sldChg>
-      <pc:sldChg chg="addSp delSp modSp add replId">
-        <pc:chgData name="Brayan Felipe Rojas Bernal" userId="S::b.rojasb@uniandes.edu.co::0e1c8319-9d93-42bd-95ed-f63e83f638a1" providerId="AD" clId="Web-{78E1A115-80C1-A3A3-521C-0335BA36D7EF}" dt="2025-09-02T05:23:40.549" v="240" actId="20577"/>
-        <pc:sldMkLst>
-          <pc:docMk/>
-          <pc:sldMk cId="1698789125" sldId="485"/>
-        </pc:sldMkLst>
-        <pc:spChg chg="mod">
-          <ac:chgData name="Brayan Felipe Rojas Bernal" userId="S::b.rojasb@uniandes.edu.co::0e1c8319-9d93-42bd-95ed-f63e83f638a1" providerId="AD" clId="Web-{78E1A115-80C1-A3A3-521C-0335BA36D7EF}" dt="2025-09-02T05:23:12.643" v="235" actId="20577"/>
-          <ac:spMkLst>
-            <pc:docMk/>
-            <pc:sldMk cId="1698789125" sldId="485"/>
-            <ac:spMk id="2" creationId="{B8B14F63-CAD9-AE0D-AD0E-F1130C2226B0}"/>
-          </ac:spMkLst>
-        </pc:spChg>
-        <pc:spChg chg="mod">
-          <ac:chgData name="Brayan Felipe Rojas Bernal" userId="S::b.rojasb@uniandes.edu.co::0e1c8319-9d93-42bd-95ed-f63e83f638a1" providerId="AD" clId="Web-{78E1A115-80C1-A3A3-521C-0335BA36D7EF}" dt="2025-09-02T05:23:40.549" v="240" actId="20577"/>
-          <ac:spMkLst>
-            <pc:docMk/>
-            <pc:sldMk cId="1698789125" sldId="485"/>
-            <ac:spMk id="5" creationId="{F83E3757-A971-21EE-2A57-3A0C9A67F263}"/>
-          </ac:spMkLst>
-        </pc:spChg>
-        <pc:picChg chg="del">
-          <ac:chgData name="Brayan Felipe Rojas Bernal" userId="S::b.rojasb@uniandes.edu.co::0e1c8319-9d93-42bd-95ed-f63e83f638a1" providerId="AD" clId="Web-{78E1A115-80C1-A3A3-521C-0335BA36D7EF}" dt="2025-09-02T05:22:00.485" v="218"/>
-          <ac:picMkLst>
-            <pc:docMk/>
-            <pc:sldMk cId="1698789125" sldId="485"/>
-            <ac:picMk id="4" creationId="{C2973F52-3A13-AC4F-0122-4A80F028EFBE}"/>
-          </ac:picMkLst>
-        </pc:picChg>
-        <pc:picChg chg="add del mod">
-          <ac:chgData name="Brayan Felipe Rojas Bernal" userId="S::b.rojasb@uniandes.edu.co::0e1c8319-9d93-42bd-95ed-f63e83f638a1" providerId="AD" clId="Web-{78E1A115-80C1-A3A3-521C-0335BA36D7EF}" dt="2025-09-02T05:22:08.392" v="221"/>
-          <ac:picMkLst>
-            <pc:docMk/>
-            <pc:sldMk cId="1698789125" sldId="485"/>
-            <ac:picMk id="7" creationId="{8700B0FF-FE01-A6AB-DA64-23E11F177721}"/>
-          </ac:picMkLst>
-        </pc:picChg>
-        <pc:picChg chg="add mod">
-          <ac:chgData name="Brayan Felipe Rojas Bernal" userId="S::b.rojasb@uniandes.edu.co::0e1c8319-9d93-42bd-95ed-f63e83f638a1" providerId="AD" clId="Web-{78E1A115-80C1-A3A3-521C-0335BA36D7EF}" dt="2025-09-02T05:22:55.252" v="224" actId="1076"/>
-          <ac:picMkLst>
-            <pc:docMk/>
-            <pc:sldMk cId="1698789125" sldId="485"/>
-            <ac:picMk id="9" creationId="{CC66C2B4-C286-F1E8-D22A-57A07291ED64}"/>
-          </ac:picMkLst>
-        </pc:picChg>
-      </pc:sldChg>
-      <pc:sldChg chg="addSp delSp modSp add replId">
-        <pc:chgData name="Brayan Felipe Rojas Bernal" userId="S::b.rojasb@uniandes.edu.co::0e1c8319-9d93-42bd-95ed-f63e83f638a1" providerId="AD" clId="Web-{78E1A115-80C1-A3A3-521C-0335BA36D7EF}" dt="2025-09-02T05:40:48.797" v="268" actId="1076"/>
-        <pc:sldMkLst>
-          <pc:docMk/>
-          <pc:sldMk cId="665455168" sldId="486"/>
-        </pc:sldMkLst>
-        <pc:spChg chg="mod">
-          <ac:chgData name="Brayan Felipe Rojas Bernal" userId="S::b.rojasb@uniandes.edu.co::0e1c8319-9d93-42bd-95ed-f63e83f638a1" providerId="AD" clId="Web-{78E1A115-80C1-A3A3-521C-0335BA36D7EF}" dt="2025-09-02T05:40:37.907" v="264" actId="14100"/>
-          <ac:spMkLst>
-            <pc:docMk/>
-            <pc:sldMk cId="665455168" sldId="486"/>
-            <ac:spMk id="2" creationId="{6BCAE436-5F1D-F8FA-E81B-0155711F6CF7}"/>
-          </ac:spMkLst>
-        </pc:spChg>
-        <pc:picChg chg="add mod">
-          <ac:chgData name="Brayan Felipe Rojas Bernal" userId="S::b.rojasb@uniandes.edu.co::0e1c8319-9d93-42bd-95ed-f63e83f638a1" providerId="AD" clId="Web-{78E1A115-80C1-A3A3-521C-0335BA36D7EF}" dt="2025-09-02T05:40:48.797" v="268" actId="1076"/>
-          <ac:picMkLst>
-            <pc:docMk/>
-            <pc:sldMk cId="665455168" sldId="486"/>
-            <ac:picMk id="4" creationId="{8BF9E78C-3948-92C7-7AC7-38048C3CB79D}"/>
-          </ac:picMkLst>
-        </pc:picChg>
-        <pc:picChg chg="del">
-          <ac:chgData name="Brayan Felipe Rojas Bernal" userId="S::b.rojasb@uniandes.edu.co::0e1c8319-9d93-42bd-95ed-f63e83f638a1" providerId="AD" clId="Web-{78E1A115-80C1-A3A3-521C-0335BA36D7EF}" dt="2025-09-02T05:40:41.875" v="265"/>
-          <ac:picMkLst>
-            <pc:docMk/>
-            <pc:sldMk cId="665455168" sldId="486"/>
-            <ac:picMk id="9" creationId="{66514773-B7FE-7D27-8157-74D702A4432F}"/>
-          </ac:picMkLst>
-        </pc:picChg>
-      </pc:sldChg>
-    </pc:docChg>
-  </pc:docChgLst>
-  <pc:docChgLst>
-    <pc:chgData name="Camilo Alejandro Nossa Calderon" userId="S::c.nossa@uniandes.edu.co::2aab6646-8111-4774-b23e-f2fd5229594e" providerId="AD" clId="Web-{E1197103-D5D8-11E3-89E8-757975F27206}"/>
-    <pc:docChg chg="addSld modSld">
-      <pc:chgData name="Camilo Alejandro Nossa Calderon" userId="S::c.nossa@uniandes.edu.co::2aab6646-8111-4774-b23e-f2fd5229594e" providerId="AD" clId="Web-{E1197103-D5D8-11E3-89E8-757975F27206}" dt="2025-09-02T05:04:55.801" v="100" actId="20577"/>
-      <pc:docMkLst>
-        <pc:docMk/>
-      </pc:docMkLst>
-      <pc:sldChg chg="modSp">
-        <pc:chgData name="Camilo Alejandro Nossa Calderon" userId="S::c.nossa@uniandes.edu.co::2aab6646-8111-4774-b23e-f2fd5229594e" providerId="AD" clId="Web-{E1197103-D5D8-11E3-89E8-757975F27206}" dt="2025-09-02T04:39:32.594" v="35" actId="20577"/>
-        <pc:sldMkLst>
-          <pc:docMk/>
-          <pc:sldMk cId="4038774577" sldId="477"/>
-        </pc:sldMkLst>
-        <pc:spChg chg="mod">
-          <ac:chgData name="Camilo Alejandro Nossa Calderon" userId="S::c.nossa@uniandes.edu.co::2aab6646-8111-4774-b23e-f2fd5229594e" providerId="AD" clId="Web-{E1197103-D5D8-11E3-89E8-757975F27206}" dt="2025-09-02T04:39:32.594" v="35" actId="20577"/>
-          <ac:spMkLst>
-            <pc:docMk/>
-            <pc:sldMk cId="4038774577" sldId="477"/>
-            <ac:spMk id="7" creationId="{521CF45E-FFFC-502F-347D-EA542C593FE7}"/>
-          </ac:spMkLst>
-        </pc:spChg>
-      </pc:sldChg>
-      <pc:sldChg chg="addSp modSp">
-        <pc:chgData name="Camilo Alejandro Nossa Calderon" userId="S::c.nossa@uniandes.edu.co::2aab6646-8111-4774-b23e-f2fd5229594e" providerId="AD" clId="Web-{E1197103-D5D8-11E3-89E8-757975F27206}" dt="2025-09-02T04:37:00.571" v="26" actId="1076"/>
-        <pc:sldMkLst>
-          <pc:docMk/>
-          <pc:sldMk cId="1446356416" sldId="479"/>
-        </pc:sldMkLst>
-        <pc:spChg chg="mod ord">
-          <ac:chgData name="Camilo Alejandro Nossa Calderon" userId="S::c.nossa@uniandes.edu.co::2aab6646-8111-4774-b23e-f2fd5229594e" providerId="AD" clId="Web-{E1197103-D5D8-11E3-89E8-757975F27206}" dt="2025-09-02T04:36:33.194" v="19"/>
-          <ac:spMkLst>
-            <pc:docMk/>
-            <pc:sldMk cId="1446356416" sldId="479"/>
-            <ac:spMk id="3" creationId="{B8D06B53-9801-43FF-3C5D-DCAD0DB3165D}"/>
-          </ac:spMkLst>
-        </pc:spChg>
-        <pc:spChg chg="mod ord">
-          <ac:chgData name="Camilo Alejandro Nossa Calderon" userId="S::c.nossa@uniandes.edu.co::2aab6646-8111-4774-b23e-f2fd5229594e" providerId="AD" clId="Web-{E1197103-D5D8-11E3-89E8-757975F27206}" dt="2025-09-02T04:36:33.194" v="19"/>
-          <ac:spMkLst>
-            <pc:docMk/>
-            <pc:sldMk cId="1446356416" sldId="479"/>
-            <ac:spMk id="6" creationId="{E1292BA6-9E4A-705B-71DB-740DAA321743}"/>
-          </ac:spMkLst>
-        </pc:spChg>
-        <pc:spChg chg="mod">
-          <ac:chgData name="Camilo Alejandro Nossa Calderon" userId="S::c.nossa@uniandes.edu.co::2aab6646-8111-4774-b23e-f2fd5229594e" providerId="AD" clId="Web-{E1197103-D5D8-11E3-89E8-757975F27206}" dt="2025-09-02T04:36:33.194" v="19"/>
-          <ac:spMkLst>
-            <pc:docMk/>
-            <pc:sldMk cId="1446356416" sldId="479"/>
-            <ac:spMk id="7" creationId="{6C2A64F7-21DA-14DB-83BC-306E861DB0B1}"/>
-          </ac:spMkLst>
-        </pc:spChg>
-        <pc:picChg chg="add mod">
-          <ac:chgData name="Camilo Alejandro Nossa Calderon" userId="S::c.nossa@uniandes.edu.co::2aab6646-8111-4774-b23e-f2fd5229594e" providerId="AD" clId="Web-{E1197103-D5D8-11E3-89E8-757975F27206}" dt="2025-09-02T04:37:00.571" v="26" actId="1076"/>
-          <ac:picMkLst>
-            <pc:docMk/>
-            <pc:sldMk cId="1446356416" sldId="479"/>
-            <ac:picMk id="2" creationId="{F4A48EC1-A620-0F43-7392-63891325E29E}"/>
-          </ac:picMkLst>
-        </pc:picChg>
-      </pc:sldChg>
-      <pc:sldChg chg="delSp modSp">
-        <pc:chgData name="Camilo Alejandro Nossa Calderon" userId="S::c.nossa@uniandes.edu.co::2aab6646-8111-4774-b23e-f2fd5229594e" providerId="AD" clId="Web-{E1197103-D5D8-11E3-89E8-757975F27206}" dt="2025-09-02T04:41:50.614" v="48"/>
-        <pc:sldMkLst>
-          <pc:docMk/>
-          <pc:sldMk cId="1316333021" sldId="482"/>
-        </pc:sldMkLst>
-        <pc:spChg chg="mod">
-          <ac:chgData name="Camilo Alejandro Nossa Calderon" userId="S::c.nossa@uniandes.edu.co::2aab6646-8111-4774-b23e-f2fd5229594e" providerId="AD" clId="Web-{E1197103-D5D8-11E3-89E8-757975F27206}" dt="2025-09-02T04:34:17.398" v="9" actId="20577"/>
-          <ac:spMkLst>
-            <pc:docMk/>
-            <pc:sldMk cId="1316333021" sldId="482"/>
-            <ac:spMk id="8" creationId="{41FCA9EC-2B4F-61E0-2120-7AEB26B1810B}"/>
-          </ac:spMkLst>
-        </pc:spChg>
-        <pc:picChg chg="del">
-          <ac:chgData name="Camilo Alejandro Nossa Calderon" userId="S::c.nossa@uniandes.edu.co::2aab6646-8111-4774-b23e-f2fd5229594e" providerId="AD" clId="Web-{E1197103-D5D8-11E3-89E8-757975F27206}" dt="2025-09-02T04:41:50.614" v="48"/>
-          <ac:picMkLst>
-            <pc:docMk/>
-            <pc:sldMk cId="1316333021" sldId="482"/>
-            <ac:picMk id="31" creationId="{6FFC862E-1FBC-3911-42C7-64C14610EF07}"/>
-          </ac:picMkLst>
-        </pc:picChg>
-      </pc:sldChg>
-      <pc:sldChg chg="addSp delSp modSp add replId">
-        <pc:chgData name="Camilo Alejandro Nossa Calderon" userId="S::c.nossa@uniandes.edu.co::2aab6646-8111-4774-b23e-f2fd5229594e" providerId="AD" clId="Web-{E1197103-D5D8-11E3-89E8-757975F27206}" dt="2025-09-02T04:55:29.380" v="97" actId="20577"/>
-        <pc:sldMkLst>
-          <pc:docMk/>
-          <pc:sldMk cId="866889576" sldId="483"/>
-        </pc:sldMkLst>
-        <pc:spChg chg="del">
-          <ac:chgData name="Camilo Alejandro Nossa Calderon" userId="S::c.nossa@uniandes.edu.co::2aab6646-8111-4774-b23e-f2fd5229594e" providerId="AD" clId="Web-{E1197103-D5D8-11E3-89E8-757975F27206}" dt="2025-09-02T04:29:59.268" v="4"/>
-          <ac:spMkLst>
-            <pc:docMk/>
-            <pc:sldMk cId="866889576" sldId="483"/>
-            <ac:spMk id="2" creationId="{F79F9C68-268D-4773-B26E-4EE896DE8B5F}"/>
-          </ac:spMkLst>
-        </pc:spChg>
-        <pc:spChg chg="del">
-          <ac:chgData name="Camilo Alejandro Nossa Calderon" userId="S::c.nossa@uniandes.edu.co::2aab6646-8111-4774-b23e-f2fd5229594e" providerId="AD" clId="Web-{E1197103-D5D8-11E3-89E8-757975F27206}" dt="2025-09-02T04:30:03.175" v="5"/>
-          <ac:spMkLst>
-            <pc:docMk/>
-            <pc:sldMk cId="866889576" sldId="483"/>
-            <ac:spMk id="5" creationId="{66A79521-89C9-B918-5784-29CCFD0AAC6C}"/>
-          </ac:spMkLst>
-        </pc:spChg>
-        <pc:spChg chg="del mod">
-          <ac:chgData name="Camilo Alejandro Nossa Calderon" userId="S::c.nossa@uniandes.edu.co::2aab6646-8111-4774-b23e-f2fd5229594e" providerId="AD" clId="Web-{E1197103-D5D8-11E3-89E8-757975F27206}" dt="2025-09-02T04:29:57.378" v="3"/>
-          <ac:spMkLst>
-            <pc:docMk/>
-            <pc:sldMk cId="866889576" sldId="483"/>
-            <ac:spMk id="8" creationId="{0110397D-3523-B88E-9B6C-7C61024F5DBE}"/>
-          </ac:spMkLst>
-        </pc:spChg>
-        <pc:spChg chg="mod">
-          <ac:chgData name="Camilo Alejandro Nossa Calderon" userId="S::c.nossa@uniandes.edu.co::2aab6646-8111-4774-b23e-f2fd5229594e" providerId="AD" clId="Web-{E1197103-D5D8-11E3-89E8-757975F27206}" dt="2025-09-02T04:54:59.192" v="86" actId="20577"/>
-          <ac:spMkLst>
-            <pc:docMk/>
-            <pc:sldMk cId="866889576" sldId="483"/>
-            <ac:spMk id="8" creationId="{281E5B3D-85CE-5DC4-9DBF-BA8C89200656}"/>
-          </ac:spMkLst>
-        </pc:spChg>
-        <pc:spChg chg="mod">
-          <ac:chgData name="Camilo Alejandro Nossa Calderon" userId="S::c.nossa@uniandes.edu.co::2aab6646-8111-4774-b23e-f2fd5229594e" providerId="AD" clId="Web-{E1197103-D5D8-11E3-89E8-757975F27206}" dt="2025-09-02T04:54:36.552" v="72" actId="20577"/>
-          <ac:spMkLst>
-            <pc:docMk/>
-            <pc:sldMk cId="866889576" sldId="483"/>
-            <ac:spMk id="9" creationId="{920F8023-41E5-01A6-67CC-C0913E2D1A54}"/>
-          </ac:spMkLst>
-        </pc:spChg>
-        <pc:spChg chg="add del">
-          <ac:chgData name="Camilo Alejandro Nossa Calderon" userId="S::c.nossa@uniandes.edu.co::2aab6646-8111-4774-b23e-f2fd5229594e" providerId="AD" clId="Web-{E1197103-D5D8-11E3-89E8-757975F27206}" dt="2025-09-02T04:37:19.963" v="31"/>
-          <ac:spMkLst>
-            <pc:docMk/>
-            <pc:sldMk cId="866889576" sldId="483"/>
-            <ac:spMk id="13" creationId="{6A2D209A-ACC5-8E69-6E66-05B185885BB0}"/>
-          </ac:spMkLst>
-        </pc:spChg>
-        <pc:spChg chg="add mod">
-          <ac:chgData name="Camilo Alejandro Nossa Calderon" userId="S::c.nossa@uniandes.edu.co::2aab6646-8111-4774-b23e-f2fd5229594e" providerId="AD" clId="Web-{E1197103-D5D8-11E3-89E8-757975F27206}" dt="2025-09-02T04:55:29.380" v="97" actId="20577"/>
-          <ac:spMkLst>
-            <pc:docMk/>
-            <pc:sldMk cId="866889576" sldId="483"/>
-            <ac:spMk id="13" creationId="{FDF11067-DB84-C2A9-7FC9-6B8D8C7A3E1D}"/>
-          </ac:spMkLst>
-        </pc:spChg>
-        <pc:spChg chg="add del mod">
-          <ac:chgData name="Camilo Alejandro Nossa Calderon" userId="S::c.nossa@uniandes.edu.co::2aab6646-8111-4774-b23e-f2fd5229594e" providerId="AD" clId="Web-{E1197103-D5D8-11E3-89E8-757975F27206}" dt="2025-09-02T04:37:17.900" v="30"/>
-          <ac:spMkLst>
-            <pc:docMk/>
-            <pc:sldMk cId="866889576" sldId="483"/>
-            <ac:spMk id="15" creationId="{C7ABAF76-1A87-C286-1BC1-FDF08F9EA494}"/>
-          </ac:spMkLst>
-        </pc:spChg>
-        <pc:grpChg chg="add del mod">
-          <ac:chgData name="Camilo Alejandro Nossa Calderon" userId="S::c.nossa@uniandes.edu.co::2aab6646-8111-4774-b23e-f2fd5229594e" providerId="AD" clId="Web-{E1197103-D5D8-11E3-89E8-757975F27206}" dt="2025-09-02T04:54:59.692" v="87"/>
-          <ac:grpSpMkLst>
-            <pc:docMk/>
-            <pc:sldMk cId="866889576" sldId="483"/>
-            <ac:grpSpMk id="14" creationId="{BBFAD93D-B4CC-F197-99E0-9491EEFE9B85}"/>
-          </ac:grpSpMkLst>
-        </pc:grpChg>
-        <pc:picChg chg="mod">
-          <ac:chgData name="Camilo Alejandro Nossa Calderon" userId="S::c.nossa@uniandes.edu.co::2aab6646-8111-4774-b23e-f2fd5229594e" providerId="AD" clId="Web-{E1197103-D5D8-11E3-89E8-757975F27206}" dt="2025-09-02T04:41:39.989" v="46" actId="1076"/>
-          <ac:picMkLst>
-            <pc:docMk/>
-            <pc:sldMk cId="866889576" sldId="483"/>
-            <ac:picMk id="2" creationId="{6E053FC1-4348-B868-B975-119764789A40}"/>
-          </ac:picMkLst>
-        </pc:picChg>
-        <pc:picChg chg="del">
-          <ac:chgData name="Camilo Alejandro Nossa Calderon" userId="S::c.nossa@uniandes.edu.co::2aab6646-8111-4774-b23e-f2fd5229594e" providerId="AD" clId="Web-{E1197103-D5D8-11E3-89E8-757975F27206}" dt="2025-09-02T04:30:03.175" v="6"/>
-          <ac:picMkLst>
-            <pc:docMk/>
-            <pc:sldMk cId="866889576" sldId="483"/>
-            <ac:picMk id="4" creationId="{3FD44677-B8F8-EEA6-8FDC-0E5C11D30DA8}"/>
-          </ac:picMkLst>
-        </pc:picChg>
-        <pc:picChg chg="mod">
-          <ac:chgData name="Camilo Alejandro Nossa Calderon" userId="S::c.nossa@uniandes.edu.co::2aab6646-8111-4774-b23e-f2fd5229594e" providerId="AD" clId="Web-{E1197103-D5D8-11E3-89E8-757975F27206}" dt="2025-09-02T04:35:03.245" v="16" actId="1076"/>
-          <ac:picMkLst>
-            <pc:docMk/>
-            <pc:sldMk cId="866889576" sldId="483"/>
-            <ac:picMk id="9" creationId="{85F8D5FC-6002-AAD8-40DD-7D7D025B60CA}"/>
-          </ac:picMkLst>
-        </pc:picChg>
-        <pc:picChg chg="mod">
-          <ac:chgData name="Camilo Alejandro Nossa Calderon" userId="S::c.nossa@uniandes.edu.co::2aab6646-8111-4774-b23e-f2fd5229594e" providerId="AD" clId="Web-{E1197103-D5D8-11E3-89E8-757975F27206}" dt="2025-09-02T04:53:35.692" v="52" actId="1076"/>
-          <ac:picMkLst>
-            <pc:docMk/>
-            <pc:sldMk cId="866889576" sldId="483"/>
-            <ac:picMk id="10" creationId="{FB89661D-D2B5-9AB5-8F62-DA62E840A241}"/>
-          </ac:picMkLst>
-        </pc:picChg>
-        <pc:picChg chg="add del">
-          <ac:chgData name="Camilo Alejandro Nossa Calderon" userId="S::c.nossa@uniandes.edu.co::2aab6646-8111-4774-b23e-f2fd5229594e" providerId="AD" clId="Web-{E1197103-D5D8-11E3-89E8-757975F27206}" dt="2025-09-02T04:37:19.963" v="32"/>
-          <ac:picMkLst>
-            <pc:docMk/>
-            <pc:sldMk cId="866889576" sldId="483"/>
-            <ac:picMk id="11" creationId="{8064C370-85FB-1AD9-9B0B-3E77244FD524}"/>
-          </ac:picMkLst>
-        </pc:picChg>
-        <pc:picChg chg="del">
-          <ac:chgData name="Camilo Alejandro Nossa Calderon" userId="S::c.nossa@uniandes.edu.co::2aab6646-8111-4774-b23e-f2fd5229594e" providerId="AD" clId="Web-{E1197103-D5D8-11E3-89E8-757975F27206}" dt="2025-09-02T04:53:53.958" v="59"/>
-          <ac:picMkLst>
-            <pc:docMk/>
-            <pc:sldMk cId="866889576" sldId="483"/>
-            <ac:picMk id="12" creationId="{DA8CD3B6-3F82-5DD7-D749-66FE2301CE93}"/>
-          </ac:picMkLst>
-        </pc:picChg>
-        <pc:picChg chg="add mod">
-          <ac:chgData name="Camilo Alejandro Nossa Calderon" userId="S::c.nossa@uniandes.edu.co::2aab6646-8111-4774-b23e-f2fd5229594e" providerId="AD" clId="Web-{E1197103-D5D8-11E3-89E8-757975F27206}" dt="2025-09-02T04:55:08.349" v="89" actId="1076"/>
-          <ac:picMkLst>
-            <pc:docMk/>
-            <pc:sldMk cId="866889576" sldId="483"/>
-            <ac:picMk id="17" creationId="{CC983B16-6FF0-BC5D-2EED-51DAC0B4409D}"/>
-          </ac:picMkLst>
-        </pc:picChg>
-      </pc:sldChg>
-      <pc:sldChg chg="modSp">
-        <pc:chgData name="Camilo Alejandro Nossa Calderon" userId="S::c.nossa@uniandes.edu.co::2aab6646-8111-4774-b23e-f2fd5229594e" providerId="AD" clId="Web-{E1197103-D5D8-11E3-89E8-757975F27206}" dt="2025-09-02T05:04:55.801" v="100" actId="20577"/>
-        <pc:sldMkLst>
-          <pc:docMk/>
-          <pc:sldMk cId="2874359720" sldId="484"/>
-        </pc:sldMkLst>
-        <pc:spChg chg="mod">
-          <ac:chgData name="Camilo Alejandro Nossa Calderon" userId="S::c.nossa@uniandes.edu.co::2aab6646-8111-4774-b23e-f2fd5229594e" providerId="AD" clId="Web-{E1197103-D5D8-11E3-89E8-757975F27206}" dt="2025-09-02T05:04:55.801" v="100" actId="20577"/>
-          <ac:spMkLst>
-            <pc:docMk/>
-            <pc:sldMk cId="2874359720" sldId="484"/>
-            <ac:spMk id="5" creationId="{445317F2-A079-7D07-5B27-3EC465DDAD9C}"/>
-          </ac:spMkLst>
-        </pc:spChg>
-      </pc:sldChg>
-    </pc:docChg>
-  </pc:docChgLst>
-  <pc:docChgLst>
-    <pc:chgData name="Elmar Santofimio Suarez" userId="S::e.santofimio@uniandes.edu.co::86345d55-0e9d-4882-9f6b-fbf6a9d0ca43" providerId="AD" clId="Web-{24C5AA91-4C7A-C091-B5D9-66B4131D99A5}"/>
-    <pc:docChg chg="addSld modSld">
-      <pc:chgData name="Elmar Santofimio Suarez" userId="S::e.santofimio@uniandes.edu.co::86345d55-0e9d-4882-9f6b-fbf6a9d0ca43" providerId="AD" clId="Web-{24C5AA91-4C7A-C091-B5D9-66B4131D99A5}" dt="2025-09-01T02:22:40.865" v="6"/>
-      <pc:docMkLst>
-        <pc:docMk/>
-      </pc:docMkLst>
-      <pc:sldChg chg="addSp modSp">
-        <pc:chgData name="Elmar Santofimio Suarez" userId="S::e.santofimio@uniandes.edu.co::86345d55-0e9d-4882-9f6b-fbf6a9d0ca43" providerId="AD" clId="Web-{24C5AA91-4C7A-C091-B5D9-66B4131D99A5}" dt="2025-09-01T02:22:22.005" v="4" actId="1076"/>
-        <pc:sldMkLst>
-          <pc:docMk/>
-          <pc:sldMk cId="4288963705" sldId="478"/>
-        </pc:sldMkLst>
-        <pc:picChg chg="add mod">
-          <ac:chgData name="Elmar Santofimio Suarez" userId="S::e.santofimio@uniandes.edu.co::86345d55-0e9d-4882-9f6b-fbf6a9d0ca43" providerId="AD" clId="Web-{24C5AA91-4C7A-C091-B5D9-66B4131D99A5}" dt="2025-09-01T02:22:22.005" v="4" actId="1076"/>
-          <ac:picMkLst>
-            <pc:docMk/>
-            <pc:sldMk cId="4288963705" sldId="478"/>
-            <ac:picMk id="2" creationId="{AE1EE4F7-F4E1-BA9A-4E59-ABF48953B124}"/>
-          </ac:picMkLst>
-        </pc:picChg>
-      </pc:sldChg>
-      <pc:sldChg chg="delSp new">
-        <pc:chgData name="Elmar Santofimio Suarez" userId="S::e.santofimio@uniandes.edu.co::86345d55-0e9d-4882-9f6b-fbf6a9d0ca43" providerId="AD" clId="Web-{24C5AA91-4C7A-C091-B5D9-66B4131D99A5}" dt="2025-09-01T02:22:40.865" v="6"/>
-        <pc:sldMkLst>
-          <pc:docMk/>
-          <pc:sldMk cId="2145844100" sldId="482"/>
-        </pc:sldMkLst>
-        <pc:spChg chg="del">
-          <ac:chgData name="Elmar Santofimio Suarez" userId="S::e.santofimio@uniandes.edu.co::86345d55-0e9d-4882-9f6b-fbf6a9d0ca43" providerId="AD" clId="Web-{24C5AA91-4C7A-C091-B5D9-66B4131D99A5}" dt="2025-09-01T02:22:40.865" v="6"/>
-          <ac:spMkLst>
-            <pc:docMk/>
-            <pc:sldMk cId="2145844100" sldId="482"/>
-            <ac:spMk id="2" creationId="{8B6735CF-4A78-4287-CD0E-C69A26911318}"/>
-          </ac:spMkLst>
-        </pc:spChg>
-      </pc:sldChg>
-    </pc:docChg>
-  </pc:docChgLst>
-  <pc:docChgLst>
-    <pc:chgData name="Carlos Rodríguez" userId="f1dedf0d09b55e6e" providerId="LiveId" clId="{521D7EF0-1FB3-4662-BCD5-642370DF5537}"/>
-    <pc:docChg chg="undo custSel addSld delSld modSld sldOrd">
-      <pc:chgData name="Carlos Rodríguez" userId="f1dedf0d09b55e6e" providerId="LiveId" clId="{521D7EF0-1FB3-4662-BCD5-642370DF5537}" dt="2025-08-30T02:54:35.560" v="499" actId="20577"/>
-      <pc:docMkLst>
-        <pc:docMk/>
-      </pc:docMkLst>
-      <pc:sldChg chg="addSp modSp mod">
-        <pc:chgData name="Carlos Rodríguez" userId="f1dedf0d09b55e6e" providerId="LiveId" clId="{521D7EF0-1FB3-4662-BCD5-642370DF5537}" dt="2025-08-29T23:40:13.825" v="58" actId="1076"/>
-        <pc:sldMkLst>
-          <pc:docMk/>
-          <pc:sldMk cId="4069642230" sldId="256"/>
-        </pc:sldMkLst>
-        <pc:spChg chg="mod">
-          <ac:chgData name="Carlos Rodríguez" userId="f1dedf0d09b55e6e" providerId="LiveId" clId="{521D7EF0-1FB3-4662-BCD5-642370DF5537}" dt="2025-08-29T23:40:07.358" v="57" actId="1076"/>
-          <ac:spMkLst>
-            <pc:docMk/>
-            <pc:sldMk cId="4069642230" sldId="256"/>
-            <ac:spMk id="2" creationId="{00000000-0000-0000-0000-000000000000}"/>
-          </ac:spMkLst>
-        </pc:spChg>
-        <pc:spChg chg="mod">
-          <ac:chgData name="Carlos Rodríguez" userId="f1dedf0d09b55e6e" providerId="LiveId" clId="{521D7EF0-1FB3-4662-BCD5-642370DF5537}" dt="2025-08-29T23:40:13.825" v="58" actId="1076"/>
-          <ac:spMkLst>
-            <pc:docMk/>
-            <pc:sldMk cId="4069642230" sldId="256"/>
-            <ac:spMk id="3" creationId="{00000000-0000-0000-0000-000000000000}"/>
-          </ac:spMkLst>
-        </pc:spChg>
-        <pc:spChg chg="add mod">
-          <ac:chgData name="Carlos Rodríguez" userId="f1dedf0d09b55e6e" providerId="LiveId" clId="{521D7EF0-1FB3-4662-BCD5-642370DF5537}" dt="2025-08-29T23:39:13.372" v="49" actId="313"/>
-          <ac:spMkLst>
-            <pc:docMk/>
-            <pc:sldMk cId="4069642230" sldId="256"/>
-            <ac:spMk id="4" creationId="{4562C3EC-D7CA-2F3A-3FC1-65FAB7734B07}"/>
-          </ac:spMkLst>
-        </pc:spChg>
-      </pc:sldChg>
-      <pc:sldChg chg="modSp mod">
-        <pc:chgData name="Carlos Rodríguez" userId="f1dedf0d09b55e6e" providerId="LiveId" clId="{521D7EF0-1FB3-4662-BCD5-642370DF5537}" dt="2025-08-29T23:57:15.539" v="352"/>
-        <pc:sldMkLst>
-          <pc:docMk/>
-          <pc:sldMk cId="198856905" sldId="432"/>
-        </pc:sldMkLst>
-        <pc:graphicFrameChg chg="mod modGraphic">
-          <ac:chgData name="Carlos Rodríguez" userId="f1dedf0d09b55e6e" providerId="LiveId" clId="{521D7EF0-1FB3-4662-BCD5-642370DF5537}" dt="2025-08-29T23:57:15.539" v="352"/>
-          <ac:graphicFrameMkLst>
-            <pc:docMk/>
-            <pc:sldMk cId="198856905" sldId="432"/>
-            <ac:graphicFrameMk id="9" creationId="{674E3414-D2BA-3D41-BAEC-BDDF5879A1D8}"/>
-          </ac:graphicFrameMkLst>
-        </pc:graphicFrameChg>
-      </pc:sldChg>
-      <pc:sldChg chg="del">
-        <pc:chgData name="Carlos Rodríguez" userId="f1dedf0d09b55e6e" providerId="LiveId" clId="{521D7EF0-1FB3-4662-BCD5-642370DF5537}" dt="2025-08-29T23:58:01.253" v="354" actId="2696"/>
-        <pc:sldMkLst>
-          <pc:docMk/>
-          <pc:sldMk cId="1373323368" sldId="433"/>
-        </pc:sldMkLst>
-      </pc:sldChg>
-      <pc:sldChg chg="del">
-        <pc:chgData name="Carlos Rodríguez" userId="f1dedf0d09b55e6e" providerId="LiveId" clId="{521D7EF0-1FB3-4662-BCD5-642370DF5537}" dt="2025-08-29T23:58:17.836" v="356" actId="2696"/>
-        <pc:sldMkLst>
-          <pc:docMk/>
-          <pc:sldMk cId="1958245087" sldId="434"/>
-        </pc:sldMkLst>
-      </pc:sldChg>
-      <pc:sldChg chg="del">
-        <pc:chgData name="Carlos Rodríguez" userId="f1dedf0d09b55e6e" providerId="LiveId" clId="{521D7EF0-1FB3-4662-BCD5-642370DF5537}" dt="2025-08-29T23:41:40.188" v="59" actId="2696"/>
-        <pc:sldMkLst>
-          <pc:docMk/>
-          <pc:sldMk cId="910794238" sldId="461"/>
-        </pc:sldMkLst>
-      </pc:sldChg>
-      <pc:sldChg chg="addSp delSp modSp mod ord">
-        <pc:chgData name="Carlos Rodríguez" userId="f1dedf0d09b55e6e" providerId="LiveId" clId="{521D7EF0-1FB3-4662-BCD5-642370DF5537}" dt="2025-08-29T23:44:51.838" v="214"/>
-        <pc:sldMkLst>
-          <pc:docMk/>
-          <pc:sldMk cId="687333583" sldId="466"/>
-        </pc:sldMkLst>
-      </pc:sldChg>
-      <pc:sldChg chg="addSp delSp modSp add del mod">
-        <pc:chgData name="Carlos Rodríguez" userId="f1dedf0d09b55e6e" providerId="LiveId" clId="{521D7EF0-1FB3-4662-BCD5-642370DF5537}" dt="2025-08-30T02:54:06.211" v="491" actId="13926"/>
-        <pc:sldMkLst>
-          <pc:docMk/>
-          <pc:sldMk cId="592874193" sldId="467"/>
-        </pc:sldMkLst>
-        <pc:spChg chg="add del mod">
-          <ac:chgData name="Carlos Rodríguez" userId="f1dedf0d09b55e6e" providerId="LiveId" clId="{521D7EF0-1FB3-4662-BCD5-642370DF5537}" dt="2025-08-30T01:05:07.518" v="481" actId="313"/>
-          <ac:spMkLst>
-            <pc:docMk/>
-            <pc:sldMk cId="592874193" sldId="467"/>
-            <ac:spMk id="2" creationId="{64595BA3-335B-ADDC-0BA7-189E3C02448A}"/>
-          </ac:spMkLst>
-        </pc:spChg>
-        <pc:spChg chg="mod">
-          <ac:chgData name="Carlos Rodríguez" userId="f1dedf0d09b55e6e" providerId="LiveId" clId="{521D7EF0-1FB3-4662-BCD5-642370DF5537}" dt="2025-08-29T23:43:32.760" v="114" actId="1036"/>
-          <ac:spMkLst>
-            <pc:docMk/>
-            <pc:sldMk cId="592874193" sldId="467"/>
-            <ac:spMk id="20" creationId="{502190BB-CBFB-C2FF-C363-855B4C22F5BD}"/>
-          </ac:spMkLst>
-        </pc:spChg>
-        <pc:spChg chg="mod">
-          <ac:chgData name="Carlos Rodríguez" userId="f1dedf0d09b55e6e" providerId="LiveId" clId="{521D7EF0-1FB3-4662-BCD5-642370DF5537}" dt="2025-08-29T23:43:32.760" v="114" actId="1036"/>
-          <ac:spMkLst>
-            <pc:docMk/>
-            <pc:sldMk cId="592874193" sldId="467"/>
-            <ac:spMk id="21" creationId="{F73DAA3F-AF89-C555-27FF-0985DB323C92}"/>
-          </ac:spMkLst>
-        </pc:spChg>
-        <pc:graphicFrameChg chg="mod modGraphic">
-          <ac:chgData name="Carlos Rodríguez" userId="f1dedf0d09b55e6e" providerId="LiveId" clId="{521D7EF0-1FB3-4662-BCD5-642370DF5537}" dt="2025-08-30T02:54:06.211" v="491" actId="13926"/>
-          <ac:graphicFrameMkLst>
-            <pc:docMk/>
-            <pc:sldMk cId="592874193" sldId="467"/>
-            <ac:graphicFrameMk id="8" creationId="{8E3EA33B-4F1D-1D8D-2655-02AF6C8C3BB7}"/>
-          </ac:graphicFrameMkLst>
-        </pc:graphicFrameChg>
-        <pc:graphicFrameChg chg="mod">
-          <ac:chgData name="Carlos Rodríguez" userId="f1dedf0d09b55e6e" providerId="LiveId" clId="{521D7EF0-1FB3-4662-BCD5-642370DF5537}" dt="2025-08-29T23:43:32.760" v="114" actId="1036"/>
-          <ac:graphicFrameMkLst>
-            <pc:docMk/>
-            <pc:sldMk cId="592874193" sldId="467"/>
-            <ac:graphicFrameMk id="14" creationId="{E833C5EF-FBD9-2B4E-E6F7-AC71C0760243}"/>
-          </ac:graphicFrameMkLst>
-        </pc:graphicFrameChg>
-        <pc:graphicFrameChg chg="mod">
-          <ac:chgData name="Carlos Rodríguez" userId="f1dedf0d09b55e6e" providerId="LiveId" clId="{521D7EF0-1FB3-4662-BCD5-642370DF5537}" dt="2025-08-29T23:43:32.760" v="114" actId="1036"/>
-          <ac:graphicFrameMkLst>
-            <pc:docMk/>
-            <pc:sldMk cId="592874193" sldId="467"/>
-            <ac:graphicFrameMk id="15" creationId="{B2657318-CE98-EE19-89B2-C1F7160E121F}"/>
-          </ac:graphicFrameMkLst>
-        </pc:graphicFrameChg>
-        <pc:graphicFrameChg chg="mod">
-          <ac:chgData name="Carlos Rodríguez" userId="f1dedf0d09b55e6e" providerId="LiveId" clId="{521D7EF0-1FB3-4662-BCD5-642370DF5537}" dt="2025-08-29T23:43:32.760" v="114" actId="1036"/>
-          <ac:graphicFrameMkLst>
-            <pc:docMk/>
-            <pc:sldMk cId="592874193" sldId="467"/>
-            <ac:graphicFrameMk id="16" creationId="{D660B063-8C58-E99E-44DB-3CF3EDD9EFF7}"/>
-          </ac:graphicFrameMkLst>
-        </pc:graphicFrameChg>
-        <pc:graphicFrameChg chg="mod">
-          <ac:chgData name="Carlos Rodríguez" userId="f1dedf0d09b55e6e" providerId="LiveId" clId="{521D7EF0-1FB3-4662-BCD5-642370DF5537}" dt="2025-08-29T23:43:32.760" v="114" actId="1036"/>
-          <ac:graphicFrameMkLst>
-            <pc:docMk/>
-            <pc:sldMk cId="592874193" sldId="467"/>
-            <ac:graphicFrameMk id="22" creationId="{D1D77F1C-B890-684D-7C8A-EA312B1ABBB3}"/>
-          </ac:graphicFrameMkLst>
-        </pc:graphicFrameChg>
-        <pc:graphicFrameChg chg="mod">
-          <ac:chgData name="Carlos Rodríguez" userId="f1dedf0d09b55e6e" providerId="LiveId" clId="{521D7EF0-1FB3-4662-BCD5-642370DF5537}" dt="2025-08-29T23:43:32.760" v="114" actId="1036"/>
-          <ac:graphicFrameMkLst>
-            <pc:docMk/>
-            <pc:sldMk cId="592874193" sldId="467"/>
-            <ac:graphicFrameMk id="23" creationId="{48C5B24B-6EAD-2C31-AF1E-50610C2ADD7E}"/>
-          </ac:graphicFrameMkLst>
-        </pc:graphicFrameChg>
-        <pc:graphicFrameChg chg="mod">
-          <ac:chgData name="Carlos Rodríguez" userId="f1dedf0d09b55e6e" providerId="LiveId" clId="{521D7EF0-1FB3-4662-BCD5-642370DF5537}" dt="2025-08-29T23:43:32.760" v="114" actId="1036"/>
-          <ac:graphicFrameMkLst>
-            <pc:docMk/>
-            <pc:sldMk cId="592874193" sldId="467"/>
-            <ac:graphicFrameMk id="24" creationId="{CCA9DA9C-C8D3-E28B-D770-76A8FC51FD27}"/>
-          </ac:graphicFrameMkLst>
-        </pc:graphicFrameChg>
-      </pc:sldChg>
-      <pc:sldChg chg="add">
-        <pc:chgData name="Carlos Rodríguez" userId="f1dedf0d09b55e6e" providerId="LiveId" clId="{521D7EF0-1FB3-4662-BCD5-642370DF5537}" dt="2025-08-29T23:54:14.356" v="222"/>
-        <pc:sldMkLst>
-          <pc:docMk/>
-          <pc:sldMk cId="4270332461" sldId="468"/>
-        </pc:sldMkLst>
-      </pc:sldChg>
-      <pc:sldChg chg="add">
-        <pc:chgData name="Carlos Rodríguez" userId="f1dedf0d09b55e6e" providerId="LiveId" clId="{521D7EF0-1FB3-4662-BCD5-642370DF5537}" dt="2025-08-29T23:54:14.356" v="222"/>
-        <pc:sldMkLst>
-          <pc:docMk/>
-          <pc:sldMk cId="2551976890" sldId="469"/>
-        </pc:sldMkLst>
-      </pc:sldChg>
-      <pc:sldChg chg="add">
-        <pc:chgData name="Carlos Rodríguez" userId="f1dedf0d09b55e6e" providerId="LiveId" clId="{521D7EF0-1FB3-4662-BCD5-642370DF5537}" dt="2025-08-29T23:54:14.356" v="222"/>
-        <pc:sldMkLst>
-          <pc:docMk/>
-          <pc:sldMk cId="2963442731" sldId="473"/>
-        </pc:sldMkLst>
-      </pc:sldChg>
-      <pc:sldChg chg="add">
-        <pc:chgData name="Carlos Rodríguez" userId="f1dedf0d09b55e6e" providerId="LiveId" clId="{521D7EF0-1FB3-4662-BCD5-642370DF5537}" dt="2025-08-29T23:57:45.052" v="353"/>
-        <pc:sldMkLst>
-          <pc:docMk/>
-          <pc:sldMk cId="2607037317" sldId="474"/>
-        </pc:sldMkLst>
-      </pc:sldChg>
-      <pc:sldChg chg="add">
-        <pc:chgData name="Carlos Rodríguez" userId="f1dedf0d09b55e6e" providerId="LiveId" clId="{521D7EF0-1FB3-4662-BCD5-642370DF5537}" dt="2025-08-29T23:58:14.088" v="355"/>
-        <pc:sldMkLst>
-          <pc:docMk/>
-          <pc:sldMk cId="2639478463" sldId="475"/>
-        </pc:sldMkLst>
-      </pc:sldChg>
-      <pc:sldChg chg="addSp delSp modSp add mod">
-        <pc:chgData name="Carlos Rodríguez" userId="f1dedf0d09b55e6e" providerId="LiveId" clId="{521D7EF0-1FB3-4662-BCD5-642370DF5537}" dt="2025-08-29T23:59:34.890" v="392" actId="1036"/>
-        <pc:sldMkLst>
-          <pc:docMk/>
-          <pc:sldMk cId="2983963519" sldId="476"/>
-        </pc:sldMkLst>
-        <pc:spChg chg="add del mod">
-          <ac:chgData name="Carlos Rodríguez" userId="f1dedf0d09b55e6e" providerId="LiveId" clId="{521D7EF0-1FB3-4662-BCD5-642370DF5537}" dt="2025-08-29T23:59:34.890" v="392" actId="1036"/>
-          <ac:spMkLst>
-            <pc:docMk/>
-            <pc:sldMk cId="2983963519" sldId="476"/>
-            <ac:spMk id="7" creationId="{218E002B-5F16-AF8E-D18E-6539578CE088}"/>
-          </ac:spMkLst>
-        </pc:spChg>
-      </pc:sldChg>
-      <pc:sldChg chg="modSp add mod">
-        <pc:chgData name="Carlos Rodríguez" userId="f1dedf0d09b55e6e" providerId="LiveId" clId="{521D7EF0-1FB3-4662-BCD5-642370DF5537}" dt="2025-08-29T23:59:59.496" v="447" actId="20577"/>
-        <pc:sldMkLst>
-          <pc:docMk/>
-          <pc:sldMk cId="4038774577" sldId="477"/>
-        </pc:sldMkLst>
-        <pc:spChg chg="mod">
-          <ac:chgData name="Carlos Rodríguez" userId="f1dedf0d09b55e6e" providerId="LiveId" clId="{521D7EF0-1FB3-4662-BCD5-642370DF5537}" dt="2025-08-29T23:59:59.496" v="447" actId="20577"/>
-          <ac:spMkLst>
-            <pc:docMk/>
-            <pc:sldMk cId="4038774577" sldId="477"/>
-            <ac:spMk id="7" creationId="{521CF45E-FFFC-502F-347D-EA542C593FE7}"/>
-          </ac:spMkLst>
-        </pc:spChg>
-      </pc:sldChg>
-      <pc:sldChg chg="modSp add mod">
-        <pc:chgData name="Carlos Rodríguez" userId="f1dedf0d09b55e6e" providerId="LiveId" clId="{521D7EF0-1FB3-4662-BCD5-642370DF5537}" dt="2025-08-30T00:00:08.864" v="458" actId="20577"/>
-        <pc:sldMkLst>
-          <pc:docMk/>
-          <pc:sldMk cId="4288963705" sldId="478"/>
-        </pc:sldMkLst>
-        <pc:spChg chg="mod">
-          <ac:chgData name="Carlos Rodríguez" userId="f1dedf0d09b55e6e" providerId="LiveId" clId="{521D7EF0-1FB3-4662-BCD5-642370DF5537}" dt="2025-08-30T00:00:08.864" v="458" actId="20577"/>
-          <ac:spMkLst>
-            <pc:docMk/>
-            <pc:sldMk cId="4288963705" sldId="478"/>
-            <ac:spMk id="7" creationId="{2DBED479-FB19-E089-1C6E-2AE0B82F2A0C}"/>
-          </ac:spMkLst>
-        </pc:spChg>
-      </pc:sldChg>
-      <pc:sldChg chg="modSp add mod">
-        <pc:chgData name="Carlos Rodríguez" userId="f1dedf0d09b55e6e" providerId="LiveId" clId="{521D7EF0-1FB3-4662-BCD5-642370DF5537}" dt="2025-08-30T00:00:24.052" v="473" actId="20577"/>
-        <pc:sldMkLst>
-          <pc:docMk/>
-          <pc:sldMk cId="1446356416" sldId="479"/>
-        </pc:sldMkLst>
-        <pc:spChg chg="mod">
-          <ac:chgData name="Carlos Rodríguez" userId="f1dedf0d09b55e6e" providerId="LiveId" clId="{521D7EF0-1FB3-4662-BCD5-642370DF5537}" dt="2025-08-30T00:00:24.052" v="473" actId="20577"/>
-          <ac:spMkLst>
-            <pc:docMk/>
-            <pc:sldMk cId="1446356416" sldId="479"/>
-            <ac:spMk id="7" creationId="{6C2A64F7-21DA-14DB-83BC-306E861DB0B1}"/>
-          </ac:spMkLst>
-        </pc:spChg>
-      </pc:sldChg>
-      <pc:sldChg chg="modSp add mod">
-        <pc:chgData name="Carlos Rodríguez" userId="f1dedf0d09b55e6e" providerId="LiveId" clId="{521D7EF0-1FB3-4662-BCD5-642370DF5537}" dt="2025-08-30T00:00:32.330" v="480" actId="20577"/>
-        <pc:sldMkLst>
-          <pc:docMk/>
-          <pc:sldMk cId="704289826" sldId="480"/>
-        </pc:sldMkLst>
-        <pc:spChg chg="mod">
-          <ac:chgData name="Carlos Rodríguez" userId="f1dedf0d09b55e6e" providerId="LiveId" clId="{521D7EF0-1FB3-4662-BCD5-642370DF5537}" dt="2025-08-30T00:00:32.330" v="480" actId="20577"/>
-          <ac:spMkLst>
-            <pc:docMk/>
-            <pc:sldMk cId="704289826" sldId="480"/>
-            <ac:spMk id="7" creationId="{89200B14-9632-309F-25C9-B4AE0B4B0883}"/>
-          </ac:spMkLst>
-        </pc:spChg>
-      </pc:sldChg>
-      <pc:sldChg chg="modSp add mod">
-        <pc:chgData name="Carlos Rodríguez" userId="f1dedf0d09b55e6e" providerId="LiveId" clId="{521D7EF0-1FB3-4662-BCD5-642370DF5537}" dt="2025-08-30T02:54:35.560" v="499" actId="20577"/>
-        <pc:sldMkLst>
-          <pc:docMk/>
-          <pc:sldMk cId="3650402415" sldId="481"/>
-        </pc:sldMkLst>
-        <pc:graphicFrameChg chg="modGraphic">
-          <ac:chgData name="Carlos Rodríguez" userId="f1dedf0d09b55e6e" providerId="LiveId" clId="{521D7EF0-1FB3-4662-BCD5-642370DF5537}" dt="2025-08-30T02:54:35.560" v="499" actId="20577"/>
-          <ac:graphicFrameMkLst>
-            <pc:docMk/>
-            <pc:sldMk cId="3650402415" sldId="481"/>
-            <ac:graphicFrameMk id="8" creationId="{F5FEE616-3199-2999-CB0A-0FC0E3ED6D00}"/>
-          </ac:graphicFrameMkLst>
-        </pc:graphicFrameChg>
-      </pc:sldChg>
-    </pc:docChg>
-  </pc:docChgLst>
-  <pc:docChgLst>
-    <pc:chgData name="Carlos Fidel Rodriguez Alarcon" userId="e73d52b7-37e9-45c9-b1e0-ea73a820c70c" providerId="ADAL" clId="{1B945DB3-14C5-42AA-B3E7-E4658E947A49}"/>
-    <pc:docChg chg="modSld">
-      <pc:chgData name="Carlos Fidel Rodriguez Alarcon" userId="e73d52b7-37e9-45c9-b1e0-ea73a820c70c" providerId="ADAL" clId="{1B945DB3-14C5-42AA-B3E7-E4658E947A49}" dt="2025-08-31T19:49:56.295" v="7" actId="20577"/>
-      <pc:docMkLst>
-        <pc:docMk/>
-      </pc:docMkLst>
-      <pc:sldChg chg="modSp mod">
-        <pc:chgData name="Carlos Fidel Rodriguez Alarcon" userId="e73d52b7-37e9-45c9-b1e0-ea73a820c70c" providerId="ADAL" clId="{1B945DB3-14C5-42AA-B3E7-E4658E947A49}" dt="2025-08-31T19:49:56.295" v="7" actId="20577"/>
-        <pc:sldMkLst>
-          <pc:docMk/>
-          <pc:sldMk cId="3650402415" sldId="481"/>
-        </pc:sldMkLst>
-        <pc:graphicFrameChg chg="modGraphic">
-          <ac:chgData name="Carlos Fidel Rodriguez Alarcon" userId="e73d52b7-37e9-45c9-b1e0-ea73a820c70c" providerId="ADAL" clId="{1B945DB3-14C5-42AA-B3E7-E4658E947A49}" dt="2025-08-31T19:49:56.295" v="7" actId="20577"/>
-          <ac:graphicFrameMkLst>
-            <pc:docMk/>
-            <pc:sldMk cId="3650402415" sldId="481"/>
-            <ac:graphicFrameMk id="8" creationId="{F5FEE616-3199-2999-CB0A-0FC0E3ED6D00}"/>
-          </ac:graphicFrameMkLst>
-        </pc:graphicFrameChg>
-      </pc:sldChg>
-    </pc:docChg>
-  </pc:docChgLst>
-  <pc:docChgLst>
-    <pc:chgData name="Carlos Fidel Rodriguez Alarcon" userId="e73d52b7-37e9-45c9-b1e0-ea73a820c70c" providerId="ADAL" clId="{9153E608-F2BD-4E50-89E7-541200AD15EC}"/>
-    <pc:docChg chg="custSel modSld">
-      <pc:chgData name="Carlos Fidel Rodriguez Alarcon" userId="e73d52b7-37e9-45c9-b1e0-ea73a820c70c" providerId="ADAL" clId="{9153E608-F2BD-4E50-89E7-541200AD15EC}" dt="2025-09-02T04:38:14.178" v="35" actId="790"/>
-      <pc:docMkLst>
-        <pc:docMk/>
-      </pc:docMkLst>
-      <pc:sldChg chg="modSp mod">
-        <pc:chgData name="Carlos Fidel Rodriguez Alarcon" userId="e73d52b7-37e9-45c9-b1e0-ea73a820c70c" providerId="ADAL" clId="{9153E608-F2BD-4E50-89E7-541200AD15EC}" dt="2025-09-02T04:36:56.941" v="32" actId="20577"/>
-        <pc:sldMkLst>
-          <pc:docMk/>
-          <pc:sldMk cId="198856905" sldId="432"/>
-        </pc:sldMkLst>
-        <pc:graphicFrameChg chg="modGraphic">
-          <ac:chgData name="Carlos Fidel Rodriguez Alarcon" userId="e73d52b7-37e9-45c9-b1e0-ea73a820c70c" providerId="ADAL" clId="{9153E608-F2BD-4E50-89E7-541200AD15EC}" dt="2025-09-02T04:36:56.941" v="32" actId="20577"/>
-          <ac:graphicFrameMkLst>
-            <pc:docMk/>
-            <pc:sldMk cId="198856905" sldId="432"/>
-            <ac:graphicFrameMk id="9" creationId="{674E3414-D2BA-3D41-BAEC-BDDF5879A1D8}"/>
-          </ac:graphicFrameMkLst>
-        </pc:graphicFrameChg>
-      </pc:sldChg>
-      <pc:sldChg chg="modSp mod">
-        <pc:chgData name="Carlos Fidel Rodriguez Alarcon" userId="e73d52b7-37e9-45c9-b1e0-ea73a820c70c" providerId="ADAL" clId="{9153E608-F2BD-4E50-89E7-541200AD15EC}" dt="2025-09-02T04:32:03.003" v="0" actId="313"/>
-        <pc:sldMkLst>
-          <pc:docMk/>
-          <pc:sldMk cId="1119887568" sldId="437"/>
-        </pc:sldMkLst>
-        <pc:graphicFrameChg chg="modGraphic">
-          <ac:chgData name="Carlos Fidel Rodriguez Alarcon" userId="e73d52b7-37e9-45c9-b1e0-ea73a820c70c" providerId="ADAL" clId="{9153E608-F2BD-4E50-89E7-541200AD15EC}" dt="2025-09-02T04:32:03.003" v="0" actId="313"/>
-          <ac:graphicFrameMkLst>
-            <pc:docMk/>
-            <pc:sldMk cId="1119887568" sldId="437"/>
-            <ac:graphicFrameMk id="10" creationId="{936F00B5-C18A-254E-9723-C4AE215E98DD}"/>
-          </ac:graphicFrameMkLst>
-        </pc:graphicFrameChg>
-      </pc:sldChg>
-      <pc:sldChg chg="modSp mod">
-        <pc:chgData name="Carlos Fidel Rodriguez Alarcon" userId="e73d52b7-37e9-45c9-b1e0-ea73a820c70c" providerId="ADAL" clId="{9153E608-F2BD-4E50-89E7-541200AD15EC}" dt="2025-09-02T04:37:42.151" v="34" actId="20577"/>
-        <pc:sldMkLst>
-          <pc:docMk/>
-          <pc:sldMk cId="2607037317" sldId="474"/>
-        </pc:sldMkLst>
-        <pc:graphicFrameChg chg="modGraphic">
-          <ac:chgData name="Carlos Fidel Rodriguez Alarcon" userId="e73d52b7-37e9-45c9-b1e0-ea73a820c70c" providerId="ADAL" clId="{9153E608-F2BD-4E50-89E7-541200AD15EC}" dt="2025-09-02T04:37:42.151" v="34" actId="20577"/>
-          <ac:graphicFrameMkLst>
-            <pc:docMk/>
-            <pc:sldMk cId="2607037317" sldId="474"/>
-            <ac:graphicFrameMk id="9" creationId="{E87D49B9-FEFB-D845-87E4-39A147340360}"/>
-          </ac:graphicFrameMkLst>
-        </pc:graphicFrameChg>
-      </pc:sldChg>
-      <pc:sldChg chg="modSp mod">
-        <pc:chgData name="Carlos Fidel Rodriguez Alarcon" userId="e73d52b7-37e9-45c9-b1e0-ea73a820c70c" providerId="ADAL" clId="{9153E608-F2BD-4E50-89E7-541200AD15EC}" dt="2025-09-02T04:38:14.178" v="35" actId="790"/>
-        <pc:sldMkLst>
-          <pc:docMk/>
-          <pc:sldMk cId="2639478463" sldId="475"/>
-        </pc:sldMkLst>
-        <pc:graphicFrameChg chg="modGraphic">
-          <ac:chgData name="Carlos Fidel Rodriguez Alarcon" userId="e73d52b7-37e9-45c9-b1e0-ea73a820c70c" providerId="ADAL" clId="{9153E608-F2BD-4E50-89E7-541200AD15EC}" dt="2025-09-02T04:38:14.178" v="35" actId="790"/>
-          <ac:graphicFrameMkLst>
-            <pc:docMk/>
-            <pc:sldMk cId="2639478463" sldId="475"/>
-            <ac:graphicFrameMk id="10" creationId="{65513008-6D5E-444F-89F9-F7978FEFE492}"/>
-          </ac:graphicFrameMkLst>
-        </pc:graphicFrameChg>
-      </pc:sldChg>
-    </pc:docChg>
-  </pc:docChgLst>
-  <pc:docChgLst>
-    <pc:chgData name="Juan David Forero Rodriguez" userId="S::jd.foreror1@uniandes.edu.co::109b95e3-f476-4372-9cca-31c3c7f47b50" providerId="AD" clId="Web-{58103525-E681-31BA-BAF7-33EBB53FD5AB}"/>
-    <pc:docChg chg="delSld modSld sldOrd">
-      <pc:chgData name="Juan David Forero Rodriguez" userId="S::jd.foreror1@uniandes.edu.co::109b95e3-f476-4372-9cca-31c3c7f47b50" providerId="AD" clId="Web-{58103525-E681-31BA-BAF7-33EBB53FD5AB}" dt="2025-09-02T05:02:14.062" v="3420"/>
-      <pc:docMkLst>
-        <pc:docMk/>
-      </pc:docMkLst>
-      <pc:sldChg chg="modSp">
-        <pc:chgData name="Juan David Forero Rodriguez" userId="S::jd.foreror1@uniandes.edu.co::109b95e3-f476-4372-9cca-31c3c7f47b50" providerId="AD" clId="Web-{58103525-E681-31BA-BAF7-33EBB53FD5AB}" dt="2025-09-02T04:08:38.006" v="1587"/>
-        <pc:sldMkLst>
-          <pc:docMk/>
-          <pc:sldMk cId="1119887568" sldId="437"/>
-        </pc:sldMkLst>
-        <pc:graphicFrameChg chg="mod modGraphic">
-          <ac:chgData name="Juan David Forero Rodriguez" userId="S::jd.foreror1@uniandes.edu.co::109b95e3-f476-4372-9cca-31c3c7f47b50" providerId="AD" clId="Web-{58103525-E681-31BA-BAF7-33EBB53FD5AB}" dt="2025-09-02T04:08:38.006" v="1587"/>
-          <ac:graphicFrameMkLst>
-            <pc:docMk/>
-            <pc:sldMk cId="1119887568" sldId="437"/>
-            <ac:graphicFrameMk id="10" creationId="{936F00B5-C18A-254E-9723-C4AE215E98DD}"/>
-          </ac:graphicFrameMkLst>
-        </pc:graphicFrameChg>
-      </pc:sldChg>
-      <pc:sldChg chg="modSp">
-        <pc:chgData name="Juan David Forero Rodriguez" userId="S::jd.foreror1@uniandes.edu.co::109b95e3-f476-4372-9cca-31c3c7f47b50" providerId="AD" clId="Web-{58103525-E681-31BA-BAF7-33EBB53FD5AB}" dt="2025-09-02T04:23:54.823" v="2555"/>
-        <pc:sldMkLst>
-          <pc:docMk/>
-          <pc:sldMk cId="2556734983" sldId="462"/>
-        </pc:sldMkLst>
-        <pc:graphicFrameChg chg="mod modGraphic">
-          <ac:chgData name="Juan David Forero Rodriguez" userId="S::jd.foreror1@uniandes.edu.co::109b95e3-f476-4372-9cca-31c3c7f47b50" providerId="AD" clId="Web-{58103525-E681-31BA-BAF7-33EBB53FD5AB}" dt="2025-09-02T04:23:54.823" v="2555"/>
-          <ac:graphicFrameMkLst>
-            <pc:docMk/>
-            <pc:sldMk cId="2556734983" sldId="462"/>
-            <ac:graphicFrameMk id="10" creationId="{936F00B5-C18A-254E-9723-C4AE215E98DD}"/>
-          </ac:graphicFrameMkLst>
-        </pc:graphicFrameChg>
-      </pc:sldChg>
-      <pc:sldChg chg="modSp ord">
-        <pc:chgData name="Juan David Forero Rodriguez" userId="S::jd.foreror1@uniandes.edu.co::109b95e3-f476-4372-9cca-31c3c7f47b50" providerId="AD" clId="Web-{58103525-E681-31BA-BAF7-33EBB53FD5AB}" dt="2025-09-02T03:51:03.603" v="40" actId="20577"/>
-        <pc:sldMkLst>
-          <pc:docMk/>
-          <pc:sldMk cId="592874193" sldId="467"/>
-        </pc:sldMkLst>
-        <pc:spChg chg="mod">
-          <ac:chgData name="Juan David Forero Rodriguez" userId="S::jd.foreror1@uniandes.edu.co::109b95e3-f476-4372-9cca-31c3c7f47b50" providerId="AD" clId="Web-{58103525-E681-31BA-BAF7-33EBB53FD5AB}" dt="2025-09-02T03:51:03.603" v="40" actId="20577"/>
-          <ac:spMkLst>
-            <pc:docMk/>
-            <pc:sldMk cId="592874193" sldId="467"/>
-            <ac:spMk id="5" creationId="{476C7C65-5A98-BF64-8286-457F361796C9}"/>
-          </ac:spMkLst>
-        </pc:spChg>
-        <pc:graphicFrameChg chg="mod modGraphic">
-          <ac:chgData name="Juan David Forero Rodriguez" userId="S::jd.foreror1@uniandes.edu.co::109b95e3-f476-4372-9cca-31c3c7f47b50" providerId="AD" clId="Web-{58103525-E681-31BA-BAF7-33EBB53FD5AB}" dt="2025-09-02T03:50:42.135" v="37"/>
-          <ac:graphicFrameMkLst>
-            <pc:docMk/>
-            <pc:sldMk cId="592874193" sldId="467"/>
-            <ac:graphicFrameMk id="8" creationId="{8E3EA33B-4F1D-1D8D-2655-02AF6C8C3BB7}"/>
-          </ac:graphicFrameMkLst>
-        </pc:graphicFrameChg>
-      </pc:sldChg>
-      <pc:sldChg chg="modSp">
-        <pc:chgData name="Juan David Forero Rodriguez" userId="S::jd.foreror1@uniandes.edu.co::109b95e3-f476-4372-9cca-31c3c7f47b50" providerId="AD" clId="Web-{58103525-E681-31BA-BAF7-33EBB53FD5AB}" dt="2025-09-02T03:51:17.588" v="41"/>
-        <pc:sldMkLst>
-          <pc:docMk/>
-          <pc:sldMk cId="2607037317" sldId="474"/>
-        </pc:sldMkLst>
-        <pc:graphicFrameChg chg="modGraphic">
-          <ac:chgData name="Juan David Forero Rodriguez" userId="S::jd.foreror1@uniandes.edu.co::109b95e3-f476-4372-9cca-31c3c7f47b50" providerId="AD" clId="Web-{58103525-E681-31BA-BAF7-33EBB53FD5AB}" dt="2025-09-02T03:51:17.588" v="41"/>
-          <ac:graphicFrameMkLst>
-            <pc:docMk/>
-            <pc:sldMk cId="2607037317" sldId="474"/>
-            <ac:graphicFrameMk id="9" creationId="{E87D49B9-FEFB-D845-87E4-39A147340360}"/>
-          </ac:graphicFrameMkLst>
-        </pc:graphicFrameChg>
-      </pc:sldChg>
-      <pc:sldChg chg="addSp delSp modSp">
-        <pc:chgData name="Juan David Forero Rodriguez" userId="S::jd.foreror1@uniandes.edu.co::109b95e3-f476-4372-9cca-31c3c7f47b50" providerId="AD" clId="Web-{58103525-E681-31BA-BAF7-33EBB53FD5AB}" dt="2025-09-02T03:53:44.998" v="114" actId="1076"/>
-        <pc:sldMkLst>
-          <pc:docMk/>
-          <pc:sldMk cId="2639478463" sldId="475"/>
-        </pc:sldMkLst>
-        <pc:graphicFrameChg chg="add del mod">
-          <ac:chgData name="Juan David Forero Rodriguez" userId="S::jd.foreror1@uniandes.edu.co::109b95e3-f476-4372-9cca-31c3c7f47b50" providerId="AD" clId="Web-{58103525-E681-31BA-BAF7-33EBB53FD5AB}" dt="2025-09-02T03:51:47.572" v="43"/>
-          <ac:graphicFrameMkLst>
-            <pc:docMk/>
-            <pc:sldMk cId="2639478463" sldId="475"/>
-            <ac:graphicFrameMk id="4" creationId="{CDCE6D81-A235-8426-19F8-250016D6AFC4}"/>
-          </ac:graphicFrameMkLst>
-        </pc:graphicFrameChg>
-        <pc:graphicFrameChg chg="mod modGraphic">
-          <ac:chgData name="Juan David Forero Rodriguez" userId="S::jd.foreror1@uniandes.edu.co::109b95e3-f476-4372-9cca-31c3c7f47b50" providerId="AD" clId="Web-{58103525-E681-31BA-BAF7-33EBB53FD5AB}" dt="2025-09-02T03:53:27.215" v="111"/>
-          <ac:graphicFrameMkLst>
-            <pc:docMk/>
-            <pc:sldMk cId="2639478463" sldId="475"/>
-            <ac:graphicFrameMk id="9" creationId="{D84B17D5-B0EF-B74B-B55E-CE7F2B338D40}"/>
-          </ac:graphicFrameMkLst>
-        </pc:graphicFrameChg>
-        <pc:graphicFrameChg chg="mod modGraphic">
-          <ac:chgData name="Juan David Forero Rodriguez" userId="S::jd.foreror1@uniandes.edu.co::109b95e3-f476-4372-9cca-31c3c7f47b50" providerId="AD" clId="Web-{58103525-E681-31BA-BAF7-33EBB53FD5AB}" dt="2025-09-02T03:53:44.998" v="114" actId="1076"/>
-          <ac:graphicFrameMkLst>
-            <pc:docMk/>
-            <pc:sldMk cId="2639478463" sldId="475"/>
-            <ac:graphicFrameMk id="10" creationId="{65513008-6D5E-444F-89F9-F7978FEFE492}"/>
-          </ac:graphicFrameMkLst>
-        </pc:graphicFrameChg>
-      </pc:sldChg>
-      <pc:sldChg chg="addSp delSp modSp">
-        <pc:chgData name="Juan David Forero Rodriguez" userId="S::jd.foreror1@uniandes.edu.co::109b95e3-f476-4372-9cca-31c3c7f47b50" providerId="AD" clId="Web-{58103525-E681-31BA-BAF7-33EBB53FD5AB}" dt="2025-09-02T04:38:11.539" v="2609"/>
-        <pc:sldMkLst>
-          <pc:docMk/>
-          <pc:sldMk cId="1316333021" sldId="482"/>
-        </pc:sldMkLst>
-        <pc:spChg chg="add mod">
-          <ac:chgData name="Juan David Forero Rodriguez" userId="S::jd.foreror1@uniandes.edu.co::109b95e3-f476-4372-9cca-31c3c7f47b50" providerId="AD" clId="Web-{58103525-E681-31BA-BAF7-33EBB53FD5AB}" dt="2025-09-02T04:27:07.124" v="2559" actId="14100"/>
-          <ac:spMkLst>
-            <pc:docMk/>
-            <pc:sldMk cId="1316333021" sldId="482"/>
-            <ac:spMk id="2" creationId="{2DD6DFA3-7034-2600-F799-10A0D3BADC5E}"/>
-          </ac:spMkLst>
-        </pc:spChg>
-        <pc:spChg chg="add del mod">
-          <ac:chgData name="Juan David Forero Rodriguez" userId="S::jd.foreror1@uniandes.edu.co::109b95e3-f476-4372-9cca-31c3c7f47b50" providerId="AD" clId="Web-{58103525-E681-31BA-BAF7-33EBB53FD5AB}" dt="2025-09-02T04:30:25.370" v="2567"/>
-          <ac:spMkLst>
-            <pc:docMk/>
-            <pc:sldMk cId="1316333021" sldId="482"/>
-            <ac:spMk id="17" creationId="{3955A0C0-7D82-9C65-1AF7-CC0297AE18C4}"/>
-          </ac:spMkLst>
-        </pc:spChg>
-        <pc:spChg chg="add del mod">
-          <ac:chgData name="Juan David Forero Rodriguez" userId="S::jd.foreror1@uniandes.edu.co::109b95e3-f476-4372-9cca-31c3c7f47b50" providerId="AD" clId="Web-{58103525-E681-31BA-BAF7-33EBB53FD5AB}" dt="2025-09-02T04:30:32.589" v="2579"/>
-          <ac:spMkLst>
-            <pc:docMk/>
-            <pc:sldMk cId="1316333021" sldId="482"/>
-            <ac:spMk id="26" creationId="{36A963CC-4498-CFB3-ADB6-BDA75C97955E}"/>
-          </ac:spMkLst>
-        </pc:spChg>
-        <pc:spChg chg="add del mod">
-          <ac:chgData name="Juan David Forero Rodriguez" userId="S::jd.foreror1@uniandes.edu.co::109b95e3-f476-4372-9cca-31c3c7f47b50" providerId="AD" clId="Web-{58103525-E681-31BA-BAF7-33EBB53FD5AB}" dt="2025-09-02T04:31:16.685" v="2588"/>
-          <ac:spMkLst>
-            <pc:docMk/>
-            <pc:sldMk cId="1316333021" sldId="482"/>
-            <ac:spMk id="29" creationId="{EF9FB5B0-7E57-A2D8-F5E6-A396E528A0D2}"/>
-          </ac:spMkLst>
-        </pc:spChg>
-        <pc:graphicFrameChg chg="add del mod">
-          <ac:chgData name="Juan David Forero Rodriguez" userId="S::jd.foreror1@uniandes.edu.co::109b95e3-f476-4372-9cca-31c3c7f47b50" providerId="AD" clId="Web-{58103525-E681-31BA-BAF7-33EBB53FD5AB}" dt="2025-09-02T04:30:25.370" v="2571"/>
-          <ac:graphicFrameMkLst>
-            <pc:docMk/>
-            <pc:sldMk cId="1316333021" sldId="482"/>
-            <ac:graphicFrameMk id="10" creationId="{1234A2CA-6FD1-97A4-A414-217C98A56BFC}"/>
-          </ac:graphicFrameMkLst>
-        </pc:graphicFrameChg>
-        <pc:graphicFrameChg chg="add del mod">
-          <ac:chgData name="Juan David Forero Rodriguez" userId="S::jd.foreror1@uniandes.edu.co::109b95e3-f476-4372-9cca-31c3c7f47b50" providerId="AD" clId="Web-{58103525-E681-31BA-BAF7-33EBB53FD5AB}" dt="2025-09-02T04:30:25.370" v="2570"/>
-          <ac:graphicFrameMkLst>
-            <pc:docMk/>
-            <pc:sldMk cId="1316333021" sldId="482"/>
-            <ac:graphicFrameMk id="12" creationId="{4753EF80-7B23-DEDD-EF08-8963AC85AA2C}"/>
-          </ac:graphicFrameMkLst>
-        </pc:graphicFrameChg>
-        <pc:graphicFrameChg chg="add del mod">
-          <ac:chgData name="Juan David Forero Rodriguez" userId="S::jd.foreror1@uniandes.edu.co::109b95e3-f476-4372-9cca-31c3c7f47b50" providerId="AD" clId="Web-{58103525-E681-31BA-BAF7-33EBB53FD5AB}" dt="2025-09-02T04:30:25.370" v="2569"/>
-          <ac:graphicFrameMkLst>
-            <pc:docMk/>
-            <pc:sldMk cId="1316333021" sldId="482"/>
-            <ac:graphicFrameMk id="14" creationId="{628B3DC1-9772-2627-E39D-67FD68701998}"/>
-          </ac:graphicFrameMkLst>
-        </pc:graphicFrameChg>
-        <pc:graphicFrameChg chg="add del mod">
-          <ac:chgData name="Juan David Forero Rodriguez" userId="S::jd.foreror1@uniandes.edu.co::109b95e3-f476-4372-9cca-31c3c7f47b50" providerId="AD" clId="Web-{58103525-E681-31BA-BAF7-33EBB53FD5AB}" dt="2025-09-02T04:30:25.370" v="2568"/>
-          <ac:graphicFrameMkLst>
-            <pc:docMk/>
-            <pc:sldMk cId="1316333021" sldId="482"/>
-            <ac:graphicFrameMk id="16" creationId="{45E394F5-00A8-DD60-D9CA-6CCE1F54F03C}"/>
-          </ac:graphicFrameMkLst>
-        </pc:graphicFrameChg>
-        <pc:graphicFrameChg chg="add del mod">
-          <ac:chgData name="Juan David Forero Rodriguez" userId="S::jd.foreror1@uniandes.edu.co::109b95e3-f476-4372-9cca-31c3c7f47b50" providerId="AD" clId="Web-{58103525-E681-31BA-BAF7-33EBB53FD5AB}" dt="2025-09-02T04:30:32.589" v="2583"/>
-          <ac:graphicFrameMkLst>
-            <pc:docMk/>
-            <pc:sldMk cId="1316333021" sldId="482"/>
-            <ac:graphicFrameMk id="19" creationId="{E726592F-5C69-2CB9-368B-3EAD4B06E0B6}"/>
-          </ac:graphicFrameMkLst>
-        </pc:graphicFrameChg>
-        <pc:graphicFrameChg chg="add del mod">
-          <ac:chgData name="Juan David Forero Rodriguez" userId="S::jd.foreror1@uniandes.edu.co::109b95e3-f476-4372-9cca-31c3c7f47b50" providerId="AD" clId="Web-{58103525-E681-31BA-BAF7-33EBB53FD5AB}" dt="2025-09-02T04:30:32.589" v="2582"/>
-          <ac:graphicFrameMkLst>
-            <pc:docMk/>
-            <pc:sldMk cId="1316333021" sldId="482"/>
-            <ac:graphicFrameMk id="21" creationId="{D80723A7-3DE2-7606-AA40-59F4824D683F}"/>
-          </ac:graphicFrameMkLst>
-        </pc:graphicFrameChg>
-        <pc:graphicFrameChg chg="add del mod">
-          <ac:chgData name="Juan David Forero Rodriguez" userId="S::jd.foreror1@uniandes.edu.co::109b95e3-f476-4372-9cca-31c3c7f47b50" providerId="AD" clId="Web-{58103525-E681-31BA-BAF7-33EBB53FD5AB}" dt="2025-09-02T04:30:32.589" v="2581"/>
-          <ac:graphicFrameMkLst>
-            <pc:docMk/>
-            <pc:sldMk cId="1316333021" sldId="482"/>
-            <ac:graphicFrameMk id="23" creationId="{FADE838B-A1ED-2CE5-5C40-0DAE71E62CAC}"/>
-          </ac:graphicFrameMkLst>
-        </pc:graphicFrameChg>
-        <pc:graphicFrameChg chg="add del mod">
-          <ac:chgData name="Juan David Forero Rodriguez" userId="S::jd.foreror1@uniandes.edu.co::109b95e3-f476-4372-9cca-31c3c7f47b50" providerId="AD" clId="Web-{58103525-E681-31BA-BAF7-33EBB53FD5AB}" dt="2025-09-02T04:30:32.589" v="2580"/>
-          <ac:graphicFrameMkLst>
-            <pc:docMk/>
-            <pc:sldMk cId="1316333021" sldId="482"/>
-            <ac:graphicFrameMk id="25" creationId="{D59F7D1D-5AC1-EF57-366F-B0E26146F03E}"/>
-          </ac:graphicFrameMkLst>
-        </pc:graphicFrameChg>
-        <pc:graphicFrameChg chg="add del mod">
-          <ac:chgData name="Juan David Forero Rodriguez" userId="S::jd.foreror1@uniandes.edu.co::109b95e3-f476-4372-9cca-31c3c7f47b50" providerId="AD" clId="Web-{58103525-E681-31BA-BAF7-33EBB53FD5AB}" dt="2025-09-02T04:31:16.685" v="2589"/>
-          <ac:graphicFrameMkLst>
-            <pc:docMk/>
-            <pc:sldMk cId="1316333021" sldId="482"/>
-            <ac:graphicFrameMk id="28" creationId="{C77CA60F-910F-8F64-72CA-CA6C987E8DCD}"/>
-          </ac:graphicFrameMkLst>
-        </pc:graphicFrameChg>
-        <pc:picChg chg="add mod">
-          <ac:chgData name="Juan David Forero Rodriguez" userId="S::jd.foreror1@uniandes.edu.co::109b95e3-f476-4372-9cca-31c3c7f47b50" providerId="AD" clId="Web-{58103525-E681-31BA-BAF7-33EBB53FD5AB}" dt="2025-09-02T04:31:45.029" v="2593" actId="1076"/>
-          <ac:picMkLst>
-            <pc:docMk/>
-            <pc:sldMk cId="1316333021" sldId="482"/>
-            <ac:picMk id="30" creationId="{0800F7B3-DA2A-1487-5432-59CC1F6D4D92}"/>
-          </ac:picMkLst>
-        </pc:picChg>
-        <pc:picChg chg="add mod">
-          <ac:chgData name="Juan David Forero Rodriguez" userId="S::jd.foreror1@uniandes.edu.co::109b95e3-f476-4372-9cca-31c3c7f47b50" providerId="AD" clId="Web-{58103525-E681-31BA-BAF7-33EBB53FD5AB}" dt="2025-09-02T04:37:46.566" v="2606" actId="1076"/>
-          <ac:picMkLst>
-            <pc:docMk/>
-            <pc:sldMk cId="1316333021" sldId="482"/>
-            <ac:picMk id="31" creationId="{6FFC862E-1FBC-3911-42C7-64C14610EF07}"/>
-          </ac:picMkLst>
-        </pc:picChg>
-        <pc:picChg chg="add mod">
-          <ac:chgData name="Juan David Forero Rodriguez" userId="S::jd.foreror1@uniandes.edu.co::109b95e3-f476-4372-9cca-31c3c7f47b50" providerId="AD" clId="Web-{58103525-E681-31BA-BAF7-33EBB53FD5AB}" dt="2025-09-02T04:33:01.687" v="2600" actId="1076"/>
-          <ac:picMkLst>
-            <pc:docMk/>
-            <pc:sldMk cId="1316333021" sldId="482"/>
-            <ac:picMk id="32" creationId="{DC457D1A-2F76-B783-A81F-CD1F1D82A24E}"/>
-          </ac:picMkLst>
-        </pc:picChg>
-        <pc:picChg chg="add del mod">
-          <ac:chgData name="Juan David Forero Rodriguez" userId="S::jd.foreror1@uniandes.edu.co::109b95e3-f476-4372-9cca-31c3c7f47b50" providerId="AD" clId="Web-{58103525-E681-31BA-BAF7-33EBB53FD5AB}" dt="2025-09-02T04:38:11.539" v="2609"/>
-          <ac:picMkLst>
-            <pc:docMk/>
-            <pc:sldMk cId="1316333021" sldId="482"/>
-            <ac:picMk id="33" creationId="{847858CF-2957-800C-BBEA-AD23637A2B67}"/>
-          </ac:picMkLst>
-        </pc:picChg>
-      </pc:sldChg>
-      <pc:sldChg chg="del">
-        <pc:chgData name="Juan David Forero Rodriguez" userId="S::jd.foreror1@uniandes.edu.co::109b95e3-f476-4372-9cca-31c3c7f47b50" providerId="AD" clId="Web-{58103525-E681-31BA-BAF7-33EBB53FD5AB}" dt="2025-09-02T03:54:02.170" v="115"/>
-        <pc:sldMkLst>
-          <pc:docMk/>
-          <pc:sldMk cId="2145844100" sldId="482"/>
-        </pc:sldMkLst>
-      </pc:sldChg>
-      <pc:sldChg chg="addSp delSp modSp">
-        <pc:chgData name="Juan David Forero Rodriguez" userId="S::jd.foreror1@uniandes.edu.co::109b95e3-f476-4372-9cca-31c3c7f47b50" providerId="AD" clId="Web-{58103525-E681-31BA-BAF7-33EBB53FD5AB}" dt="2025-09-02T05:02:14.062" v="3420"/>
-        <pc:sldMkLst>
-          <pc:docMk/>
-          <pc:sldMk cId="866889576" sldId="483"/>
-        </pc:sldMkLst>
-        <pc:spChg chg="add del mod">
-          <ac:chgData name="Juan David Forero Rodriguez" userId="S::jd.foreror1@uniandes.edu.co::109b95e3-f476-4372-9cca-31c3c7f47b50" providerId="AD" clId="Web-{58103525-E681-31BA-BAF7-33EBB53FD5AB}" dt="2025-09-02T05:00:57.590" v="3402"/>
-          <ac:spMkLst>
-            <pc:docMk/>
-            <pc:sldMk cId="866889576" sldId="483"/>
-            <ac:spMk id="5" creationId="{B42F0E09-DCFF-34D4-B1CC-CEBAE04DDE61}"/>
-          </ac:spMkLst>
-        </pc:spChg>
-        <pc:spChg chg="add del mod">
-          <ac:chgData name="Juan David Forero Rodriguez" userId="S::jd.foreror1@uniandes.edu.co::109b95e3-f476-4372-9cca-31c3c7f47b50" providerId="AD" clId="Web-{58103525-E681-31BA-BAF7-33EBB53FD5AB}" dt="2025-09-02T04:46:19.280" v="2839"/>
-          <ac:spMkLst>
-            <pc:docMk/>
-            <pc:sldMk cId="866889576" sldId="483"/>
-            <ac:spMk id="11" creationId="{F396C292-18B6-83D4-EABC-49578DA4C430}"/>
-          </ac:spMkLst>
-        </pc:spChg>
-        <pc:graphicFrameChg chg="add mod modGraphic">
-          <ac:chgData name="Juan David Forero Rodriguez" userId="S::jd.foreror1@uniandes.edu.co::109b95e3-f476-4372-9cca-31c3c7f47b50" providerId="AD" clId="Web-{58103525-E681-31BA-BAF7-33EBB53FD5AB}" dt="2025-09-02T04:44:31.740" v="2835" actId="1076"/>
-          <ac:graphicFrameMkLst>
-            <pc:docMk/>
-            <pc:sldMk cId="866889576" sldId="483"/>
-            <ac:graphicFrameMk id="4" creationId="{A8882CF8-1E77-AB86-B778-762B5A44C351}"/>
-          </ac:graphicFrameMkLst>
-        </pc:graphicFrameChg>
-        <pc:graphicFrameChg chg="add del mod modGraphic">
-          <ac:chgData name="Juan David Forero Rodriguez" userId="S::jd.foreror1@uniandes.edu.co::109b95e3-f476-4372-9cca-31c3c7f47b50" providerId="AD" clId="Web-{58103525-E681-31BA-BAF7-33EBB53FD5AB}" dt="2025-09-02T04:49:45.842" v="2876"/>
-          <ac:graphicFrameMkLst>
-            <pc:docMk/>
-            <pc:sldMk cId="866889576" sldId="483"/>
-            <ac:graphicFrameMk id="11" creationId="{34CF9E00-4C5C-9246-EBB2-97917ACA66B4}"/>
-          </ac:graphicFrameMkLst>
-        </pc:graphicFrameChg>
-        <pc:graphicFrameChg chg="add mod modGraphic">
-          <ac:chgData name="Juan David Forero Rodriguez" userId="S::jd.foreror1@uniandes.edu.co::109b95e3-f476-4372-9cca-31c3c7f47b50" providerId="AD" clId="Web-{58103525-E681-31BA-BAF7-33EBB53FD5AB}" dt="2025-09-02T05:02:14.062" v="3420"/>
-          <ac:graphicFrameMkLst>
-            <pc:docMk/>
-            <pc:sldMk cId="866889576" sldId="483"/>
-            <ac:graphicFrameMk id="11" creationId="{397AAC81-FA65-F154-A098-59C5A8D748B5}"/>
-          </ac:graphicFrameMkLst>
-        </pc:graphicFrameChg>
-        <pc:picChg chg="add del mod">
-          <ac:chgData name="Juan David Forero Rodriguez" userId="S::jd.foreror1@uniandes.edu.co::109b95e3-f476-4372-9cca-31c3c7f47b50" providerId="AD" clId="Web-{58103525-E681-31BA-BAF7-33EBB53FD5AB}" dt="2025-09-02T05:00:53.652" v="3400"/>
-          <ac:picMkLst>
-            <pc:docMk/>
-            <pc:sldMk cId="866889576" sldId="483"/>
-            <ac:picMk id="2" creationId="{6E053FC1-4348-B868-B975-119764789A40}"/>
-          </ac:picMkLst>
-        </pc:picChg>
-        <pc:picChg chg="del mod">
-          <ac:chgData name="Juan David Forero Rodriguez" userId="S::jd.foreror1@uniandes.edu.co::109b95e3-f476-4372-9cca-31c3c7f47b50" providerId="AD" clId="Web-{58103525-E681-31BA-BAF7-33EBB53FD5AB}" dt="2025-09-02T04:39:59.705" v="2613"/>
-          <ac:picMkLst>
-            <pc:docMk/>
-            <pc:sldMk cId="866889576" sldId="483"/>
-            <ac:picMk id="9" creationId="{85F8D5FC-6002-AAD8-40DD-7D7D025B60CA}"/>
-          </ac:picMkLst>
-        </pc:picChg>
-        <pc:picChg chg="del mod">
-          <ac:chgData name="Juan David Forero Rodriguez" userId="S::jd.foreror1@uniandes.edu.co::109b95e3-f476-4372-9cca-31c3c7f47b50" providerId="AD" clId="Web-{58103525-E681-31BA-BAF7-33EBB53FD5AB}" dt="2025-09-02T05:00:54.918" v="3401"/>
-          <ac:picMkLst>
-            <pc:docMk/>
-            <pc:sldMk cId="866889576" sldId="483"/>
-            <ac:picMk id="10" creationId="{FB89661D-D2B5-9AB5-8F62-DA62E840A241}"/>
-          </ac:picMkLst>
-        </pc:picChg>
-        <pc:picChg chg="del">
-          <ac:chgData name="Juan David Forero Rodriguez" userId="S::jd.foreror1@uniandes.edu.co::109b95e3-f476-4372-9cca-31c3c7f47b50" providerId="AD" clId="Web-{58103525-E681-31BA-BAF7-33EBB53FD5AB}" dt="2025-09-02T05:00:52.668" v="3399"/>
-          <ac:picMkLst>
-            <pc:docMk/>
-            <pc:sldMk cId="866889576" sldId="483"/>
-            <ac:picMk id="17" creationId="{CC983B16-6FF0-BC5D-2EED-51DAC0B4409D}"/>
-          </ac:picMkLst>
-        </pc:picChg>
-      </pc:sldChg>
-    </pc:docChg>
-  </pc:docChgLst>
-  <pc:docChgLst>
-    <pc:chgData name="Brayan Felipe Rojas Bernal" userId="S::b.rojasb@uniandes.edu.co::0e1c8319-9d93-42bd-95ed-f63e83f638a1" providerId="AD" clId="Web-{8A17EEF3-B1A7-AF94-6167-1EDD3B45EBD6}"/>
-    <pc:docChg chg="addSld modSld">
-      <pc:chgData name="Brayan Felipe Rojas Bernal" userId="S::b.rojasb@uniandes.edu.co::0e1c8319-9d93-42bd-95ed-f63e83f638a1" providerId="AD" clId="Web-{8A17EEF3-B1A7-AF94-6167-1EDD3B45EBD6}" dt="2025-09-02T04:48:26.844" v="260"/>
-      <pc:docMkLst>
-        <pc:docMk/>
-      </pc:docMkLst>
-      <pc:sldChg chg="addSp delSp modSp add replId">
-        <pc:chgData name="Brayan Felipe Rojas Bernal" userId="S::b.rojasb@uniandes.edu.co::0e1c8319-9d93-42bd-95ed-f63e83f638a1" providerId="AD" clId="Web-{8A17EEF3-B1A7-AF94-6167-1EDD3B45EBD6}" dt="2025-09-02T04:36:55.074" v="104"/>
-        <pc:sldMkLst>
-          <pc:docMk/>
-          <pc:sldMk cId="1316333021" sldId="482"/>
-        </pc:sldMkLst>
-        <pc:spChg chg="del mod">
-          <ac:chgData name="Brayan Felipe Rojas Bernal" userId="S::b.rojasb@uniandes.edu.co::0e1c8319-9d93-42bd-95ed-f63e83f638a1" providerId="AD" clId="Web-{8A17EEF3-B1A7-AF94-6167-1EDD3B45EBD6}" dt="2025-09-02T04:32:54.757" v="95"/>
-          <ac:spMkLst>
-            <pc:docMk/>
-            <pc:sldMk cId="1316333021" sldId="482"/>
-            <ac:spMk id="2" creationId="{2DD6DFA3-7034-2600-F799-10A0D3BADC5E}"/>
-          </ac:spMkLst>
-        </pc:spChg>
-        <pc:spChg chg="add mod">
-          <ac:chgData name="Brayan Felipe Rojas Bernal" userId="S::b.rojasb@uniandes.edu.co::0e1c8319-9d93-42bd-95ed-f63e83f638a1" providerId="AD" clId="Web-{8A17EEF3-B1A7-AF94-6167-1EDD3B45EBD6}" dt="2025-09-02T04:30:07.775" v="61" actId="1076"/>
-          <ac:spMkLst>
-            <pc:docMk/>
-            <pc:sldMk cId="1316333021" sldId="482"/>
-            <ac:spMk id="5" creationId="{04D6D7A0-AB61-A42D-10A1-8E400683B3B6}"/>
-          </ac:spMkLst>
-        </pc:spChg>
-        <pc:spChg chg="mod">
-          <ac:chgData name="Brayan Felipe Rojas Bernal" userId="S::b.rojasb@uniandes.edu.co::0e1c8319-9d93-42bd-95ed-f63e83f638a1" providerId="AD" clId="Web-{8A17EEF3-B1A7-AF94-6167-1EDD3B45EBD6}" dt="2025-09-02T04:26:39.693" v="37" actId="20577"/>
-          <ac:spMkLst>
-            <pc:docMk/>
-            <pc:sldMk cId="1316333021" sldId="482"/>
-            <ac:spMk id="7" creationId="{73586764-63CB-3ADF-CD3D-11C4C5934109}"/>
-          </ac:spMkLst>
-        </pc:spChg>
-        <pc:spChg chg="add mod">
-          <ac:chgData name="Brayan Felipe Rojas Bernal" userId="S::b.rojasb@uniandes.edu.co::0e1c8319-9d93-42bd-95ed-f63e83f638a1" providerId="AD" clId="Web-{8A17EEF3-B1A7-AF94-6167-1EDD3B45EBD6}" dt="2025-09-02T04:29:57.852" v="59" actId="1076"/>
-          <ac:spMkLst>
-            <pc:docMk/>
-            <pc:sldMk cId="1316333021" sldId="482"/>
-            <ac:spMk id="8" creationId="{41FCA9EC-2B4F-61E0-2120-7AEB26B1810B}"/>
-          </ac:spMkLst>
-        </pc:spChg>
-        <pc:spChg chg="add mod">
-          <ac:chgData name="Brayan Felipe Rojas Bernal" userId="S::b.rojasb@uniandes.edu.co::0e1c8319-9d93-42bd-95ed-f63e83f638a1" providerId="AD" clId="Web-{8A17EEF3-B1A7-AF94-6167-1EDD3B45EBD6}" dt="2025-09-02T04:31:28.643" v="74" actId="20577"/>
-          <ac:spMkLst>
-            <pc:docMk/>
-            <pc:sldMk cId="1316333021" sldId="482"/>
-            <ac:spMk id="11" creationId="{5970FF15-17EE-688D-60A1-46F3556D1E95}"/>
-          </ac:spMkLst>
-        </pc:spChg>
-        <pc:spChg chg="add mod">
-          <ac:chgData name="Brayan Felipe Rojas Bernal" userId="S::b.rojasb@uniandes.edu.co::0e1c8319-9d93-42bd-95ed-f63e83f638a1" providerId="AD" clId="Web-{8A17EEF3-B1A7-AF94-6167-1EDD3B45EBD6}" dt="2025-09-02T04:32:50.319" v="93" actId="1076"/>
-          <ac:spMkLst>
-            <pc:docMk/>
-            <pc:sldMk cId="1316333021" sldId="482"/>
-            <ac:spMk id="13" creationId="{626C37F4-9D86-0FEF-A0F1-88711818FE14}"/>
-          </ac:spMkLst>
-        </pc:spChg>
-        <pc:picChg chg="add mod">
-          <ac:chgData name="Brayan Felipe Rojas Bernal" userId="S::b.rojasb@uniandes.edu.co::0e1c8319-9d93-42bd-95ed-f63e83f638a1" providerId="AD" clId="Web-{8A17EEF3-B1A7-AF94-6167-1EDD3B45EBD6}" dt="2025-09-02T04:30:07.759" v="60" actId="1076"/>
-          <ac:picMkLst>
-            <pc:docMk/>
-            <pc:sldMk cId="1316333021" sldId="482"/>
-            <ac:picMk id="4" creationId="{E11A69F9-AC45-8757-A752-CAAC1F087278}"/>
-          </ac:picMkLst>
-        </pc:picChg>
-        <pc:picChg chg="add mod">
-          <ac:chgData name="Brayan Felipe Rojas Bernal" userId="S::b.rojasb@uniandes.edu.co::0e1c8319-9d93-42bd-95ed-f63e83f638a1" providerId="AD" clId="Web-{8A17EEF3-B1A7-AF94-6167-1EDD3B45EBD6}" dt="2025-09-02T04:31:11.032" v="69" actId="1076"/>
-          <ac:picMkLst>
-            <pc:docMk/>
-            <pc:sldMk cId="1316333021" sldId="482"/>
-            <ac:picMk id="9" creationId="{3469077E-C23B-2D38-7388-720161B77886}"/>
-          </ac:picMkLst>
-        </pc:picChg>
-        <pc:picChg chg="del mod">
-          <ac:chgData name="Brayan Felipe Rojas Bernal" userId="S::b.rojasb@uniandes.edu.co::0e1c8319-9d93-42bd-95ed-f63e83f638a1" providerId="AD" clId="Web-{8A17EEF3-B1A7-AF94-6167-1EDD3B45EBD6}" dt="2025-09-02T04:36:55.074" v="104"/>
-          <ac:picMkLst>
-            <pc:docMk/>
-            <pc:sldMk cId="1316333021" sldId="482"/>
-            <ac:picMk id="30" creationId="{0800F7B3-DA2A-1487-5432-59CC1F6D4D92}"/>
-          </ac:picMkLst>
-        </pc:picChg>
-        <pc:picChg chg="del mod">
-          <ac:chgData name="Brayan Felipe Rojas Bernal" userId="S::b.rojasb@uniandes.edu.co::0e1c8319-9d93-42bd-95ed-f63e83f638a1" providerId="AD" clId="Web-{8A17EEF3-B1A7-AF94-6167-1EDD3B45EBD6}" dt="2025-09-02T04:33:02.616" v="97"/>
-          <ac:picMkLst>
-            <pc:docMk/>
-            <pc:sldMk cId="1316333021" sldId="482"/>
-            <ac:picMk id="32" creationId="{DC457D1A-2F76-B783-A81F-CD1F1D82A24E}"/>
-          </ac:picMkLst>
-        </pc:picChg>
-        <pc:picChg chg="mod">
-          <ac:chgData name="Brayan Felipe Rojas Bernal" userId="S::b.rojasb@uniandes.edu.co::0e1c8319-9d93-42bd-95ed-f63e83f638a1" providerId="AD" clId="Web-{8A17EEF3-B1A7-AF94-6167-1EDD3B45EBD6}" dt="2025-09-02T04:35:28.183" v="100" actId="1076"/>
-          <ac:picMkLst>
-            <pc:docMk/>
-            <pc:sldMk cId="1316333021" sldId="482"/>
-            <ac:picMk id="33" creationId="{847858CF-2957-800C-BBEA-AD23637A2B67}"/>
-          </ac:picMkLst>
-        </pc:picChg>
-      </pc:sldChg>
-      <pc:sldChg chg="addSp delSp modSp">
-        <pc:chgData name="Brayan Felipe Rojas Bernal" userId="S::b.rojasb@uniandes.edu.co::0e1c8319-9d93-42bd-95ed-f63e83f638a1" providerId="AD" clId="Web-{8A17EEF3-B1A7-AF94-6167-1EDD3B45EBD6}" dt="2025-09-02T04:48:26.844" v="260"/>
-        <pc:sldMkLst>
-          <pc:docMk/>
-          <pc:sldMk cId="866889576" sldId="483"/>
-        </pc:sldMkLst>
-        <pc:spChg chg="add del mod topLvl">
-          <ac:chgData name="Brayan Felipe Rojas Bernal" userId="S::b.rojasb@uniandes.edu.co::0e1c8319-9d93-42bd-95ed-f63e83f638a1" providerId="AD" clId="Web-{8A17EEF3-B1A7-AF94-6167-1EDD3B45EBD6}" dt="2025-09-02T04:48:16.922" v="259"/>
-          <ac:spMkLst>
-            <pc:docMk/>
-            <pc:sldMk cId="866889576" sldId="483"/>
-            <ac:spMk id="8" creationId="{281E5B3D-85CE-5DC4-9DBF-BA8C89200656}"/>
-          </ac:spMkLst>
-        </pc:spChg>
-        <pc:spChg chg="add mod">
-          <ac:chgData name="Brayan Felipe Rojas Bernal" userId="S::b.rojasb@uniandes.edu.co::0e1c8319-9d93-42bd-95ed-f63e83f638a1" providerId="AD" clId="Web-{8A17EEF3-B1A7-AF94-6167-1EDD3B45EBD6}" dt="2025-09-02T04:47:31.078" v="239" actId="20577"/>
-          <ac:spMkLst>
-            <pc:docMk/>
-            <pc:sldMk cId="866889576" sldId="483"/>
-            <ac:spMk id="9" creationId="{920F8023-41E5-01A6-67CC-C0913E2D1A54}"/>
-          </ac:spMkLst>
-        </pc:spChg>
-        <pc:grpChg chg="add del">
-          <ac:chgData name="Brayan Felipe Rojas Bernal" userId="S::b.rojasb@uniandes.edu.co::0e1c8319-9d93-42bd-95ed-f63e83f638a1" providerId="AD" clId="Web-{8A17EEF3-B1A7-AF94-6167-1EDD3B45EBD6}" dt="2025-09-02T04:48:12.860" v="256"/>
-          <ac:grpSpMkLst>
-            <pc:docMk/>
-            <pc:sldMk cId="866889576" sldId="483"/>
-            <ac:grpSpMk id="13" creationId="{737C931F-CC2A-22D0-D331-D7C723C62169}"/>
-          </ac:grpSpMkLst>
-        </pc:grpChg>
-        <pc:grpChg chg="add">
-          <ac:chgData name="Brayan Felipe Rojas Bernal" userId="S::b.rojasb@uniandes.edu.co::0e1c8319-9d93-42bd-95ed-f63e83f638a1" providerId="AD" clId="Web-{8A17EEF3-B1A7-AF94-6167-1EDD3B45EBD6}" dt="2025-09-02T04:48:26.844" v="260"/>
-          <ac:grpSpMkLst>
-            <pc:docMk/>
-            <pc:sldMk cId="866889576" sldId="483"/>
-            <ac:grpSpMk id="14" creationId="{BBFAD93D-B4CC-F197-99E0-9491EEFE9B85}"/>
-          </ac:grpSpMkLst>
-        </pc:grpChg>
-        <pc:picChg chg="add mod">
-          <ac:chgData name="Brayan Felipe Rojas Bernal" userId="S::b.rojasb@uniandes.edu.co::0e1c8319-9d93-42bd-95ed-f63e83f638a1" providerId="AD" clId="Web-{8A17EEF3-B1A7-AF94-6167-1EDD3B45EBD6}" dt="2025-09-02T04:39:10.122" v="115" actId="1076"/>
-          <ac:picMkLst>
-            <pc:docMk/>
-            <pc:sldMk cId="866889576" sldId="483"/>
-            <ac:picMk id="9" creationId="{85F8D5FC-6002-AAD8-40DD-7D7D025B60CA}"/>
-          </ac:picMkLst>
-        </pc:picChg>
-        <pc:picChg chg="add mod modCrop">
-          <ac:chgData name="Brayan Felipe Rojas Bernal" userId="S::b.rojasb@uniandes.edu.co::0e1c8319-9d93-42bd-95ed-f63e83f638a1" providerId="AD" clId="Web-{8A17EEF3-B1A7-AF94-6167-1EDD3B45EBD6}" dt="2025-09-02T04:42:21.826" v="122" actId="1076"/>
-          <ac:picMkLst>
-            <pc:docMk/>
-            <pc:sldMk cId="866889576" sldId="483"/>
-            <ac:picMk id="10" creationId="{FB89661D-D2B5-9AB5-8F62-DA62E840A241}"/>
-          </ac:picMkLst>
-        </pc:picChg>
-        <pc:picChg chg="add del mod topLvl">
-          <ac:chgData name="Brayan Felipe Rojas Bernal" userId="S::b.rojasb@uniandes.edu.co::0e1c8319-9d93-42bd-95ed-f63e83f638a1" providerId="AD" clId="Web-{8A17EEF3-B1A7-AF94-6167-1EDD3B45EBD6}" dt="2025-09-02T04:48:14.594" v="257" actId="1076"/>
-          <ac:picMkLst>
-            <pc:docMk/>
-            <pc:sldMk cId="866889576" sldId="483"/>
-            <ac:picMk id="12" creationId="{DA8CD3B6-3F82-5DD7-D749-66FE2301CE93}"/>
-          </ac:picMkLst>
-        </pc:picChg>
-        <pc:picChg chg="mod">
-          <ac:chgData name="Brayan Felipe Rojas Bernal" userId="S::b.rojasb@uniandes.edu.co::0e1c8319-9d93-42bd-95ed-f63e83f638a1" providerId="AD" clId="Web-{8A17EEF3-B1A7-AF94-6167-1EDD3B45EBD6}" dt="2025-09-02T04:41:19.310" v="116" actId="1076"/>
-          <ac:picMkLst>
-            <pc:docMk/>
-            <pc:sldMk cId="866889576" sldId="483"/>
-            <ac:picMk id="17" creationId="{CC983B16-6FF0-BC5D-2EED-51DAC0B4409D}"/>
-          </ac:picMkLst>
-        </pc:picChg>
-      </pc:sldChg>
-    </pc:docChg>
-  </pc:docChgLst>
-</pc:chgInfo>
 </file>
 
 <file path=ppt/handoutMasters/handoutMaster1.xml><?xml version="1.0" encoding="utf-8"?>
@@ -1784,7 +258,7 @@
           <a:p>
             <a:fld id="{9E7CEA7A-8677-4FDA-B3F8-0F442B823CF2}" type="datetimeFigureOut">
               <a:rPr lang="es-CO" smtClean="0"/>
-              <a:t>1/09/2025</a:t>
+              <a:t>2/09/2025</a:t>
             </a:fld>
             <a:endParaRPr lang="es-CO"/>
           </a:p>
@@ -1850,7 +324,7 @@
           <a:p>
             <a:fld id="{B4AA10B8-D2AD-4939-8FB4-21E6196E416D}" type="slidenum">
               <a:rPr lang="es-CO" smtClean="0"/>
-              <a:t>‹#›</a:t>
+              <a:t>‹Nº›</a:t>
             </a:fld>
             <a:endParaRPr lang="es-CO"/>
           </a:p>
@@ -1950,7 +424,7 @@
           <a:p>
             <a:fld id="{3CF76EF8-CCBC-4AD8-9A62-F8ABF7C63A58}" type="datetimeFigureOut">
               <a:rPr lang="es-CO" smtClean="0"/>
-              <a:t>1/09/2025</a:t>
+              <a:t>2/09/2025</a:t>
             </a:fld>
             <a:endParaRPr lang="es-CO"/>
           </a:p>
@@ -2109,7 +583,7 @@
           <a:p>
             <a:fld id="{39CE3E00-5BD7-44D7-B945-08D1EB9B6B4C}" type="slidenum">
               <a:rPr lang="es-CO" smtClean="0"/>
-              <a:t>‹#›</a:t>
+              <a:t>‹Nº›</a:t>
             </a:fld>
             <a:endParaRPr lang="es-CO"/>
           </a:p>
@@ -3187,7 +1661,7 @@
         <p:cNvPr id="1" name="">
           <a:extLst>
             <a:ext uri="{FF2B5EF4-FFF2-40B4-BE49-F238E27FC236}">
-              <a16:creationId xmlns:a16="http://schemas.microsoft.com/office/drawing/2014/main" id="{868A36B6-013A-4AEE-943E-31D485EE678C}"/>
+              <a16:creationId xmlns:a16="http://schemas.microsoft.com/office/drawing/2014/main" id="{004789C5-3EC1-67A4-C117-146B31686C67}"/>
             </a:ext>
           </a:extLst>
         </p:cNvPr>
@@ -3207,7 +1681,7 @@
           <p:cNvPr id="2" name="Slide Image Placeholder 1">
             <a:extLst>
               <a:ext uri="{FF2B5EF4-FFF2-40B4-BE49-F238E27FC236}">
-                <a16:creationId xmlns:a16="http://schemas.microsoft.com/office/drawing/2014/main" id="{3A3CFC94-E6A3-755D-82B9-F4E9AB5B408C}"/>
+                <a16:creationId xmlns:a16="http://schemas.microsoft.com/office/drawing/2014/main" id="{FEBF555A-A43A-8856-4D50-F6E5FEDC5C10}"/>
               </a:ext>
             </a:extLst>
           </p:cNvPr>
@@ -3225,7 +1699,7 @@
           <p:cNvPr id="3" name="Notes Placeholder 2">
             <a:extLst>
               <a:ext uri="{FF2B5EF4-FFF2-40B4-BE49-F238E27FC236}">
-                <a16:creationId xmlns:a16="http://schemas.microsoft.com/office/drawing/2014/main" id="{86B4B9F8-259D-C9B4-763E-95A9A34BE188}"/>
+                <a16:creationId xmlns:a16="http://schemas.microsoft.com/office/drawing/2014/main" id="{26637D2E-832A-9F34-A357-F0DC2FCFD841}"/>
               </a:ext>
             </a:extLst>
           </p:cNvPr>
@@ -3250,7 +1724,7 @@
           <p:cNvPr id="4" name="Slide Number Placeholder 3">
             <a:extLst>
               <a:ext uri="{FF2B5EF4-FFF2-40B4-BE49-F238E27FC236}">
-                <a16:creationId xmlns:a16="http://schemas.microsoft.com/office/drawing/2014/main" id="{3B2505A4-425D-8873-BB96-AF201749EA04}"/>
+                <a16:creationId xmlns:a16="http://schemas.microsoft.com/office/drawing/2014/main" id="{A67B3E74-72F6-5EA9-06D4-D069AAA3AFAC}"/>
               </a:ext>
             </a:extLst>
           </p:cNvPr>
@@ -3277,7 +1751,7 @@
     </p:spTree>
     <p:extLst>
       <p:ext uri="{BB962C8B-B14F-4D97-AF65-F5344CB8AC3E}">
-        <p14:creationId xmlns:p14="http://schemas.microsoft.com/office/powerpoint/2010/main" val="3796428311"/>
+        <p14:creationId xmlns:p14="http://schemas.microsoft.com/office/powerpoint/2010/main" val="3604112601"/>
       </p:ext>
     </p:extLst>
   </p:cSld>
@@ -3487,7 +1961,7 @@
         <p:cNvPr id="1" name="">
           <a:extLst>
             <a:ext uri="{FF2B5EF4-FFF2-40B4-BE49-F238E27FC236}">
-              <a16:creationId xmlns:a16="http://schemas.microsoft.com/office/drawing/2014/main" id="{FC49CC12-09F0-74A5-CD53-DE005E912EC2}"/>
+              <a16:creationId xmlns:a16="http://schemas.microsoft.com/office/drawing/2014/main" id="{868A36B6-013A-4AEE-943E-31D485EE678C}"/>
             </a:ext>
           </a:extLst>
         </p:cNvPr>
@@ -3507,7 +1981,7 @@
           <p:cNvPr id="2" name="Slide Image Placeholder 1">
             <a:extLst>
               <a:ext uri="{FF2B5EF4-FFF2-40B4-BE49-F238E27FC236}">
-                <a16:creationId xmlns:a16="http://schemas.microsoft.com/office/drawing/2014/main" id="{DA44CF05-EBDE-B214-D5F0-9A5D2F1B2041}"/>
+                <a16:creationId xmlns:a16="http://schemas.microsoft.com/office/drawing/2014/main" id="{3A3CFC94-E6A3-755D-82B9-F4E9AB5B408C}"/>
               </a:ext>
             </a:extLst>
           </p:cNvPr>
@@ -3525,7 +1999,7 @@
           <p:cNvPr id="3" name="Notes Placeholder 2">
             <a:extLst>
               <a:ext uri="{FF2B5EF4-FFF2-40B4-BE49-F238E27FC236}">
-                <a16:creationId xmlns:a16="http://schemas.microsoft.com/office/drawing/2014/main" id="{9E4FEBF7-8267-9AD5-7810-B08CDA92C52C}"/>
+                <a16:creationId xmlns:a16="http://schemas.microsoft.com/office/drawing/2014/main" id="{86B4B9F8-259D-C9B4-763E-95A9A34BE188}"/>
               </a:ext>
             </a:extLst>
           </p:cNvPr>
@@ -3550,7 +2024,7 @@
           <p:cNvPr id="4" name="Slide Number Placeholder 3">
             <a:extLst>
               <a:ext uri="{FF2B5EF4-FFF2-40B4-BE49-F238E27FC236}">
-                <a16:creationId xmlns:a16="http://schemas.microsoft.com/office/drawing/2014/main" id="{082CBC96-FF31-80A0-6DCB-5F304C7058E5}"/>
+                <a16:creationId xmlns:a16="http://schemas.microsoft.com/office/drawing/2014/main" id="{3B2505A4-425D-8873-BB96-AF201749EA04}"/>
               </a:ext>
             </a:extLst>
           </p:cNvPr>
@@ -3577,7 +2051,7 @@
     </p:spTree>
     <p:extLst>
       <p:ext uri="{BB962C8B-B14F-4D97-AF65-F5344CB8AC3E}">
-        <p14:creationId xmlns:p14="http://schemas.microsoft.com/office/powerpoint/2010/main" val="3531819309"/>
+        <p14:creationId xmlns:p14="http://schemas.microsoft.com/office/powerpoint/2010/main" val="3796428311"/>
       </p:ext>
     </p:extLst>
   </p:cSld>
@@ -4487,90 +2961,6 @@
 </p:notes>
 </file>
 
-<file path=ppt/notesSlides/notesSlide30.xml><?xml version="1.0" encoding="utf-8"?>
-<p:notes xmlns:a="http://schemas.openxmlformats.org/drawingml/2006/main" xmlns:r="http://schemas.openxmlformats.org/officeDocument/2006/relationships" xmlns:p="http://schemas.openxmlformats.org/presentationml/2006/main">
-  <p:cSld>
-    <p:spTree>
-      <p:nvGrpSpPr>
-        <p:cNvPr id="1" name=""/>
-        <p:cNvGrpSpPr/>
-        <p:nvPr/>
-      </p:nvGrpSpPr>
-      <p:grpSpPr>
-        <a:xfrm>
-          <a:off x="0" y="0"/>
-          <a:ext cx="0" cy="0"/>
-          <a:chOff x="0" y="0"/>
-          <a:chExt cx="0" cy="0"/>
-        </a:xfrm>
-      </p:grpSpPr>
-      <p:sp>
-        <p:nvSpPr>
-          <p:cNvPr id="2" name="Slide Image Placeholder 1"/>
-          <p:cNvSpPr>
-            <a:spLocks noGrp="1" noRot="1" noChangeAspect="1"/>
-          </p:cNvSpPr>
-          <p:nvPr>
-            <p:ph type="sldImg"/>
-          </p:nvPr>
-        </p:nvSpPr>
-        <p:spPr/>
-      </p:sp>
-      <p:sp>
-        <p:nvSpPr>
-          <p:cNvPr id="3" name="Notes Placeholder 2"/>
-          <p:cNvSpPr>
-            <a:spLocks noGrp="1"/>
-          </p:cNvSpPr>
-          <p:nvPr>
-            <p:ph type="body" idx="1"/>
-          </p:nvPr>
-        </p:nvSpPr>
-        <p:spPr/>
-        <p:txBody>
-          <a:bodyPr/>
-          <a:lstStyle/>
-          <a:p>
-            <a:endParaRPr lang="es-CO"/>
-          </a:p>
-        </p:txBody>
-      </p:sp>
-      <p:sp>
-        <p:nvSpPr>
-          <p:cNvPr id="4" name="Slide Number Placeholder 3"/>
-          <p:cNvSpPr>
-            <a:spLocks noGrp="1"/>
-          </p:cNvSpPr>
-          <p:nvPr>
-            <p:ph type="sldNum" sz="quarter" idx="10"/>
-          </p:nvPr>
-        </p:nvSpPr>
-        <p:spPr/>
-        <p:txBody>
-          <a:bodyPr/>
-          <a:lstStyle/>
-          <a:p>
-            <a:fld id="{39CE3E00-5BD7-44D7-B945-08D1EB9B6B4C}" type="slidenum">
-              <a:rPr lang="es-CO" smtClean="0"/>
-              <a:t>31</a:t>
-            </a:fld>
-            <a:endParaRPr lang="es-CO"/>
-          </a:p>
-        </p:txBody>
-      </p:sp>
-    </p:spTree>
-    <p:extLst>
-      <p:ext uri="{BB962C8B-B14F-4D97-AF65-F5344CB8AC3E}">
-        <p14:creationId xmlns:p14="http://schemas.microsoft.com/office/powerpoint/2010/main" val="3827556090"/>
-      </p:ext>
-    </p:extLst>
-  </p:cSld>
-  <p:clrMapOvr>
-    <a:masterClrMapping/>
-  </p:clrMapOvr>
-</p:notes>
-</file>
-
 <file path=ppt/notesSlides/notesSlide4.xml><?xml version="1.0" encoding="utf-8"?>
 <p:notes xmlns:a="http://schemas.openxmlformats.org/drawingml/2006/main" xmlns:r="http://schemas.openxmlformats.org/officeDocument/2006/relationships" xmlns:p="http://schemas.openxmlformats.org/presentationml/2006/main">
   <p:cSld>
@@ -5321,7 +3711,7 @@
             <a:fld id="{0AEE6DC9-5AC4-4174-887C-07A615CCC701}" type="slidenum">
               <a:rPr lang="es-CO" smtClean="0"/>
               <a:pPr/>
-              <a:t>‹#›</a:t>
+              <a:t>‹Nº›</a:t>
             </a:fld>
             <a:endParaRPr lang="es-CO"/>
           </a:p>
@@ -5845,7 +4235,7 @@
             <a:fld id="{0AEE6DC9-5AC4-4174-887C-07A615CCC701}" type="slidenum">
               <a:rPr lang="es-CO" smtClean="0"/>
               <a:pPr/>
-              <a:t>‹#›</a:t>
+              <a:t>‹Nº›</a:t>
             </a:fld>
             <a:endParaRPr lang="es-CO"/>
           </a:p>
@@ -6360,7 +4750,7 @@
             <a:fld id="{0AEE6DC9-5AC4-4174-887C-07A615CCC701}" type="slidenum">
               <a:rPr lang="es-CO" smtClean="0"/>
               <a:pPr/>
-              <a:t>‹#›</a:t>
+              <a:t>‹Nº›</a:t>
             </a:fld>
             <a:endParaRPr lang="es-CO"/>
           </a:p>
@@ -6872,7 +5262,7 @@
             <a:fld id="{0AEE6DC9-5AC4-4174-887C-07A615CCC701}" type="slidenum">
               <a:rPr lang="es-CO" smtClean="0"/>
               <a:pPr/>
-              <a:t>‹#›</a:t>
+              <a:t>‹Nº›</a:t>
             </a:fld>
             <a:endParaRPr lang="es-CO"/>
           </a:p>
@@ -7286,7 +5676,7 @@
             <a:fld id="{0AEE6DC9-5AC4-4174-887C-07A615CCC701}" type="slidenum">
               <a:rPr lang="es-CO" smtClean="0"/>
               <a:pPr/>
-              <a:t>‹#›</a:t>
+              <a:t>‹Nº›</a:t>
             </a:fld>
             <a:endParaRPr lang="es-CO"/>
           </a:p>
@@ -7919,7 +6309,7 @@
             <a:fld id="{0AEE6DC9-5AC4-4174-887C-07A615CCC701}" type="slidenum">
               <a:rPr lang="es-CO" smtClean="0"/>
               <a:pPr/>
-              <a:t>‹#›</a:t>
+              <a:t>‹Nº›</a:t>
             </a:fld>
             <a:endParaRPr lang="es-CO"/>
           </a:p>
@@ -8552,7 +6942,7 @@
             <a:fld id="{0AEE6DC9-5AC4-4174-887C-07A615CCC701}" type="slidenum">
               <a:rPr lang="es-CO" smtClean="0"/>
               <a:pPr/>
-              <a:t>‹#›</a:t>
+              <a:t>‹Nº›</a:t>
             </a:fld>
             <a:endParaRPr lang="es-CO"/>
           </a:p>
@@ -9046,7 +7436,7 @@
             <a:fld id="{0AEE6DC9-5AC4-4174-887C-07A615CCC701}" type="slidenum">
               <a:rPr lang="es-CO" smtClean="0"/>
               <a:pPr/>
-              <a:t>‹#›</a:t>
+              <a:t>‹Nº›</a:t>
             </a:fld>
             <a:endParaRPr lang="es-CO"/>
           </a:p>
@@ -9736,7 +8126,7 @@
             <a:fld id="{0AEE6DC9-5AC4-4174-887C-07A615CCC701}" type="slidenum">
               <a:rPr lang="es-CO" smtClean="0"/>
               <a:pPr/>
-              <a:t>‹#›</a:t>
+              <a:t>‹Nº›</a:t>
             </a:fld>
             <a:endParaRPr lang="es-CO"/>
           </a:p>
@@ -10405,7 +8795,7 @@
             <a:fld id="{0AEE6DC9-5AC4-4174-887C-07A615CCC701}" type="slidenum">
               <a:rPr lang="es-CO" smtClean="0"/>
               <a:pPr/>
-              <a:t>‹#›</a:t>
+              <a:t>‹Nº›</a:t>
             </a:fld>
             <a:endParaRPr lang="es-CO"/>
           </a:p>
@@ -10880,7 +9270,7 @@
             <a:fld id="{0AEE6DC9-5AC4-4174-887C-07A615CCC701}" type="slidenum">
               <a:rPr lang="es-CO" smtClean="0"/>
               <a:pPr/>
-              <a:t>‹#›</a:t>
+              <a:t>‹Nº›</a:t>
             </a:fld>
             <a:endParaRPr lang="es-CO"/>
           </a:p>
@@ -11355,7 +9745,7 @@
             <a:fld id="{0AEE6DC9-5AC4-4174-887C-07A615CCC701}" type="slidenum">
               <a:rPr lang="es-CO" smtClean="0"/>
               <a:pPr/>
-              <a:t>‹#›</a:t>
+              <a:t>‹Nº›</a:t>
             </a:fld>
             <a:endParaRPr lang="es-CO"/>
           </a:p>
@@ -11935,7 +10325,7 @@
             <a:fld id="{0AEE6DC9-5AC4-4174-887C-07A615CCC701}" type="slidenum">
               <a:rPr lang="es-CO" smtClean="0"/>
               <a:pPr/>
-              <a:t>‹#›</a:t>
+              <a:t>‹Nº›</a:t>
             </a:fld>
             <a:endParaRPr lang="es-CO"/>
           </a:p>
@@ -12605,7 +10995,7 @@
             <a:fld id="{0AEE6DC9-5AC4-4174-887C-07A615CCC701}" type="slidenum">
               <a:rPr lang="es-CO" smtClean="0"/>
               <a:pPr/>
-              <a:t>‹#›</a:t>
+              <a:t>‹Nº›</a:t>
             </a:fld>
             <a:endParaRPr lang="es-CO"/>
           </a:p>
@@ -13347,7 +11737,7 @@
             <a:fld id="{0AEE6DC9-5AC4-4174-887C-07A615CCC701}" type="slidenum">
               <a:rPr lang="es-CO" smtClean="0"/>
               <a:pPr/>
-              <a:t>‹#›</a:t>
+              <a:t>‹Nº›</a:t>
             </a:fld>
             <a:endParaRPr lang="es-CO"/>
           </a:p>
@@ -14083,7 +12473,7 @@
             <a:fld id="{0AEE6DC9-5AC4-4174-887C-07A615CCC701}" type="slidenum">
               <a:rPr lang="es-CO" smtClean="0"/>
               <a:pPr/>
-              <a:t>‹#›</a:t>
+              <a:t>‹Nº›</a:t>
             </a:fld>
             <a:endParaRPr lang="es-CO"/>
           </a:p>
@@ -14748,7 +13138,7 @@
             <a:fld id="{0AEE6DC9-5AC4-4174-887C-07A615CCC701}" type="slidenum">
               <a:rPr lang="es-CO" smtClean="0"/>
               <a:pPr/>
-              <a:t>‹#›</a:t>
+              <a:t>‹Nº›</a:t>
             </a:fld>
             <a:endParaRPr lang="es-CO"/>
           </a:p>
@@ -15223,7 +13613,7 @@
             <a:fld id="{0AEE6DC9-5AC4-4174-887C-07A615CCC701}" type="slidenum">
               <a:rPr lang="es-CO" smtClean="0"/>
               <a:pPr/>
-              <a:t>‹#›</a:t>
+              <a:t>‹Nº›</a:t>
             </a:fld>
             <a:endParaRPr lang="es-CO"/>
           </a:p>
@@ -15569,7 +13959,7 @@
             <a:fld id="{0AEE6DC9-5AC4-4174-887C-07A615CCC701}" type="slidenum">
               <a:rPr lang="es-CO" smtClean="0"/>
               <a:pPr/>
-              <a:t>‹#›</a:t>
+              <a:t>‹Nº›</a:t>
             </a:fld>
             <a:endParaRPr lang="es-CO"/>
           </a:p>
@@ -16010,7 +14400,7 @@
             <a:fld id="{0AEE6DC9-5AC4-4174-887C-07A615CCC701}" type="slidenum">
               <a:rPr lang="es-CO" smtClean="0"/>
               <a:pPr/>
-              <a:t>‹#›</a:t>
+              <a:t>‹Nº›</a:t>
             </a:fld>
             <a:endParaRPr lang="es-CO"/>
           </a:p>
@@ -26257,10 +24647,10 @@
       </p:sp>
       <p:pic>
         <p:nvPicPr>
-          <p:cNvPr id="2" name="Picture 1" descr="A diagram of a company&#10;&#10;AI-generated content may be incorrect.">
+          <p:cNvPr id="4" name="Picture 3" descr="A diagram of a company&#10;&#10;AI-generated content may be incorrect.">
             <a:extLst>
               <a:ext uri="{FF2B5EF4-FFF2-40B4-BE49-F238E27FC236}">
-                <a16:creationId xmlns:a16="http://schemas.microsoft.com/office/drawing/2014/main" id="{A31AEC50-4EEE-5B6D-C348-D47612B3A473}"/>
+                <a16:creationId xmlns:a16="http://schemas.microsoft.com/office/drawing/2014/main" id="{3B2DBB52-21A9-7B03-1EBC-8A8D23C1AD61}"/>
               </a:ext>
             </a:extLst>
           </p:cNvPr>
@@ -26277,8 +24667,8 @@
         </p:blipFill>
         <p:spPr>
           <a:xfrm>
-            <a:off x="1957874" y="1341783"/>
-            <a:ext cx="4453001" cy="4691270"/>
+            <a:off x="1550846" y="1521069"/>
+            <a:ext cx="5813710" cy="4598377"/>
           </a:xfrm>
           <a:prstGeom prst="rect">
             <a:avLst/>
@@ -26555,7 +24945,7 @@
         <p:cNvPr id="1" name="">
           <a:extLst>
             <a:ext uri="{FF2B5EF4-FFF2-40B4-BE49-F238E27FC236}">
-              <a16:creationId xmlns:a16="http://schemas.microsoft.com/office/drawing/2014/main" id="{10643349-5028-2BE5-9680-144B720D5220}"/>
+              <a16:creationId xmlns:a16="http://schemas.microsoft.com/office/drawing/2014/main" id="{E3F29CC7-BE28-4299-824F-58B49BE96DC4}"/>
             </a:ext>
           </a:extLst>
         </p:cNvPr>
@@ -26575,7 +24965,7 @@
           <p:cNvPr id="3" name="Slide Number Placeholder 2">
             <a:extLst>
               <a:ext uri="{FF2B5EF4-FFF2-40B4-BE49-F238E27FC236}">
-                <a16:creationId xmlns:a16="http://schemas.microsoft.com/office/drawing/2014/main" id="{609060AE-609F-F52A-4A9B-A5E3086B928C}"/>
+                <a16:creationId xmlns:a16="http://schemas.microsoft.com/office/drawing/2014/main" id="{D77AB289-1619-E88C-BEE4-5AAA16BAE53F}"/>
               </a:ext>
             </a:extLst>
           </p:cNvPr>
@@ -26605,7 +24995,7 @@
           <p:cNvPr id="6" name="Footer Placeholder 5">
             <a:extLst>
               <a:ext uri="{FF2B5EF4-FFF2-40B4-BE49-F238E27FC236}">
-                <a16:creationId xmlns:a16="http://schemas.microsoft.com/office/drawing/2014/main" id="{DB3EF75D-B9AA-3588-C206-CC277DA9DCE3}"/>
+                <a16:creationId xmlns:a16="http://schemas.microsoft.com/office/drawing/2014/main" id="{2749601C-439F-1380-9B38-24826151F361}"/>
               </a:ext>
             </a:extLst>
           </p:cNvPr>
@@ -26736,7 +25126,7 @@
           <p:cNvPr id="7" name="TextBox 6">
             <a:extLst>
               <a:ext uri="{FF2B5EF4-FFF2-40B4-BE49-F238E27FC236}">
-                <a16:creationId xmlns:a16="http://schemas.microsoft.com/office/drawing/2014/main" id="{2DBED479-FB19-E089-1C6E-2AE0B82F2A0C}"/>
+                <a16:creationId xmlns:a16="http://schemas.microsoft.com/office/drawing/2014/main" id="{3ADEE1EF-6D9E-6AD3-EDA1-DBE3EAF42E1D}"/>
               </a:ext>
             </a:extLst>
           </p:cNvPr>
@@ -26765,7 +25155,7 @@
           <a:p>
             <a:r>
               <a:rPr lang="es-ES_tradnl" sz="1200" b="1"/>
-              <a:t>Vista de Despliegue -  Diagrama de despliegue</a:t>
+              <a:t>Vista Funcional -  Diagrama de componentes – Zoom componente Notificaciones</a:t>
             </a:r>
             <a:endParaRPr lang="es-ES_tradnl" sz="1200"/>
           </a:p>
@@ -26773,10 +25163,10 @@
       </p:sp>
       <p:pic>
         <p:nvPicPr>
-          <p:cNvPr id="2" name="Imagen 1" descr="Diagrama&#10;&#10;El contenido generado por IA puede ser incorrecto.">
+          <p:cNvPr id="2" name="Picture 1" descr="A diagram of a company&#10;&#10;AI-generated content may be incorrect.">
             <a:extLst>
               <a:ext uri="{FF2B5EF4-FFF2-40B4-BE49-F238E27FC236}">
-                <a16:creationId xmlns:a16="http://schemas.microsoft.com/office/drawing/2014/main" id="{AE1EE4F7-F4E1-BA9A-4E59-ABF48953B124}"/>
+                <a16:creationId xmlns:a16="http://schemas.microsoft.com/office/drawing/2014/main" id="{CC8B82D4-16EA-2300-2371-D4B832A7C152}"/>
               </a:ext>
             </a:extLst>
           </p:cNvPr>
@@ -26793,54 +25183,18 @@
         </p:blipFill>
         <p:spPr>
           <a:xfrm>
-            <a:off x="2516219" y="1342239"/>
-            <a:ext cx="4101076" cy="4792212"/>
+            <a:off x="1985667" y="1556238"/>
+            <a:ext cx="5181461" cy="4317024"/>
           </a:xfrm>
           <a:prstGeom prst="rect">
             <a:avLst/>
           </a:prstGeom>
         </p:spPr>
       </p:pic>
-      <p:cxnSp>
-        <p:nvCxnSpPr>
-          <p:cNvPr id="4" name="Straight Arrow Connector 3">
-            <a:extLst>
-              <a:ext uri="{FF2B5EF4-FFF2-40B4-BE49-F238E27FC236}">
-                <a16:creationId xmlns:a16="http://schemas.microsoft.com/office/drawing/2014/main" id="{69E9DF3D-CDB2-F19D-05C9-F2F67715CC0D}"/>
-              </a:ext>
-            </a:extLst>
-          </p:cNvPr>
-          <p:cNvCxnSpPr/>
-          <p:nvPr/>
-        </p:nvCxnSpPr>
-        <p:spPr>
-          <a:xfrm flipH="1">
-            <a:off x="4203362" y="5169238"/>
-            <a:ext cx="15775" cy="146126"/>
-          </a:xfrm>
-          <a:prstGeom prst="straightConnector1">
-            <a:avLst/>
-          </a:prstGeom>
-        </p:spPr>
-        <p:style>
-          <a:lnRef idx="1">
-            <a:schemeClr val="accent1"/>
-          </a:lnRef>
-          <a:fillRef idx="0">
-            <a:schemeClr val="accent1"/>
-          </a:fillRef>
-          <a:effectRef idx="0">
-            <a:schemeClr val="accent1"/>
-          </a:effectRef>
-          <a:fontRef idx="minor">
-            <a:schemeClr val="tx1"/>
-          </a:fontRef>
-        </p:style>
-      </p:cxnSp>
     </p:spTree>
     <p:extLst>
       <p:ext uri="{BB962C8B-B14F-4D97-AF65-F5344CB8AC3E}">
-        <p14:creationId xmlns:p14="http://schemas.microsoft.com/office/powerpoint/2010/main" val="4288963705"/>
+        <p14:creationId xmlns:p14="http://schemas.microsoft.com/office/powerpoint/2010/main" val="2599996582"/>
       </p:ext>
     </p:extLst>
   </p:cSld>
@@ -27125,7 +25479,7 @@
         <p:cNvPr id="1" name="">
           <a:extLst>
             <a:ext uri="{FF2B5EF4-FFF2-40B4-BE49-F238E27FC236}">
-              <a16:creationId xmlns:a16="http://schemas.microsoft.com/office/drawing/2014/main" id="{D8BD8A02-5AB2-C6B5-7EC2-DD9D8020586E}"/>
+              <a16:creationId xmlns:a16="http://schemas.microsoft.com/office/drawing/2014/main" id="{10643349-5028-2BE5-9680-144B720D5220}"/>
             </a:ext>
           </a:extLst>
         </p:cNvPr>
@@ -27145,7 +25499,7 @@
           <p:cNvPr id="3" name="Slide Number Placeholder 2">
             <a:extLst>
               <a:ext uri="{FF2B5EF4-FFF2-40B4-BE49-F238E27FC236}">
-                <a16:creationId xmlns:a16="http://schemas.microsoft.com/office/drawing/2014/main" id="{3D9D52ED-2179-23B7-8719-CAF9887D1EB5}"/>
+                <a16:creationId xmlns:a16="http://schemas.microsoft.com/office/drawing/2014/main" id="{609060AE-609F-F52A-4A9B-A5E3086B928C}"/>
               </a:ext>
             </a:extLst>
           </p:cNvPr>
@@ -27175,7 +25529,7 @@
           <p:cNvPr id="6" name="Footer Placeholder 5">
             <a:extLst>
               <a:ext uri="{FF2B5EF4-FFF2-40B4-BE49-F238E27FC236}">
-                <a16:creationId xmlns:a16="http://schemas.microsoft.com/office/drawing/2014/main" id="{EE49B0E9-A68E-D2E4-53E7-84C3D043D316}"/>
+                <a16:creationId xmlns:a16="http://schemas.microsoft.com/office/drawing/2014/main" id="{DB3EF75D-B9AA-3588-C206-CC277DA9DCE3}"/>
               </a:ext>
             </a:extLst>
           </p:cNvPr>
@@ -27306,7 +25660,7 @@
           <p:cNvPr id="7" name="TextBox 6">
             <a:extLst>
               <a:ext uri="{FF2B5EF4-FFF2-40B4-BE49-F238E27FC236}">
-                <a16:creationId xmlns:a16="http://schemas.microsoft.com/office/drawing/2014/main" id="{89200B14-9632-309F-25C9-B4AE0B4B0883}"/>
+                <a16:creationId xmlns:a16="http://schemas.microsoft.com/office/drawing/2014/main" id="{2DBED479-FB19-E089-1C6E-2AE0B82F2A0C}"/>
               </a:ext>
             </a:extLst>
           </p:cNvPr>
@@ -27328,23 +25682,53 @@
           </a:solidFill>
         </p:spPr>
         <p:txBody>
-          <a:bodyPr wrap="square" rtlCol="0">
+          <a:bodyPr wrap="square" lIns="91440" tIns="45720" rIns="91440" bIns="45720" rtlCol="0" anchor="t">
             <a:spAutoFit/>
           </a:bodyPr>
           <a:lstStyle/>
           <a:p>
             <a:r>
               <a:rPr lang="es-ES_tradnl" sz="1200" b="1"/>
-              <a:t>Vista componentes -  Diagrama de clases</a:t>
+              <a:t>Vista de Despliegue -  Diagrama de despliegue</a:t>
             </a:r>
             <a:endParaRPr lang="es-ES_tradnl" sz="1200"/>
           </a:p>
         </p:txBody>
       </p:sp>
+      <p:pic>
+        <p:nvPicPr>
+          <p:cNvPr id="5" name="Picture 4">
+            <a:extLst>
+              <a:ext uri="{FF2B5EF4-FFF2-40B4-BE49-F238E27FC236}">
+                <a16:creationId xmlns:a16="http://schemas.microsoft.com/office/drawing/2014/main" id="{519AC394-49C6-578C-E66A-F2419965D608}"/>
+              </a:ext>
+            </a:extLst>
+          </p:cNvPr>
+          <p:cNvPicPr>
+            <a:picLocks noChangeAspect="1"/>
+          </p:cNvPicPr>
+          <p:nvPr/>
+        </p:nvPicPr>
+        <p:blipFill>
+          <a:blip r:embed="rId3"/>
+          <a:stretch>
+            <a:fillRect/>
+          </a:stretch>
+        </p:blipFill>
+        <p:spPr>
+          <a:xfrm>
+            <a:off x="2125578" y="1473868"/>
+            <a:ext cx="3894222" cy="4620128"/>
+          </a:xfrm>
+          <a:prstGeom prst="rect">
+            <a:avLst/>
+          </a:prstGeom>
+        </p:spPr>
+      </p:pic>
     </p:spTree>
     <p:extLst>
       <p:ext uri="{BB962C8B-B14F-4D97-AF65-F5344CB8AC3E}">
-        <p14:creationId xmlns:p14="http://schemas.microsoft.com/office/powerpoint/2010/main" val="704289826"/>
+        <p14:creationId xmlns:p14="http://schemas.microsoft.com/office/powerpoint/2010/main" val="4288963705"/>
       </p:ext>
     </p:extLst>
   </p:cSld>
@@ -29334,7 +27718,7 @@
           <p:nvPr>
             <p:extLst>
               <p:ext uri="{D42A27DB-BD31-4B8C-83A1-F6EECF244321}">
-                <p14:modId xmlns:p14="http://schemas.microsoft.com/office/powerpoint/2010/main" val="683286426"/>
+                <p14:modId xmlns:p14="http://schemas.microsoft.com/office/powerpoint/2010/main" val="2147170125"/>
               </p:ext>
             </p:extLst>
           </p:nvPr>
@@ -29389,6 +27773,7 @@
                         <a:rPr lang="en-US" err="1"/>
                         <a:t>Servicio</a:t>
                       </a:r>
+                      <a:endParaRPr lang="en-US" dirty="0" err="1"/>
                     </a:p>
                   </a:txBody>
                   <a:tcPr/>
@@ -29399,7 +27784,7 @@
                     <a:lstStyle/>
                     <a:p>
                       <a:r>
-                        <a:rPr lang="en-US"/>
+                        <a:rPr lang="en-US" dirty="0"/>
                         <a:t>Concepto</a:t>
                       </a:r>
                     </a:p>
@@ -29415,6 +27800,7 @@
                         <a:rPr lang="en-US" err="1"/>
                         <a:t>Cálculo</a:t>
                       </a:r>
+                      <a:endParaRPr lang="en-US" dirty="0" err="1"/>
                     </a:p>
                   </a:txBody>
                   <a:tcPr/>
@@ -29428,7 +27814,7 @@
                         <a:buNone/>
                       </a:pPr>
                       <a:r>
-                        <a:rPr lang="en-US"/>
+                        <a:rPr lang="en-US" dirty="0"/>
                         <a:t>Costo (USD)</a:t>
                       </a:r>
                     </a:p>
@@ -29448,7 +27834,7 @@
                     <a:lstStyle/>
                     <a:p>
                       <a:r>
-                        <a:rPr lang="en-US"/>
+                        <a:rPr lang="en-US" dirty="0"/>
                         <a:t>Lambda</a:t>
                       </a:r>
                     </a:p>
@@ -29464,6 +27850,7 @@
                         <a:rPr lang="en-US" err="1"/>
                         <a:t>Invocaciones</a:t>
                       </a:r>
+                      <a:endParaRPr lang="en-US" dirty="0" err="1"/>
                     </a:p>
                   </a:txBody>
                   <a:tcPr/>
@@ -29474,7 +27861,7 @@
                     <a:lstStyle/>
                     <a:p>
                       <a:r>
-                        <a:rPr lang="en-US"/>
+                        <a:rPr lang="en-US" dirty="0"/>
                         <a:t>(55.16 M /1M) * 0.20 USD</a:t>
                       </a:r>
                     </a:p>
@@ -29490,7 +27877,7 @@
                         <a:buNone/>
                       </a:pPr>
                       <a:r>
-                        <a:rPr lang="en-US"/>
+                        <a:rPr lang="en-US" dirty="0"/>
                         <a:t>$11.03</a:t>
                       </a:r>
                     </a:p>
@@ -29526,6 +27913,7 @@
                         <a:rPr lang="en-US" err="1"/>
                         <a:t>Cómputo</a:t>
                       </a:r>
+                      <a:endParaRPr lang="en-US" dirty="0" err="1"/>
                     </a:p>
                   </a:txBody>
                   <a:tcPr/>
@@ -29539,7 +27927,7 @@
                         <a:buNone/>
                       </a:pPr>
                       <a:r>
-                        <a:rPr lang="en-US"/>
+                        <a:rPr lang="en-US" dirty="0"/>
                         <a:t>56.16M * 0.00000125 USD/INV</a:t>
                       </a:r>
                     </a:p>
@@ -29555,7 +27943,7 @@
                         <a:buNone/>
                       </a:pPr>
                       <a:r>
-                        <a:rPr lang="en-US"/>
+                        <a:rPr lang="en-US" dirty="0"/>
                         <a:t>$70.20</a:t>
                       </a:r>
                     </a:p>
@@ -29578,7 +27966,7 @@
                         <a:buNone/>
                       </a:pPr>
                       <a:r>
-                        <a:rPr lang="en-US"/>
+                        <a:rPr lang="en-US" dirty="0"/>
                         <a:t>SQS</a:t>
                       </a:r>
                     </a:p>
@@ -29594,11 +27982,11 @@
                         <a:buNone/>
                       </a:pPr>
                       <a:r>
-                        <a:rPr lang="en-US" err="1"/>
+                        <a:rPr lang="en-US" dirty="0" err="1"/>
                         <a:t>Mensajes</a:t>
                       </a:r>
                       <a:r>
-                        <a:rPr lang="en-US"/>
+                        <a:rPr lang="en-US" dirty="0"/>
                         <a:t> ON</a:t>
                       </a:r>
                     </a:p>
@@ -29614,7 +28002,7 @@
                         <a:buNone/>
                       </a:pPr>
                       <a:r>
-                        <a:rPr lang="en-US"/>
+                        <a:rPr lang="en-US" dirty="0"/>
                         <a:t>(56'160.000 * 2) -1'000.000</a:t>
                       </a:r>
                     </a:p>
@@ -29630,7 +28018,7 @@
                         <a:buNone/>
                       </a:pPr>
                       <a:r>
-                        <a:rPr lang="en-US"/>
+                        <a:rPr lang="en-US" dirty="0"/>
                         <a:t>$ 44.53</a:t>
                       </a:r>
                     </a:p>
@@ -29663,15 +28051,15 @@
                         <a:buNone/>
                       </a:pPr>
                       <a:r>
-                        <a:rPr lang="en-US" err="1"/>
+                        <a:rPr lang="en-US" dirty="0" err="1"/>
                         <a:t>Mensajes</a:t>
                       </a:r>
                       <a:r>
-                        <a:rPr lang="en-US"/>
+                        <a:rPr lang="en-US" dirty="0"/>
                         <a:t> </a:t>
                       </a:r>
                       <a:r>
-                        <a:rPr lang="en-US" err="1"/>
+                        <a:rPr lang="en-US" dirty="0" err="1"/>
                         <a:t>pico</a:t>
                       </a:r>
                     </a:p>
@@ -29687,15 +28075,15 @@
                         <a:buNone/>
                       </a:pPr>
                       <a:r>
-                        <a:rPr lang="en-US"/>
+                        <a:rPr lang="en-US" dirty="0"/>
                         <a:t>(195.000 </a:t>
                       </a:r>
                       <a:r>
-                        <a:rPr lang="en-US" err="1"/>
+                        <a:rPr lang="en-US" dirty="0" err="1"/>
                         <a:t>msj</a:t>
                       </a:r>
                       <a:r>
-                        <a:rPr lang="en-US"/>
+                        <a:rPr lang="en-US" dirty="0"/>
                         <a:t> * 2) - 1'000.000</a:t>
                       </a:r>
                     </a:p>
@@ -29711,7 +28099,7 @@
                         <a:buNone/>
                       </a:pPr>
                       <a:r>
-                        <a:rPr lang="en-US"/>
+                        <a:rPr lang="en-US" dirty="0"/>
                         <a:t>$ 0.16</a:t>
                       </a:r>
                     </a:p>
@@ -29734,7 +28122,7 @@
                         <a:buNone/>
                       </a:pPr>
                       <a:r>
-                        <a:rPr lang="en-US"/>
+                        <a:rPr lang="en-US" dirty="0"/>
                         <a:t>Total</a:t>
                       </a:r>
                     </a:p>
@@ -29776,7 +28164,7 @@
                         <a:buNone/>
                       </a:pPr>
                       <a:r>
-                        <a:rPr lang="en-US"/>
+                        <a:rPr lang="en-US" dirty="0"/>
                         <a:t>$125.25</a:t>
                       </a:r>
                     </a:p>
@@ -30165,14 +28553,14 @@
             <p:ph idx="1"/>
             <p:extLst>
               <p:ext uri="{D42A27DB-BD31-4B8C-83A1-F6EECF244321}">
-                <p14:modId xmlns:p14="http://schemas.microsoft.com/office/powerpoint/2010/main" val="2844125851"/>
+                <p14:modId xmlns:p14="http://schemas.microsoft.com/office/powerpoint/2010/main" val="1800444504"/>
               </p:ext>
             </p:extLst>
           </p:nvPr>
         </p:nvGraphicFramePr>
         <p:xfrm>
           <a:off x="267882" y="2340398"/>
-          <a:ext cx="8568952" cy="2910297"/>
+          <a:ext cx="8556608" cy="2910297"/>
         </p:xfrm>
         <a:graphic>
           <a:graphicData uri="http://schemas.openxmlformats.org/drawingml/2006/table">
@@ -30181,7 +28569,7 @@
                 <a:tableStyleId>{5C22544A-7EE6-4342-B048-85BDC9FD1C3A}</a:tableStyleId>
               </a:tblPr>
               <a:tblGrid>
-                <a:gridCol w="1670179">
+                <a:gridCol w="1657835">
                   <a:extLst>
                     <a:ext uri="{9D8B030D-6E8A-4147-A177-3AD203B41FA5}">
                       <a16:colId xmlns:a16="http://schemas.microsoft.com/office/drawing/2014/main" val="20000"/>
@@ -30675,14 +29063,14 @@
             <p:ph idx="1"/>
             <p:extLst>
               <p:ext uri="{D42A27DB-BD31-4B8C-83A1-F6EECF244321}">
-                <p14:modId xmlns:p14="http://schemas.microsoft.com/office/powerpoint/2010/main" val="3472241924"/>
+                <p14:modId xmlns:p14="http://schemas.microsoft.com/office/powerpoint/2010/main" val="3028630679"/>
               </p:ext>
             </p:extLst>
           </p:nvPr>
         </p:nvGraphicFramePr>
         <p:xfrm>
           <a:off x="267882" y="2340398"/>
-          <a:ext cx="8568952" cy="2910297"/>
+          <a:ext cx="8568952" cy="3093177"/>
         </p:xfrm>
         <a:graphic>
           <a:graphicData uri="http://schemas.openxmlformats.org/drawingml/2006/table">
@@ -30713,7 +29101,7 @@
                     <a:lstStyle/>
                     <a:p>
                       <a:r>
-                        <a:rPr lang="es-CO" sz="1200"/>
+                        <a:rPr lang="es-CO" sz="1200" dirty="0"/>
                         <a:t>Título del experimento</a:t>
                       </a:r>
                     </a:p>
@@ -30726,7 +29114,7 @@
                     <a:lstStyle/>
                     <a:p>
                       <a:r>
-                        <a:rPr lang="es-CO" sz="1400"/>
+                        <a:rPr lang="es-CO" sz="1400" dirty="0"/>
                         <a:t>Escalabilidad en la creación de mensajes a una alta demanda</a:t>
                       </a:r>
                     </a:p>
@@ -30746,7 +29134,7 @@
                     <a:lstStyle/>
                     <a:p>
                       <a:r>
-                        <a:rPr lang="es-CO" sz="1200"/>
+                        <a:rPr lang="es-CO" sz="1200" dirty="0"/>
                         <a:t>Propósito</a:t>
                       </a:r>
                     </a:p>
@@ -30762,7 +29150,13 @@
                         <a:rPr lang="es-CO" sz="1200" b="0" i="0" u="none" strike="noStrike" noProof="0">
                           <a:latin typeface="Calibri"/>
                         </a:rPr>
-                        <a:t>Evaluar la capacidad del sistema para generar y enviar simultáneamente 6500 notificaciones por minuto en 30 minutos, midiendo cómo AWS Lambda escala en concurrencia bajo condiciones de carga elevada.</a:t>
+                        <a:t>Evaluar la capacidad del sistema para generar y enviar simultáneamente 6500 notificaciones por minuto durante </a:t>
+                      </a:r>
+                      <a:r>
+                        <a:rPr lang="es-CO" sz="1200" b="0" i="0" u="none" strike="noStrike" noProof="0" dirty="0">
+                          <a:latin typeface="Calibri"/>
+                        </a:rPr>
+                        <a:t>30 minutos, midiendo cómo AWS Lambda escala en concurrencia bajo condiciones de carga elevada.</a:t>
                       </a:r>
                       <a:endParaRPr lang="es-CO"/>
                     </a:p>
@@ -30782,7 +29176,7 @@
                     <a:lstStyle/>
                     <a:p>
                       <a:r>
-                        <a:rPr lang="es-CO" sz="1200"/>
+                        <a:rPr lang="es-CO" sz="1200" dirty="0"/>
                         <a:t>Resultados esperados</a:t>
                       </a:r>
                     </a:p>
@@ -30795,12 +29189,12 @@
                     <a:lstStyle/>
                     <a:p>
                       <a:r>
-                        <a:rPr lang="es-CO" sz="1200" b="0" i="0" u="none" strike="noStrike" noProof="0">
+                        <a:rPr lang="es-CO" sz="1200" b="0" i="0" u="none" strike="noStrike" noProof="0" dirty="0">
                           <a:latin typeface="Calibri"/>
                         </a:rPr>
                         <a:t>El sistema debe procesar al 1300 mensaje por minuto en una operación normal mientras que en una operación máxima, este debe tener la capacidad de generar 6500 mensajes por minuto en un tiempo de 30 minutos sin experimentar errores. Se esperan curvas de concurrencia que muestren un escalado lineal hasta el límite de configuraciones de Lambda</a:t>
                       </a:r>
-                      <a:endParaRPr lang="es-CO"/>
+                      <a:endParaRPr lang="es-CO" dirty="0"/>
                     </a:p>
                   </a:txBody>
                   <a:tcPr/>
@@ -30818,7 +29212,7 @@
                     <a:lstStyle/>
                     <a:p>
                       <a:r>
-                        <a:rPr lang="es-CO" sz="1200"/>
+                        <a:rPr lang="es-CO" sz="1200" dirty="0"/>
                         <a:t>Recursos requeridos</a:t>
                       </a:r>
                     </a:p>
@@ -30834,7 +29228,7 @@
                         <a:buNone/>
                       </a:pPr>
                       <a:r>
-                        <a:rPr lang="es-CO" sz="1200" b="0" i="0" u="none" strike="noStrike" noProof="0">
+                        <a:rPr lang="es-CO" sz="1200" b="0" i="0" u="none" strike="noStrike" noProof="0" dirty="0">
                           <a:solidFill>
                             <a:srgbClr val="174970"/>
                           </a:solidFill>
@@ -30842,7 +29236,7 @@
                         </a:rPr>
                         <a:t>Se requiere tener acceso a AWS y a la lambda creada con las colas correspondientes.</a:t>
                       </a:r>
-                      <a:endParaRPr lang="en-US"/>
+                      <a:endParaRPr lang="en-US" dirty="0"/>
                     </a:p>
                   </a:txBody>
                   <a:tcPr/>
@@ -30860,7 +29254,7 @@
                     <a:lstStyle/>
                     <a:p>
                       <a:r>
-                        <a:rPr lang="es-CO" sz="1200"/>
+                        <a:rPr lang="es-CO" sz="1200" dirty="0"/>
                         <a:t>Elementos de arquitectura involucrados</a:t>
                       </a:r>
                     </a:p>
@@ -30873,7 +29267,7 @@
                     <a:lstStyle/>
                     <a:p>
                       <a:r>
-                        <a:rPr lang="es-CO" sz="1200" b="0" i="0" u="none" strike="noStrike" noProof="0">
+                        <a:rPr lang="es-CO" sz="1200" b="0" i="0" u="none" strike="noStrike" noProof="0" dirty="0">
                           <a:solidFill>
                             <a:srgbClr val="174970"/>
                           </a:solidFill>
@@ -30898,7 +29292,7 @@
                     <a:lstStyle/>
                     <a:p>
                       <a:r>
-                        <a:rPr lang="es-CO" sz="1200"/>
+                        <a:rPr lang="es-CO" sz="1200" dirty="0"/>
                         <a:t>Esfuerzo estimado</a:t>
                       </a:r>
                     </a:p>
@@ -30911,7 +29305,7 @@
                     <a:lstStyle/>
                     <a:p>
                       <a:r>
-                        <a:rPr lang="es-CO" sz="1200"/>
+                        <a:rPr lang="es-CO" sz="1200" dirty="0"/>
                         <a:t>48 horas</a:t>
                       </a:r>
                     </a:p>
@@ -32763,383 +31157,6 @@
     <p:extLst>
       <p:ext uri="{BB962C8B-B14F-4D97-AF65-F5344CB8AC3E}">
         <p14:creationId xmlns:p14="http://schemas.microsoft.com/office/powerpoint/2010/main" val="665455168"/>
-      </p:ext>
-    </p:extLst>
-  </p:cSld>
-  <p:clrMapOvr>
-    <a:masterClrMapping/>
-  </p:clrMapOvr>
-</p:sld>
-</file>
-
-<file path=ppt/slides/slide31.xml><?xml version="1.0" encoding="utf-8"?>
-<p:sld xmlns:a="http://schemas.openxmlformats.org/drawingml/2006/main" xmlns:r="http://schemas.openxmlformats.org/officeDocument/2006/relationships" xmlns:p="http://schemas.openxmlformats.org/presentationml/2006/main">
-  <p:cSld>
-    <p:spTree>
-      <p:nvGrpSpPr>
-        <p:cNvPr id="1" name=""/>
-        <p:cNvGrpSpPr/>
-        <p:nvPr/>
-      </p:nvGrpSpPr>
-      <p:grpSpPr>
-        <a:xfrm>
-          <a:off x="0" y="0"/>
-          <a:ext cx="0" cy="0"/>
-          <a:chOff x="0" y="0"/>
-          <a:chExt cx="0" cy="0"/>
-        </a:xfrm>
-      </p:grpSpPr>
-      <p:sp>
-        <p:nvSpPr>
-          <p:cNvPr id="3" name="Slide Number Placeholder 2"/>
-          <p:cNvSpPr>
-            <a:spLocks noGrp="1"/>
-          </p:cNvSpPr>
-          <p:nvPr>
-            <p:ph type="sldNum" sz="quarter" idx="4"/>
-          </p:nvPr>
-        </p:nvSpPr>
-        <p:spPr/>
-        <p:txBody>
-          <a:bodyPr/>
-          <a:lstStyle/>
-          <a:p>
-            <a:fld id="{0AEE6DC9-5AC4-4174-887C-07A615CCC701}" type="slidenum">
-              <a:rPr lang="es-CO" smtClean="0"/>
-              <a:pPr/>
-              <a:t>31</a:t>
-            </a:fld>
-            <a:endParaRPr lang="es-CO"/>
-          </a:p>
-        </p:txBody>
-      </p:sp>
-      <p:sp>
-        <p:nvSpPr>
-          <p:cNvPr id="6" name="Footer Placeholder 5"/>
-          <p:cNvSpPr>
-            <a:spLocks noGrp="1"/>
-          </p:cNvSpPr>
-          <p:nvPr>
-            <p:ph type="ftr" sz="quarter" idx="11"/>
-          </p:nvPr>
-        </p:nvSpPr>
-        <p:spPr>
-          <a:xfrm>
-            <a:off x="2123728" y="6453336"/>
-            <a:ext cx="5256584" cy="365125"/>
-          </a:xfrm>
-          <a:prstGeom prst="rect">
-            <a:avLst/>
-          </a:prstGeom>
-        </p:spPr>
-        <p:txBody>
-          <a:bodyPr/>
-          <a:lstStyle>
-            <a:defPPr>
-              <a:defRPr lang="es-CO"/>
-            </a:defPPr>
-            <a:lvl1pPr marL="0" algn="l" defTabSz="914400" rtl="0" eaLnBrk="1" latinLnBrk="0" hangingPunct="1">
-              <a:defRPr sz="1100" kern="1200">
-                <a:solidFill>
-                  <a:srgbClr val="174970"/>
-                </a:solidFill>
-                <a:latin typeface="+mn-lt"/>
-                <a:ea typeface="+mn-ea"/>
-                <a:cs typeface="+mn-cs"/>
-              </a:defRPr>
-            </a:lvl1pPr>
-            <a:lvl2pPr marL="457200" algn="l" defTabSz="914400" rtl="0" eaLnBrk="1" latinLnBrk="0" hangingPunct="1">
-              <a:defRPr sz="1800" kern="1200">
-                <a:solidFill>
-                  <a:schemeClr val="tx1"/>
-                </a:solidFill>
-                <a:latin typeface="+mn-lt"/>
-                <a:ea typeface="+mn-ea"/>
-                <a:cs typeface="+mn-cs"/>
-              </a:defRPr>
-            </a:lvl2pPr>
-            <a:lvl3pPr marL="914400" algn="l" defTabSz="914400" rtl="0" eaLnBrk="1" latinLnBrk="0" hangingPunct="1">
-              <a:defRPr sz="1800" kern="1200">
-                <a:solidFill>
-                  <a:schemeClr val="tx1"/>
-                </a:solidFill>
-                <a:latin typeface="+mn-lt"/>
-                <a:ea typeface="+mn-ea"/>
-                <a:cs typeface="+mn-cs"/>
-              </a:defRPr>
-            </a:lvl3pPr>
-            <a:lvl4pPr marL="1371600" algn="l" defTabSz="914400" rtl="0" eaLnBrk="1" latinLnBrk="0" hangingPunct="1">
-              <a:defRPr sz="1800" kern="1200">
-                <a:solidFill>
-                  <a:schemeClr val="tx1"/>
-                </a:solidFill>
-                <a:latin typeface="+mn-lt"/>
-                <a:ea typeface="+mn-ea"/>
-                <a:cs typeface="+mn-cs"/>
-              </a:defRPr>
-            </a:lvl4pPr>
-            <a:lvl5pPr marL="1828800" algn="l" defTabSz="914400" rtl="0" eaLnBrk="1" latinLnBrk="0" hangingPunct="1">
-              <a:defRPr sz="1800" kern="1200">
-                <a:solidFill>
-                  <a:schemeClr val="tx1"/>
-                </a:solidFill>
-                <a:latin typeface="+mn-lt"/>
-                <a:ea typeface="+mn-ea"/>
-                <a:cs typeface="+mn-cs"/>
-              </a:defRPr>
-            </a:lvl5pPr>
-            <a:lvl6pPr marL="2286000" algn="l" defTabSz="914400" rtl="0" eaLnBrk="1" latinLnBrk="0" hangingPunct="1">
-              <a:defRPr sz="1800" kern="1200">
-                <a:solidFill>
-                  <a:schemeClr val="tx1"/>
-                </a:solidFill>
-                <a:latin typeface="+mn-lt"/>
-                <a:ea typeface="+mn-ea"/>
-                <a:cs typeface="+mn-cs"/>
-              </a:defRPr>
-            </a:lvl6pPr>
-            <a:lvl7pPr marL="2743200" algn="l" defTabSz="914400" rtl="0" eaLnBrk="1" latinLnBrk="0" hangingPunct="1">
-              <a:defRPr sz="1800" kern="1200">
-                <a:solidFill>
-                  <a:schemeClr val="tx1"/>
-                </a:solidFill>
-                <a:latin typeface="+mn-lt"/>
-                <a:ea typeface="+mn-ea"/>
-                <a:cs typeface="+mn-cs"/>
-              </a:defRPr>
-            </a:lvl7pPr>
-            <a:lvl8pPr marL="3200400" algn="l" defTabSz="914400" rtl="0" eaLnBrk="1" latinLnBrk="0" hangingPunct="1">
-              <a:defRPr sz="1800" kern="1200">
-                <a:solidFill>
-                  <a:schemeClr val="tx1"/>
-                </a:solidFill>
-                <a:latin typeface="+mn-lt"/>
-                <a:ea typeface="+mn-ea"/>
-                <a:cs typeface="+mn-cs"/>
-              </a:defRPr>
-            </a:lvl8pPr>
-            <a:lvl9pPr marL="3657600" algn="l" defTabSz="914400" rtl="0" eaLnBrk="1" latinLnBrk="0" hangingPunct="1">
-              <a:defRPr sz="1800" kern="1200">
-                <a:solidFill>
-                  <a:schemeClr val="tx1"/>
-                </a:solidFill>
-                <a:latin typeface="+mn-lt"/>
-                <a:ea typeface="+mn-ea"/>
-                <a:cs typeface="+mn-cs"/>
-              </a:defRPr>
-            </a:lvl9pPr>
-          </a:lstStyle>
-          <a:p>
-            <a:r>
-              <a:rPr lang="es-CO"/>
-              <a:t>© 2018 - Universidad de Los Andes – Departamento de Sistemas y Computación</a:t>
-            </a:r>
-            <a:endParaRPr lang="es-CO" noProof="0"/>
-          </a:p>
-        </p:txBody>
-      </p:sp>
-      <p:sp>
-        <p:nvSpPr>
-          <p:cNvPr id="8" name="TextBox 7">
-            <a:extLst>
-              <a:ext uri="{FF2B5EF4-FFF2-40B4-BE49-F238E27FC236}">
-                <a16:creationId xmlns:a16="http://schemas.microsoft.com/office/drawing/2014/main" id="{EB73D295-E43F-AD4E-8201-88046EF1E27D}"/>
-              </a:ext>
-            </a:extLst>
-          </p:cNvPr>
-          <p:cNvSpPr txBox="1"/>
-          <p:nvPr/>
-        </p:nvSpPr>
-        <p:spPr>
-          <a:xfrm>
-            <a:off x="341620" y="1268760"/>
-            <a:ext cx="8460760" cy="461665"/>
-          </a:xfrm>
-          <a:prstGeom prst="rect">
-            <a:avLst/>
-          </a:prstGeom>
-          <a:solidFill>
-            <a:schemeClr val="bg1">
-              <a:lumMod val="85000"/>
-            </a:schemeClr>
-          </a:solidFill>
-        </p:spPr>
-        <p:txBody>
-          <a:bodyPr wrap="square" rtlCol="0">
-            <a:spAutoFit/>
-          </a:bodyPr>
-          <a:lstStyle/>
-          <a:p>
-            <a:r>
-              <a:rPr lang="es-ES_tradnl" sz="1200" b="1"/>
-              <a:t>Paso 8- Iterar si es necesario: </a:t>
-            </a:r>
-            <a:r>
-              <a:rPr lang="es-ES_tradnl" sz="1200"/>
-              <a:t>Repita los pasos 2 a 7 de ser necesario. Use el riesgo como una medida para decidir si parar o continuar con una iteración más.</a:t>
-            </a:r>
-          </a:p>
-        </p:txBody>
-      </p:sp>
-      <p:graphicFrame>
-        <p:nvGraphicFramePr>
-          <p:cNvPr id="9" name="Table 8">
-            <a:extLst>
-              <a:ext uri="{FF2B5EF4-FFF2-40B4-BE49-F238E27FC236}">
-                <a16:creationId xmlns:a16="http://schemas.microsoft.com/office/drawing/2014/main" id="{3EE47E5E-5DD0-FD4C-A0F9-65C73C7768D6}"/>
-              </a:ext>
-            </a:extLst>
-          </p:cNvPr>
-          <p:cNvGraphicFramePr>
-            <a:graphicFrameLocks noGrp="1"/>
-          </p:cNvGraphicFramePr>
-          <p:nvPr>
-            <p:extLst>
-              <p:ext uri="{D42A27DB-BD31-4B8C-83A1-F6EECF244321}">
-                <p14:modId xmlns:p14="http://schemas.microsoft.com/office/powerpoint/2010/main" val="2896957818"/>
-              </p:ext>
-            </p:extLst>
-          </p:nvPr>
-        </p:nvGraphicFramePr>
-        <p:xfrm>
-          <a:off x="287524" y="2564904"/>
-          <a:ext cx="8568952" cy="3291840"/>
-        </p:xfrm>
-        <a:graphic>
-          <a:graphicData uri="http://schemas.openxmlformats.org/drawingml/2006/table">
-            <a:tbl>
-              <a:tblPr firstRow="1" firstCol="1" bandRow="1">
-                <a:tableStyleId>{5C22544A-7EE6-4342-B048-85BDC9FD1C3A}</a:tableStyleId>
-              </a:tblPr>
-              <a:tblGrid>
-                <a:gridCol w="1670179">
-                  <a:extLst>
-                    <a:ext uri="{9D8B030D-6E8A-4147-A177-3AD203B41FA5}">
-                      <a16:colId xmlns:a16="http://schemas.microsoft.com/office/drawing/2014/main" val="2994634929"/>
-                    </a:ext>
-                  </a:extLst>
-                </a:gridCol>
-                <a:gridCol w="6898773">
-                  <a:extLst>
-                    <a:ext uri="{9D8B030D-6E8A-4147-A177-3AD203B41FA5}">
-                      <a16:colId xmlns:a16="http://schemas.microsoft.com/office/drawing/2014/main" val="3685008882"/>
-                    </a:ext>
-                  </a:extLst>
-                </a:gridCol>
-              </a:tblGrid>
-              <a:tr h="330019">
-                <a:tc>
-                  <a:txBody>
-                    <a:bodyPr/>
-                    <a:lstStyle/>
-                    <a:p>
-                      <a:r>
-                        <a:rPr lang="es-CO" sz="1200"/>
-                        <a:t>Resultados </a:t>
-                      </a:r>
-                    </a:p>
-                  </a:txBody>
-                  <a:tcPr/>
-                </a:tc>
-                <a:tc>
-                  <a:txBody>
-                    <a:bodyPr/>
-                    <a:lstStyle/>
-                    <a:p>
-                      <a:endParaRPr lang="es-CO" sz="1200"/>
-                    </a:p>
-                    <a:p>
-                      <a:endParaRPr lang="es-CO" sz="1200"/>
-                    </a:p>
-                    <a:p>
-                      <a:endParaRPr lang="es-CO" sz="1200"/>
-                    </a:p>
-                    <a:p>
-                      <a:endParaRPr lang="es-CO" sz="1200"/>
-                    </a:p>
-                    <a:p>
-                      <a:endParaRPr lang="es-CO" sz="1200"/>
-                    </a:p>
-                  </a:txBody>
-                  <a:tcPr/>
-                </a:tc>
-                <a:extLst>
-                  <a:ext uri="{0D108BD9-81ED-4DB2-BD59-A6C34878D82A}">
-                    <a16:rowId xmlns:a16="http://schemas.microsoft.com/office/drawing/2014/main" val="2823551948"/>
-                  </a:ext>
-                </a:extLst>
-              </a:tr>
-              <a:tr h="330019">
-                <a:tc>
-                  <a:txBody>
-                    <a:bodyPr/>
-                    <a:lstStyle/>
-                    <a:p>
-                      <a:r>
-                        <a:rPr lang="es-CO" sz="1200"/>
-                        <a:t>Acciones a seguir</a:t>
-                      </a:r>
-                    </a:p>
-                  </a:txBody>
-                  <a:tcPr/>
-                </a:tc>
-                <a:tc>
-                  <a:txBody>
-                    <a:bodyPr/>
-                    <a:lstStyle/>
-                    <a:p>
-                      <a:endParaRPr lang="es-CO" sz="1200"/>
-                    </a:p>
-                    <a:p>
-                      <a:endParaRPr lang="es-CO" sz="1200"/>
-                    </a:p>
-                    <a:p>
-                      <a:endParaRPr lang="es-CO" sz="1200"/>
-                    </a:p>
-                    <a:p>
-                      <a:endParaRPr lang="es-CO" sz="1200"/>
-                    </a:p>
-                    <a:p>
-                      <a:endParaRPr lang="es-CO" sz="1200"/>
-                    </a:p>
-                    <a:p>
-                      <a:endParaRPr lang="es-CO" sz="1200"/>
-                    </a:p>
-                    <a:p>
-                      <a:endParaRPr lang="es-CO" sz="1200"/>
-                    </a:p>
-                    <a:p>
-                      <a:endParaRPr lang="es-CO" sz="1200"/>
-                    </a:p>
-                    <a:p>
-                      <a:endParaRPr lang="es-CO" sz="1200"/>
-                    </a:p>
-                    <a:p>
-                      <a:endParaRPr lang="es-CO" sz="1200"/>
-                    </a:p>
-                    <a:p>
-                      <a:endParaRPr lang="es-CO" sz="1200"/>
-                    </a:p>
-                    <a:p>
-                      <a:endParaRPr lang="es-CO" sz="1200"/>
-                    </a:p>
-                  </a:txBody>
-                  <a:tcPr/>
-                </a:tc>
-                <a:extLst>
-                  <a:ext uri="{0D108BD9-81ED-4DB2-BD59-A6C34878D82A}">
-                    <a16:rowId xmlns:a16="http://schemas.microsoft.com/office/drawing/2014/main" val="3732418422"/>
-                  </a:ext>
-                </a:extLst>
-              </a:tr>
-            </a:tbl>
-          </a:graphicData>
-        </a:graphic>
-      </p:graphicFrame>
-    </p:spTree>
-    <p:extLst>
-      <p:ext uri="{BB962C8B-B14F-4D97-AF65-F5344CB8AC3E}">
-        <p14:creationId xmlns:p14="http://schemas.microsoft.com/office/powerpoint/2010/main" val="875624249"/>
       </p:ext>
     </p:extLst>
   </p:cSld>
@@ -44981,16 +42998,16 @@
 <file path=customXml/itemProps1.xml><?xml version="1.0" encoding="utf-8"?>
 <ds:datastoreItem xmlns:ds="http://schemas.openxmlformats.org/officeDocument/2006/customXml" ds:itemID="{A6CA0C8D-3EA7-4A0C-80B3-EF1E0352A135}">
   <ds:schemaRefs>
+    <ds:schemaRef ds:uri="http://purl.org/dc/terms/"/>
+    <ds:schemaRef ds:uri="http://schemas.microsoft.com/office/2006/metadata/properties"/>
+    <ds:schemaRef ds:uri="9ba872fe-ebe7-44ee-97e3-5e5488f75d03"/>
+    <ds:schemaRef ds:uri="http://www.w3.org/XML/1998/namespace"/>
+    <ds:schemaRef ds:uri="http://schemas.openxmlformats.org/package/2006/metadata/core-properties"/>
+    <ds:schemaRef ds:uri="http://purl.org/dc/dcmitype/"/>
+    <ds:schemaRef ds:uri="http://schemas.microsoft.com/office/2006/documentManagement/types"/>
+    <ds:schemaRef ds:uri="http://purl.org/dc/elements/1.1/"/>
+    <ds:schemaRef ds:uri="http://schemas.microsoft.com/office/infopath/2007/PartnerControls"/>
     <ds:schemaRef ds:uri="7e18fa01-6860-4b34-97e3-8e9dc06f10c0"/>
-    <ds:schemaRef ds:uri="9ba872fe-ebe7-44ee-97e3-5e5488f75d03"/>
-    <ds:schemaRef ds:uri="http://purl.org/dc/dcmitype/"/>
-    <ds:schemaRef ds:uri="http://purl.org/dc/elements/1.1/"/>
-    <ds:schemaRef ds:uri="http://purl.org/dc/terms/"/>
-    <ds:schemaRef ds:uri="http://schemas.microsoft.com/office/2006/documentManagement/types"/>
-    <ds:schemaRef ds:uri="http://schemas.microsoft.com/office/2006/metadata/properties"/>
-    <ds:schemaRef ds:uri="http://schemas.microsoft.com/office/infopath/2007/PartnerControls"/>
-    <ds:schemaRef ds:uri="http://schemas.openxmlformats.org/package/2006/metadata/core-properties"/>
-    <ds:schemaRef ds:uri="http://www.w3.org/XML/1998/namespace"/>
   </ds:schemaRefs>
 </ds:datastoreItem>
 </file>

</xml_diff>